<commit_message>
assembly more initial documentation
</commit_message>
<xml_diff>
--- a/Week8_OrgNeedsPresentation/BachmeierNTIM8301-8.pptx
+++ b/Week8_OrgNeedsPresentation/BachmeierNTIM8301-8.pptx
@@ -4,6 +4,9 @@
   <p:sldMasterIdLst>
     <p:sldMasterId id="2147483712" r:id="rId4"/>
   </p:sldMasterIdLst>
+  <p:notesMasterIdLst>
+    <p:notesMasterId r:id="rId29"/>
+  </p:notesMasterIdLst>
   <p:sldIdLst>
     <p:sldId id="257" r:id="rId5"/>
     <p:sldId id="259" r:id="rId6"/>
@@ -136,6 +139,927 @@
 </file>
 
 <file path=ppt/diagrams/colors1.xml><?xml version="1.0" encoding="utf-8"?>
+<dgm:colorsDef xmlns:dgm="http://schemas.openxmlformats.org/drawingml/2006/diagram" xmlns:a="http://schemas.openxmlformats.org/drawingml/2006/main" uniqueId="urn:microsoft.com/office/officeart/2018/5/colors/Iconchunking_neutralbg_colorful1">
+  <dgm:title val=""/>
+  <dgm:desc val=""/>
+  <dgm:catLst>
+    <dgm:cat type="colorful" pri="10100"/>
+  </dgm:catLst>
+  <dgm:styleLbl name="node0">
+    <dgm:fillClrLst meth="repeat">
+      <a:schemeClr val="accent1"/>
+    </dgm:fillClrLst>
+    <dgm:linClrLst meth="repeat">
+      <a:schemeClr val="lt1"/>
+    </dgm:linClrLst>
+    <dgm:effectClrLst/>
+    <dgm:txLinClrLst/>
+    <dgm:txFillClrLst/>
+    <dgm:txEffectClrLst/>
+  </dgm:styleLbl>
+  <dgm:styleLbl name="node1">
+    <dgm:fillClrLst meth="repeat">
+      <a:schemeClr val="accent2"/>
+      <a:schemeClr val="accent3"/>
+      <a:schemeClr val="accent4"/>
+      <a:schemeClr val="accent5"/>
+      <a:schemeClr val="accent6"/>
+    </dgm:fillClrLst>
+    <dgm:linClrLst meth="repeat">
+      <a:schemeClr val="lt1">
+        <a:alpha val="0"/>
+      </a:schemeClr>
+    </dgm:linClrLst>
+    <dgm:effectClrLst/>
+    <dgm:txLinClrLst/>
+    <dgm:txFillClrLst/>
+    <dgm:txEffectClrLst/>
+  </dgm:styleLbl>
+  <dgm:styleLbl name="alignNode1">
+    <dgm:fillClrLst meth="repeat">
+      <a:schemeClr val="accent2"/>
+      <a:schemeClr val="accent3"/>
+      <a:schemeClr val="accent4"/>
+      <a:schemeClr val="accent5"/>
+      <a:schemeClr val="accent6"/>
+    </dgm:fillClrLst>
+    <dgm:linClrLst meth="repeat">
+      <a:schemeClr val="accent2"/>
+      <a:schemeClr val="accent3"/>
+      <a:schemeClr val="accent4"/>
+      <a:schemeClr val="accent5"/>
+      <a:schemeClr val="accent6"/>
+    </dgm:linClrLst>
+    <dgm:effectClrLst/>
+    <dgm:txLinClrLst/>
+    <dgm:txFillClrLst/>
+    <dgm:txEffectClrLst/>
+  </dgm:styleLbl>
+  <dgm:styleLbl name="lnNode1">
+    <dgm:fillClrLst meth="repeat">
+      <a:schemeClr val="accent2"/>
+      <a:schemeClr val="accent3"/>
+      <a:schemeClr val="accent4"/>
+      <a:schemeClr val="accent5"/>
+      <a:schemeClr val="accent6"/>
+    </dgm:fillClrLst>
+    <dgm:linClrLst meth="repeat">
+      <a:schemeClr val="lt1"/>
+    </dgm:linClrLst>
+    <dgm:effectClrLst/>
+    <dgm:txLinClrLst/>
+    <dgm:txFillClrLst/>
+    <dgm:txEffectClrLst/>
+  </dgm:styleLbl>
+  <dgm:styleLbl name="vennNode1">
+    <dgm:fillClrLst meth="repeat">
+      <a:schemeClr val="accent2">
+        <a:alpha val="50000"/>
+      </a:schemeClr>
+      <a:schemeClr val="accent3">
+        <a:alpha val="50000"/>
+      </a:schemeClr>
+      <a:schemeClr val="accent4">
+        <a:alpha val="50000"/>
+      </a:schemeClr>
+      <a:schemeClr val="accent5">
+        <a:alpha val="50000"/>
+      </a:schemeClr>
+      <a:schemeClr val="accent6">
+        <a:alpha val="50000"/>
+      </a:schemeClr>
+    </dgm:fillClrLst>
+    <dgm:linClrLst meth="repeat">
+      <a:schemeClr val="lt1"/>
+    </dgm:linClrLst>
+    <dgm:effectClrLst/>
+    <dgm:txLinClrLst/>
+    <dgm:txFillClrLst/>
+    <dgm:txEffectClrLst/>
+  </dgm:styleLbl>
+  <dgm:styleLbl name="node2">
+    <dgm:fillClrLst>
+      <a:schemeClr val="accent2"/>
+    </dgm:fillClrLst>
+    <dgm:linClrLst meth="repeat">
+      <a:schemeClr val="lt1"/>
+    </dgm:linClrLst>
+    <dgm:effectClrLst/>
+    <dgm:txLinClrLst/>
+    <dgm:txFillClrLst/>
+    <dgm:txEffectClrLst/>
+  </dgm:styleLbl>
+  <dgm:styleLbl name="node3">
+    <dgm:fillClrLst>
+      <a:schemeClr val="accent3"/>
+    </dgm:fillClrLst>
+    <dgm:linClrLst meth="repeat">
+      <a:schemeClr val="lt1"/>
+    </dgm:linClrLst>
+    <dgm:effectClrLst/>
+    <dgm:txLinClrLst/>
+    <dgm:txFillClrLst/>
+    <dgm:txEffectClrLst/>
+  </dgm:styleLbl>
+  <dgm:styleLbl name="node4">
+    <dgm:fillClrLst>
+      <a:schemeClr val="accent4"/>
+    </dgm:fillClrLst>
+    <dgm:linClrLst meth="repeat">
+      <a:schemeClr val="lt1"/>
+    </dgm:linClrLst>
+    <dgm:effectClrLst/>
+    <dgm:txLinClrLst/>
+    <dgm:txFillClrLst/>
+    <dgm:txEffectClrLst/>
+  </dgm:styleLbl>
+  <dgm:styleLbl name="fgImgPlace1">
+    <dgm:fillClrLst meth="repeat">
+      <a:schemeClr val="accent2">
+        <a:tint val="50000"/>
+      </a:schemeClr>
+      <a:schemeClr val="accent3">
+        <a:tint val="50000"/>
+      </a:schemeClr>
+      <a:schemeClr val="accent4">
+        <a:tint val="50000"/>
+      </a:schemeClr>
+      <a:schemeClr val="accent5">
+        <a:tint val="50000"/>
+      </a:schemeClr>
+      <a:schemeClr val="accent6">
+        <a:tint val="50000"/>
+      </a:schemeClr>
+    </dgm:fillClrLst>
+    <dgm:linClrLst meth="repeat">
+      <a:schemeClr val="lt1"/>
+    </dgm:linClrLst>
+    <dgm:effectClrLst/>
+    <dgm:txLinClrLst/>
+    <dgm:txFillClrLst meth="repeat">
+      <a:schemeClr val="lt1"/>
+    </dgm:txFillClrLst>
+    <dgm:txEffectClrLst/>
+  </dgm:styleLbl>
+  <dgm:styleLbl name="alignImgPlace1">
+    <dgm:fillClrLst>
+      <a:schemeClr val="accent1">
+        <a:tint val="50000"/>
+      </a:schemeClr>
+      <a:schemeClr val="accent2">
+        <a:tint val="20000"/>
+      </a:schemeClr>
+    </dgm:fillClrLst>
+    <dgm:linClrLst meth="repeat">
+      <a:schemeClr val="lt1"/>
+    </dgm:linClrLst>
+    <dgm:effectClrLst/>
+    <dgm:txLinClrLst/>
+    <dgm:txFillClrLst meth="repeat">
+      <a:schemeClr val="lt1"/>
+    </dgm:txFillClrLst>
+    <dgm:txEffectClrLst/>
+  </dgm:styleLbl>
+  <dgm:styleLbl name="bgImgPlace1">
+    <dgm:fillClrLst>
+      <a:schemeClr val="accent1">
+        <a:tint val="50000"/>
+      </a:schemeClr>
+      <a:schemeClr val="accent2">
+        <a:tint val="20000"/>
+      </a:schemeClr>
+    </dgm:fillClrLst>
+    <dgm:linClrLst meth="repeat">
+      <a:schemeClr val="lt1"/>
+    </dgm:linClrLst>
+    <dgm:effectClrLst/>
+    <dgm:txLinClrLst/>
+    <dgm:txFillClrLst meth="repeat">
+      <a:schemeClr val="lt1"/>
+    </dgm:txFillClrLst>
+    <dgm:txEffectClrLst/>
+  </dgm:styleLbl>
+  <dgm:styleLbl name="sibTrans2D1">
+    <dgm:fillClrLst meth="repeat">
+      <a:schemeClr val="accent2"/>
+      <a:schemeClr val="accent3"/>
+      <a:schemeClr val="accent4"/>
+      <a:schemeClr val="accent5"/>
+      <a:schemeClr val="accent6"/>
+    </dgm:fillClrLst>
+    <dgm:linClrLst meth="cycle">
+      <a:schemeClr val="lt1"/>
+    </dgm:linClrLst>
+    <dgm:effectClrLst/>
+    <dgm:txLinClrLst/>
+    <dgm:txFillClrLst/>
+    <dgm:txEffectClrLst/>
+  </dgm:styleLbl>
+  <dgm:styleLbl name="fgSibTrans2D1">
+    <dgm:fillClrLst meth="repeat">
+      <a:schemeClr val="accent2"/>
+      <a:schemeClr val="accent3"/>
+      <a:schemeClr val="accent4"/>
+      <a:schemeClr val="accent5"/>
+      <a:schemeClr val="accent6"/>
+    </dgm:fillClrLst>
+    <dgm:linClrLst meth="cycle">
+      <a:schemeClr val="lt1"/>
+    </dgm:linClrLst>
+    <dgm:effectClrLst/>
+    <dgm:txLinClrLst/>
+    <dgm:txFillClrLst meth="repeat">
+      <a:schemeClr val="lt1"/>
+    </dgm:txFillClrLst>
+    <dgm:txEffectClrLst/>
+  </dgm:styleLbl>
+  <dgm:styleLbl name="bgSibTrans2D1">
+    <dgm:fillClrLst meth="repeat">
+      <a:schemeClr val="accent2"/>
+      <a:schemeClr val="accent3"/>
+      <a:schemeClr val="accent4"/>
+      <a:schemeClr val="accent5"/>
+      <a:schemeClr val="accent6"/>
+    </dgm:fillClrLst>
+    <dgm:linClrLst meth="cycle">
+      <a:schemeClr val="lt1"/>
+    </dgm:linClrLst>
+    <dgm:effectClrLst/>
+    <dgm:txLinClrLst/>
+    <dgm:txFillClrLst meth="repeat">
+      <a:schemeClr val="lt1"/>
+    </dgm:txFillClrLst>
+    <dgm:txEffectClrLst/>
+  </dgm:styleLbl>
+  <dgm:styleLbl name="sibTrans1D1">
+    <dgm:fillClrLst meth="repeat">
+      <a:schemeClr val="accent2"/>
+      <a:schemeClr val="accent3"/>
+      <a:schemeClr val="accent4"/>
+      <a:schemeClr val="accent5"/>
+      <a:schemeClr val="accent6"/>
+    </dgm:fillClrLst>
+    <dgm:linClrLst meth="repeat">
+      <a:schemeClr val="accent2"/>
+      <a:schemeClr val="accent3"/>
+      <a:schemeClr val="accent4"/>
+      <a:schemeClr val="accent5"/>
+      <a:schemeClr val="accent6"/>
+    </dgm:linClrLst>
+    <dgm:effectClrLst/>
+    <dgm:txLinClrLst/>
+    <dgm:txFillClrLst meth="repeat">
+      <a:schemeClr val="tx1"/>
+    </dgm:txFillClrLst>
+    <dgm:txEffectClrLst/>
+  </dgm:styleLbl>
+  <dgm:styleLbl name="callout">
+    <dgm:fillClrLst meth="repeat">
+      <a:schemeClr val="accent2"/>
+    </dgm:fillClrLst>
+    <dgm:linClrLst meth="repeat">
+      <a:schemeClr val="accent2">
+        <a:tint val="50000"/>
+      </a:schemeClr>
+    </dgm:linClrLst>
+    <dgm:effectClrLst/>
+    <dgm:txLinClrLst/>
+    <dgm:txFillClrLst meth="repeat">
+      <a:schemeClr val="tx1"/>
+    </dgm:txFillClrLst>
+    <dgm:txEffectClrLst/>
+  </dgm:styleLbl>
+  <dgm:styleLbl name="asst0">
+    <dgm:fillClrLst meth="repeat">
+      <a:schemeClr val="accent1"/>
+    </dgm:fillClrLst>
+    <dgm:linClrLst meth="repeat">
+      <a:schemeClr val="lt1"/>
+    </dgm:linClrLst>
+    <dgm:effectClrLst/>
+    <dgm:txLinClrLst/>
+    <dgm:txFillClrLst/>
+    <dgm:txEffectClrLst/>
+  </dgm:styleLbl>
+  <dgm:styleLbl name="asst1">
+    <dgm:fillClrLst meth="repeat">
+      <a:schemeClr val="accent2"/>
+    </dgm:fillClrLst>
+    <dgm:linClrLst meth="repeat">
+      <a:schemeClr val="lt1"/>
+    </dgm:linClrLst>
+    <dgm:effectClrLst/>
+    <dgm:txLinClrLst/>
+    <dgm:txFillClrLst/>
+    <dgm:txEffectClrLst/>
+  </dgm:styleLbl>
+  <dgm:styleLbl name="asst2">
+    <dgm:fillClrLst>
+      <a:schemeClr val="accent3"/>
+    </dgm:fillClrLst>
+    <dgm:linClrLst meth="repeat">
+      <a:schemeClr val="lt1"/>
+    </dgm:linClrLst>
+    <dgm:effectClrLst/>
+    <dgm:txLinClrLst/>
+    <dgm:txFillClrLst/>
+    <dgm:txEffectClrLst/>
+  </dgm:styleLbl>
+  <dgm:styleLbl name="asst3">
+    <dgm:fillClrLst>
+      <a:schemeClr val="accent4"/>
+    </dgm:fillClrLst>
+    <dgm:linClrLst meth="repeat">
+      <a:schemeClr val="lt1"/>
+    </dgm:linClrLst>
+    <dgm:effectClrLst/>
+    <dgm:txLinClrLst/>
+    <dgm:txFillClrLst/>
+    <dgm:txEffectClrLst/>
+  </dgm:styleLbl>
+  <dgm:styleLbl name="asst4">
+    <dgm:fillClrLst>
+      <a:schemeClr val="accent5"/>
+    </dgm:fillClrLst>
+    <dgm:linClrLst meth="repeat">
+      <a:schemeClr val="lt1"/>
+    </dgm:linClrLst>
+    <dgm:effectClrLst/>
+    <dgm:txLinClrLst/>
+    <dgm:txFillClrLst/>
+    <dgm:txEffectClrLst/>
+  </dgm:styleLbl>
+  <dgm:styleLbl name="parChTrans2D1">
+    <dgm:fillClrLst meth="repeat">
+      <a:schemeClr val="accent2"/>
+    </dgm:fillClrLst>
+    <dgm:linClrLst meth="repeat">
+      <a:schemeClr val="lt1"/>
+    </dgm:linClrLst>
+    <dgm:effectClrLst/>
+    <dgm:txLinClrLst/>
+    <dgm:txFillClrLst meth="repeat">
+      <a:schemeClr val="lt1"/>
+    </dgm:txFillClrLst>
+    <dgm:txEffectClrLst/>
+  </dgm:styleLbl>
+  <dgm:styleLbl name="parChTrans2D2">
+    <dgm:fillClrLst meth="repeat">
+      <a:schemeClr val="accent3"/>
+    </dgm:fillClrLst>
+    <dgm:linClrLst meth="repeat">
+      <a:schemeClr val="lt1"/>
+    </dgm:linClrLst>
+    <dgm:effectClrLst/>
+    <dgm:txLinClrLst/>
+    <dgm:txFillClrLst/>
+    <dgm:txEffectClrLst/>
+  </dgm:styleLbl>
+  <dgm:styleLbl name="parChTrans2D3">
+    <dgm:fillClrLst meth="repeat">
+      <a:schemeClr val="accent4"/>
+    </dgm:fillClrLst>
+    <dgm:linClrLst meth="repeat">
+      <a:schemeClr val="lt1"/>
+    </dgm:linClrLst>
+    <dgm:effectClrLst/>
+    <dgm:txLinClrLst/>
+    <dgm:txFillClrLst/>
+    <dgm:txEffectClrLst/>
+  </dgm:styleLbl>
+  <dgm:styleLbl name="parChTrans2D4">
+    <dgm:fillClrLst meth="repeat">
+      <a:schemeClr val="accent5"/>
+    </dgm:fillClrLst>
+    <dgm:linClrLst meth="repeat">
+      <a:schemeClr val="lt1"/>
+    </dgm:linClrLst>
+    <dgm:effectClrLst/>
+    <dgm:txLinClrLst/>
+    <dgm:txFillClrLst meth="repeat">
+      <a:schemeClr val="lt1"/>
+    </dgm:txFillClrLst>
+    <dgm:txEffectClrLst/>
+  </dgm:styleLbl>
+  <dgm:styleLbl name="parChTrans1D1">
+    <dgm:fillClrLst meth="repeat">
+      <a:schemeClr val="accent2"/>
+    </dgm:fillClrLst>
+    <dgm:linClrLst meth="repeat">
+      <a:schemeClr val="accent1"/>
+    </dgm:linClrLst>
+    <dgm:effectClrLst/>
+    <dgm:txLinClrLst/>
+    <dgm:txFillClrLst meth="repeat">
+      <a:schemeClr val="tx1"/>
+    </dgm:txFillClrLst>
+    <dgm:txEffectClrLst/>
+  </dgm:styleLbl>
+  <dgm:styleLbl name="parChTrans1D2">
+    <dgm:fillClrLst meth="repeat">
+      <a:schemeClr val="accent3">
+        <a:tint val="90000"/>
+      </a:schemeClr>
+    </dgm:fillClrLst>
+    <dgm:linClrLst meth="repeat">
+      <a:schemeClr val="accent2"/>
+    </dgm:linClrLst>
+    <dgm:effectClrLst/>
+    <dgm:txLinClrLst/>
+    <dgm:txFillClrLst meth="repeat">
+      <a:schemeClr val="tx1"/>
+    </dgm:txFillClrLst>
+    <dgm:txEffectClrLst/>
+  </dgm:styleLbl>
+  <dgm:styleLbl name="parChTrans1D3">
+    <dgm:fillClrLst meth="repeat">
+      <a:schemeClr val="accent4">
+        <a:tint val="70000"/>
+      </a:schemeClr>
+    </dgm:fillClrLst>
+    <dgm:linClrLst meth="repeat">
+      <a:schemeClr val="accent3"/>
+    </dgm:linClrLst>
+    <dgm:effectClrLst/>
+    <dgm:txLinClrLst/>
+    <dgm:txFillClrLst meth="repeat">
+      <a:schemeClr val="tx1"/>
+    </dgm:txFillClrLst>
+    <dgm:txEffectClrLst/>
+  </dgm:styleLbl>
+  <dgm:styleLbl name="parChTrans1D4">
+    <dgm:fillClrLst meth="repeat">
+      <a:schemeClr val="accent5">
+        <a:tint val="50000"/>
+      </a:schemeClr>
+    </dgm:fillClrLst>
+    <dgm:linClrLst meth="repeat">
+      <a:schemeClr val="accent4"/>
+    </dgm:linClrLst>
+    <dgm:effectClrLst/>
+    <dgm:txLinClrLst/>
+    <dgm:txFillClrLst meth="repeat">
+      <a:schemeClr val="tx1"/>
+    </dgm:txFillClrLst>
+    <dgm:txEffectClrLst/>
+  </dgm:styleLbl>
+  <dgm:styleLbl name="fgAcc1">
+    <dgm:fillClrLst meth="repeat">
+      <a:schemeClr val="lt1">
+        <a:alpha val="90000"/>
+      </a:schemeClr>
+    </dgm:fillClrLst>
+    <dgm:linClrLst meth="repeat">
+      <a:schemeClr val="accent2"/>
+      <a:schemeClr val="accent3"/>
+      <a:schemeClr val="accent4"/>
+      <a:schemeClr val="accent5"/>
+      <a:schemeClr val="accent6"/>
+    </dgm:linClrLst>
+    <dgm:effectClrLst/>
+    <dgm:txLinClrLst/>
+    <dgm:txFillClrLst meth="repeat">
+      <a:schemeClr val="dk1"/>
+    </dgm:txFillClrLst>
+    <dgm:txEffectClrLst/>
+  </dgm:styleLbl>
+  <dgm:styleLbl name="conFgAcc1">
+    <dgm:fillClrLst meth="repeat">
+      <a:schemeClr val="lt1">
+        <a:alpha val="90000"/>
+      </a:schemeClr>
+    </dgm:fillClrLst>
+    <dgm:linClrLst meth="repeat">
+      <a:schemeClr val="accent2"/>
+      <a:schemeClr val="accent3"/>
+      <a:schemeClr val="accent4"/>
+      <a:schemeClr val="accent5"/>
+      <a:schemeClr val="accent6"/>
+    </dgm:linClrLst>
+    <dgm:effectClrLst/>
+    <dgm:txLinClrLst/>
+    <dgm:txFillClrLst meth="repeat">
+      <a:schemeClr val="dk1"/>
+    </dgm:txFillClrLst>
+    <dgm:txEffectClrLst/>
+  </dgm:styleLbl>
+  <dgm:styleLbl name="alignAcc1">
+    <dgm:fillClrLst meth="repeat">
+      <a:schemeClr val="lt1">
+        <a:alpha val="90000"/>
+      </a:schemeClr>
+    </dgm:fillClrLst>
+    <dgm:linClrLst meth="repeat">
+      <a:schemeClr val="accent2"/>
+      <a:schemeClr val="accent3"/>
+      <a:schemeClr val="accent4"/>
+      <a:schemeClr val="accent5"/>
+      <a:schemeClr val="accent6"/>
+    </dgm:linClrLst>
+    <dgm:effectClrLst/>
+    <dgm:txLinClrLst/>
+    <dgm:txFillClrLst meth="repeat">
+      <a:schemeClr val="dk1"/>
+    </dgm:txFillClrLst>
+    <dgm:txEffectClrLst/>
+  </dgm:styleLbl>
+  <dgm:styleLbl name="trAlignAcc1">
+    <dgm:fillClrLst meth="repeat">
+      <a:schemeClr val="lt1">
+        <a:alpha val="40000"/>
+      </a:schemeClr>
+    </dgm:fillClrLst>
+    <dgm:linClrLst meth="repeat">
+      <a:schemeClr val="accent1"/>
+    </dgm:linClrLst>
+    <dgm:effectClrLst/>
+    <dgm:txLinClrLst/>
+    <dgm:txFillClrLst meth="repeat">
+      <a:schemeClr val="dk1"/>
+    </dgm:txFillClrLst>
+    <dgm:txEffectClrLst/>
+  </dgm:styleLbl>
+  <dgm:styleLbl name="bgAcc1">
+    <dgm:fillClrLst meth="repeat">
+      <a:schemeClr val="lt1">
+        <a:alpha val="90000"/>
+      </a:schemeClr>
+    </dgm:fillClrLst>
+    <dgm:linClrLst meth="repeat">
+      <a:schemeClr val="accent2"/>
+      <a:schemeClr val="accent3"/>
+      <a:schemeClr val="accent4"/>
+      <a:schemeClr val="accent5"/>
+      <a:schemeClr val="accent6"/>
+    </dgm:linClrLst>
+    <dgm:effectClrLst/>
+    <dgm:txLinClrLst/>
+    <dgm:txFillClrLst meth="repeat">
+      <a:schemeClr val="dk1"/>
+    </dgm:txFillClrLst>
+    <dgm:txEffectClrLst/>
+  </dgm:styleLbl>
+  <dgm:styleLbl name="solidFgAcc1">
+    <dgm:fillClrLst meth="repeat">
+      <a:schemeClr val="lt1"/>
+    </dgm:fillClrLst>
+    <dgm:linClrLst meth="repeat">
+      <a:schemeClr val="accent2"/>
+      <a:schemeClr val="accent3"/>
+      <a:schemeClr val="accent4"/>
+      <a:schemeClr val="accent5"/>
+      <a:schemeClr val="accent6"/>
+    </dgm:linClrLst>
+    <dgm:effectClrLst/>
+    <dgm:txLinClrLst/>
+    <dgm:txFillClrLst meth="repeat">
+      <a:schemeClr val="dk1"/>
+    </dgm:txFillClrLst>
+    <dgm:txEffectClrLst/>
+  </dgm:styleLbl>
+  <dgm:styleLbl name="solidAlignAcc1">
+    <dgm:fillClrLst meth="repeat">
+      <a:schemeClr val="lt1"/>
+    </dgm:fillClrLst>
+    <dgm:linClrLst meth="repeat">
+      <a:schemeClr val="accent2"/>
+      <a:schemeClr val="accent3"/>
+      <a:schemeClr val="accent4"/>
+      <a:schemeClr val="accent5"/>
+      <a:schemeClr val="accent6"/>
+    </dgm:linClrLst>
+    <dgm:effectClrLst/>
+    <dgm:txLinClrLst/>
+    <dgm:txFillClrLst meth="repeat">
+      <a:schemeClr val="dk1"/>
+    </dgm:txFillClrLst>
+    <dgm:txEffectClrLst/>
+  </dgm:styleLbl>
+  <dgm:styleLbl name="solidBgAcc1">
+    <dgm:fillClrLst meth="repeat">
+      <a:schemeClr val="lt1"/>
+    </dgm:fillClrLst>
+    <dgm:linClrLst meth="repeat">
+      <a:schemeClr val="accent2"/>
+      <a:schemeClr val="accent3"/>
+      <a:schemeClr val="accent4"/>
+      <a:schemeClr val="accent5"/>
+      <a:schemeClr val="accent6"/>
+    </dgm:linClrLst>
+    <dgm:effectClrLst/>
+    <dgm:txLinClrLst/>
+    <dgm:txFillClrLst meth="repeat">
+      <a:schemeClr val="dk1"/>
+    </dgm:txFillClrLst>
+    <dgm:txEffectClrLst/>
+  </dgm:styleLbl>
+  <dgm:styleLbl name="fgAccFollowNode1">
+    <dgm:fillClrLst meth="repeat">
+      <a:schemeClr val="accent2">
+        <a:tint val="40000"/>
+        <a:alpha val="90000"/>
+      </a:schemeClr>
+      <a:schemeClr val="accent3">
+        <a:tint val="40000"/>
+        <a:alpha val="90000"/>
+      </a:schemeClr>
+      <a:schemeClr val="accent4">
+        <a:tint val="40000"/>
+        <a:alpha val="90000"/>
+      </a:schemeClr>
+      <a:schemeClr val="accent5">
+        <a:tint val="40000"/>
+        <a:alpha val="90000"/>
+      </a:schemeClr>
+      <a:schemeClr val="accent6">
+        <a:tint val="40000"/>
+        <a:alpha val="90000"/>
+      </a:schemeClr>
+    </dgm:fillClrLst>
+    <dgm:linClrLst meth="repeat">
+      <a:schemeClr val="accent2">
+        <a:tint val="40000"/>
+        <a:alpha val="90000"/>
+      </a:schemeClr>
+      <a:schemeClr val="accent3">
+        <a:tint val="40000"/>
+        <a:alpha val="90000"/>
+      </a:schemeClr>
+      <a:schemeClr val="accent4">
+        <a:tint val="40000"/>
+        <a:alpha val="90000"/>
+      </a:schemeClr>
+      <a:schemeClr val="accent5">
+        <a:tint val="40000"/>
+        <a:alpha val="90000"/>
+      </a:schemeClr>
+      <a:schemeClr val="accent6">
+        <a:tint val="40000"/>
+        <a:alpha val="90000"/>
+      </a:schemeClr>
+    </dgm:linClrLst>
+    <dgm:effectClrLst/>
+    <dgm:txLinClrLst/>
+    <dgm:txFillClrLst meth="repeat">
+      <a:schemeClr val="dk1"/>
+    </dgm:txFillClrLst>
+    <dgm:txEffectClrLst/>
+  </dgm:styleLbl>
+  <dgm:styleLbl name="alignAccFollowNode1">
+    <dgm:fillClrLst meth="repeat">
+      <a:schemeClr val="accent2">
+        <a:tint val="40000"/>
+        <a:alpha val="90000"/>
+      </a:schemeClr>
+      <a:schemeClr val="accent3">
+        <a:tint val="40000"/>
+        <a:alpha val="90000"/>
+      </a:schemeClr>
+      <a:schemeClr val="accent4">
+        <a:tint val="40000"/>
+        <a:alpha val="90000"/>
+      </a:schemeClr>
+      <a:schemeClr val="accent5">
+        <a:tint val="40000"/>
+        <a:alpha val="90000"/>
+      </a:schemeClr>
+      <a:schemeClr val="accent6">
+        <a:tint val="40000"/>
+        <a:alpha val="90000"/>
+      </a:schemeClr>
+    </dgm:fillClrLst>
+    <dgm:linClrLst meth="repeat">
+      <a:schemeClr val="accent2">
+        <a:tint val="40000"/>
+        <a:alpha val="90000"/>
+      </a:schemeClr>
+      <a:schemeClr val="accent3">
+        <a:tint val="40000"/>
+        <a:alpha val="90000"/>
+      </a:schemeClr>
+      <a:schemeClr val="accent4">
+        <a:tint val="40000"/>
+        <a:alpha val="90000"/>
+      </a:schemeClr>
+      <a:schemeClr val="accent5">
+        <a:tint val="40000"/>
+        <a:alpha val="90000"/>
+      </a:schemeClr>
+      <a:schemeClr val="accent6">
+        <a:tint val="40000"/>
+        <a:alpha val="90000"/>
+      </a:schemeClr>
+    </dgm:linClrLst>
+    <dgm:effectClrLst/>
+    <dgm:txLinClrLst/>
+    <dgm:txFillClrLst meth="repeat">
+      <a:schemeClr val="dk1"/>
+    </dgm:txFillClrLst>
+    <dgm:txEffectClrLst/>
+  </dgm:styleLbl>
+  <dgm:styleLbl name="bgAccFollowNode1">
+    <dgm:fillClrLst meth="repeat">
+      <a:schemeClr val="accent2">
+        <a:tint val="40000"/>
+        <a:alpha val="90000"/>
+      </a:schemeClr>
+      <a:schemeClr val="accent3">
+        <a:tint val="40000"/>
+        <a:alpha val="90000"/>
+      </a:schemeClr>
+      <a:schemeClr val="accent4">
+        <a:tint val="40000"/>
+        <a:alpha val="90000"/>
+      </a:schemeClr>
+      <a:schemeClr val="accent5">
+        <a:tint val="40000"/>
+        <a:alpha val="90000"/>
+      </a:schemeClr>
+      <a:schemeClr val="accent6">
+        <a:tint val="40000"/>
+        <a:alpha val="90000"/>
+      </a:schemeClr>
+    </dgm:fillClrLst>
+    <dgm:linClrLst meth="repeat">
+      <a:schemeClr val="accent2">
+        <a:tint val="40000"/>
+        <a:alpha val="90000"/>
+      </a:schemeClr>
+      <a:schemeClr val="accent3">
+        <a:tint val="40000"/>
+        <a:alpha val="90000"/>
+      </a:schemeClr>
+      <a:schemeClr val="accent4">
+        <a:tint val="40000"/>
+        <a:alpha val="90000"/>
+      </a:schemeClr>
+      <a:schemeClr val="accent5">
+        <a:tint val="40000"/>
+        <a:alpha val="90000"/>
+      </a:schemeClr>
+      <a:schemeClr val="accent6">
+        <a:tint val="40000"/>
+        <a:alpha val="90000"/>
+      </a:schemeClr>
+    </dgm:linClrLst>
+    <dgm:effectClrLst/>
+    <dgm:txLinClrLst/>
+    <dgm:txFillClrLst meth="repeat">
+      <a:schemeClr val="dk1"/>
+    </dgm:txFillClrLst>
+    <dgm:txEffectClrLst/>
+  </dgm:styleLbl>
+  <dgm:styleLbl name="fgAcc0">
+    <dgm:fillClrLst meth="repeat">
+      <a:schemeClr val="lt1">
+        <a:alpha val="90000"/>
+      </a:schemeClr>
+    </dgm:fillClrLst>
+    <dgm:linClrLst>
+      <a:schemeClr val="accent1"/>
+    </dgm:linClrLst>
+    <dgm:effectClrLst/>
+    <dgm:txLinClrLst/>
+    <dgm:txFillClrLst meth="repeat">
+      <a:schemeClr val="dk1"/>
+    </dgm:txFillClrLst>
+    <dgm:txEffectClrLst/>
+  </dgm:styleLbl>
+  <dgm:styleLbl name="fgAcc2">
+    <dgm:fillClrLst meth="repeat">
+      <a:schemeClr val="lt1">
+        <a:alpha val="90000"/>
+      </a:schemeClr>
+    </dgm:fillClrLst>
+    <dgm:linClrLst>
+      <a:schemeClr val="accent2"/>
+    </dgm:linClrLst>
+    <dgm:effectClrLst/>
+    <dgm:txLinClrLst/>
+    <dgm:txFillClrLst meth="repeat">
+      <a:schemeClr val="dk1"/>
+    </dgm:txFillClrLst>
+    <dgm:txEffectClrLst/>
+  </dgm:styleLbl>
+  <dgm:styleLbl name="fgAcc3">
+    <dgm:fillClrLst meth="repeat">
+      <a:schemeClr val="lt1">
+        <a:alpha val="90000"/>
+      </a:schemeClr>
+    </dgm:fillClrLst>
+    <dgm:linClrLst>
+      <a:schemeClr val="accent3"/>
+    </dgm:linClrLst>
+    <dgm:effectClrLst/>
+    <dgm:txLinClrLst/>
+    <dgm:txFillClrLst meth="repeat">
+      <a:schemeClr val="dk1"/>
+    </dgm:txFillClrLst>
+    <dgm:txEffectClrLst/>
+  </dgm:styleLbl>
+  <dgm:styleLbl name="fgAcc4">
+    <dgm:fillClrLst meth="repeat">
+      <a:schemeClr val="lt1">
+        <a:alpha val="90000"/>
+      </a:schemeClr>
+    </dgm:fillClrLst>
+    <dgm:linClrLst>
+      <a:schemeClr val="accent4"/>
+    </dgm:linClrLst>
+    <dgm:effectClrLst/>
+    <dgm:txLinClrLst/>
+    <dgm:txFillClrLst meth="repeat">
+      <a:schemeClr val="dk1"/>
+    </dgm:txFillClrLst>
+    <dgm:txEffectClrLst/>
+  </dgm:styleLbl>
+  <dgm:styleLbl name="bgShp">
+    <dgm:fillClrLst meth="repeat">
+      <a:schemeClr val="bg1">
+        <a:lumMod val="95000"/>
+      </a:schemeClr>
+    </dgm:fillClrLst>
+    <dgm:linClrLst meth="repeat">
+      <a:schemeClr val="dk1"/>
+    </dgm:linClrLst>
+    <dgm:effectClrLst/>
+    <dgm:txLinClrLst/>
+    <dgm:txFillClrLst meth="repeat">
+      <a:schemeClr val="dk1"/>
+    </dgm:txFillClrLst>
+    <dgm:txEffectClrLst/>
+  </dgm:styleLbl>
+  <dgm:styleLbl name="dkBgShp">
+    <dgm:fillClrLst meth="repeat">
+      <a:schemeClr val="accent2">
+        <a:shade val="90000"/>
+      </a:schemeClr>
+    </dgm:fillClrLst>
+    <dgm:linClrLst meth="repeat">
+      <a:schemeClr val="dk1"/>
+    </dgm:linClrLst>
+    <dgm:effectClrLst/>
+    <dgm:txLinClrLst/>
+    <dgm:txFillClrLst meth="repeat">
+      <a:schemeClr val="lt1"/>
+    </dgm:txFillClrLst>
+    <dgm:txEffectClrLst/>
+  </dgm:styleLbl>
+  <dgm:styleLbl name="trBgShp">
+    <dgm:fillClrLst meth="repeat">
+      <a:schemeClr val="accent1">
+        <a:tint val="50000"/>
+        <a:alpha val="40000"/>
+      </a:schemeClr>
+    </dgm:fillClrLst>
+    <dgm:linClrLst meth="repeat">
+      <a:schemeClr val="accent2"/>
+    </dgm:linClrLst>
+    <dgm:effectClrLst/>
+    <dgm:txLinClrLst/>
+    <dgm:txFillClrLst meth="repeat">
+      <a:schemeClr val="lt1"/>
+    </dgm:txFillClrLst>
+    <dgm:txEffectClrLst/>
+  </dgm:styleLbl>
+  <dgm:styleLbl name="fgShp">
+    <dgm:fillClrLst meth="repeat">
+      <a:schemeClr val="accent2">
+        <a:tint val="40000"/>
+      </a:schemeClr>
+    </dgm:fillClrLst>
+    <dgm:linClrLst meth="repeat">
+      <a:schemeClr val="lt1"/>
+    </dgm:linClrLst>
+    <dgm:effectClrLst/>
+    <dgm:txLinClrLst/>
+    <dgm:txFillClrLst meth="repeat">
+      <a:schemeClr val="dk1"/>
+    </dgm:txFillClrLst>
+    <dgm:txEffectClrLst/>
+  </dgm:styleLbl>
+  <dgm:styleLbl name="revTx">
+    <dgm:fillClrLst meth="repeat">
+      <a:schemeClr val="lt1">
+        <a:alpha val="0"/>
+      </a:schemeClr>
+    </dgm:fillClrLst>
+    <dgm:linClrLst meth="repeat">
+      <a:schemeClr val="dk1">
+        <a:alpha val="0"/>
+      </a:schemeClr>
+    </dgm:linClrLst>
+    <dgm:effectClrLst/>
+    <dgm:txLinClrLst/>
+    <dgm:txFillClrLst meth="repeat">
+      <a:schemeClr val="tx1"/>
+    </dgm:txFillClrLst>
+    <dgm:txEffectClrLst/>
+  </dgm:styleLbl>
+</dgm:colorsDef>
+</file>
+
+<file path=ppt/diagrams/colors2.xml><?xml version="1.0" encoding="utf-8"?>
 <dgm:colorsDef xmlns:dgm="http://schemas.openxmlformats.org/drawingml/2006/diagram" xmlns:a="http://schemas.openxmlformats.org/drawingml/2006/main" uniqueId="urn:microsoft.com/office/officeart/2018/5/colors/Iconchunking_neutralbg_colorful1">
   <dgm:title val=""/>
   <dgm:desc val=""/>
@@ -1670,6 +2594,329 @@
 </dgm:dataModel>
 </file>
 
+<file path=ppt/diagrams/data2.xml><?xml version="1.0" encoding="utf-8"?>
+<dgm:dataModel xmlns:dgm="http://schemas.openxmlformats.org/drawingml/2006/diagram" xmlns:a="http://schemas.openxmlformats.org/drawingml/2006/main">
+  <dgm:ptLst>
+    <dgm:pt modelId="{9A518FC5-22FB-4D91-8E2A-CC43A6038D63}" type="doc">
+      <dgm:prSet loTypeId="urn:microsoft.com/office/officeart/2018/2/layout/IconLabelList" loCatId="icon" qsTypeId="urn:microsoft.com/office/officeart/2005/8/quickstyle/simple1" qsCatId="simple" csTypeId="urn:microsoft.com/office/officeart/2018/5/colors/Iconchunking_neutralbg_colorful1" csCatId="colorful" phldr="1"/>
+      <dgm:spPr/>
+      <dgm:t>
+        <a:bodyPr/>
+        <a:lstStyle/>
+        <a:p>
+          <a:endParaRPr lang="en-US"/>
+        </a:p>
+      </dgm:t>
+    </dgm:pt>
+    <dgm:pt modelId="{BC931268-D017-4897-9057-F432516F7B3E}">
+      <dgm:prSet/>
+      <dgm:spPr/>
+      <dgm:t>
+        <a:bodyPr/>
+        <a:lstStyle/>
+        <a:p>
+          <a:pPr>
+            <a:lnSpc>
+              <a:spcPct val="100000"/>
+            </a:lnSpc>
+          </a:pPr>
+          <a:r>
+            <a:rPr lang="en-US" dirty="0"/>
+            <a:t>They just work</a:t>
+          </a:r>
+        </a:p>
+      </dgm:t>
+    </dgm:pt>
+    <dgm:pt modelId="{C464CB59-AAAE-4A69-80DD-078FD6FA1A40}" type="parTrans" cxnId="{39EF2E99-233A-4BBC-AC2C-C997B96F40AA}">
+      <dgm:prSet/>
+      <dgm:spPr/>
+      <dgm:t>
+        <a:bodyPr/>
+        <a:lstStyle/>
+        <a:p>
+          <a:endParaRPr lang="en-US"/>
+        </a:p>
+      </dgm:t>
+    </dgm:pt>
+    <dgm:pt modelId="{EBD4532F-05B5-46F0-A7DF-DFB0AC919424}" type="sibTrans" cxnId="{39EF2E99-233A-4BBC-AC2C-C997B96F40AA}">
+      <dgm:prSet/>
+      <dgm:spPr/>
+      <dgm:t>
+        <a:bodyPr/>
+        <a:lstStyle/>
+        <a:p>
+          <a:endParaRPr lang="en-US"/>
+        </a:p>
+      </dgm:t>
+    </dgm:pt>
+    <dgm:pt modelId="{2F8AF2E5-A791-477C-9068-496783033EC5}">
+      <dgm:prSet/>
+      <dgm:spPr/>
+      <dgm:t>
+        <a:bodyPr/>
+        <a:lstStyle/>
+        <a:p>
+          <a:pPr>
+            <a:lnSpc>
+              <a:spcPct val="100000"/>
+            </a:lnSpc>
+          </a:pPr>
+          <a:r>
+            <a:rPr lang="en-US" dirty="0"/>
+            <a:t>We can’t tell the difference</a:t>
+          </a:r>
+        </a:p>
+      </dgm:t>
+    </dgm:pt>
+    <dgm:pt modelId="{F6938DE9-1CF1-484C-8B07-DD8A37BAD0FA}" type="parTrans" cxnId="{233C4AB8-64A8-4F7F-96D5-D6456ECA719E}">
+      <dgm:prSet/>
+      <dgm:spPr/>
+      <dgm:t>
+        <a:bodyPr/>
+        <a:lstStyle/>
+        <a:p>
+          <a:endParaRPr lang="en-US"/>
+        </a:p>
+      </dgm:t>
+    </dgm:pt>
+    <dgm:pt modelId="{1913032A-47D2-40FA-AED0-AC3340590451}" type="sibTrans" cxnId="{233C4AB8-64A8-4F7F-96D5-D6456ECA719E}">
+      <dgm:prSet/>
+      <dgm:spPr/>
+      <dgm:t>
+        <a:bodyPr/>
+        <a:lstStyle/>
+        <a:p>
+          <a:endParaRPr lang="en-US"/>
+        </a:p>
+      </dgm:t>
+    </dgm:pt>
+    <dgm:pt modelId="{5F5C79E4-4390-4D36-B1BA-62BACC4E32F1}">
+      <dgm:prSet/>
+      <dgm:spPr/>
+      <dgm:t>
+        <a:bodyPr/>
+        <a:lstStyle/>
+        <a:p>
+          <a:pPr>
+            <a:lnSpc>
+              <a:spcPct val="100000"/>
+            </a:lnSpc>
+          </a:pPr>
+          <a:r>
+            <a:rPr lang="en-US" dirty="0"/>
+            <a:t>Awareness to the rescue</a:t>
+          </a:r>
+        </a:p>
+      </dgm:t>
+    </dgm:pt>
+    <dgm:pt modelId="{77E3033B-C549-4EF5-9AC2-A646E5850C2A}" type="parTrans" cxnId="{045E136B-9EAE-495A-9EF0-AA71A7FB44F1}">
+      <dgm:prSet/>
+      <dgm:spPr/>
+      <dgm:t>
+        <a:bodyPr/>
+        <a:lstStyle/>
+        <a:p>
+          <a:endParaRPr lang="en-US"/>
+        </a:p>
+      </dgm:t>
+    </dgm:pt>
+    <dgm:pt modelId="{161100FC-5834-451E-BE73-E27EFD80F2BD}" type="sibTrans" cxnId="{045E136B-9EAE-495A-9EF0-AA71A7FB44F1}">
+      <dgm:prSet/>
+      <dgm:spPr/>
+      <dgm:t>
+        <a:bodyPr/>
+        <a:lstStyle/>
+        <a:p>
+          <a:endParaRPr lang="en-US"/>
+        </a:p>
+      </dgm:t>
+    </dgm:pt>
+    <dgm:pt modelId="{CE056D0A-D021-4E59-B5F6-64156AB53EA9}" type="pres">
+      <dgm:prSet presAssocID="{9A518FC5-22FB-4D91-8E2A-CC43A6038D63}" presName="root" presStyleCnt="0">
+        <dgm:presLayoutVars>
+          <dgm:dir/>
+          <dgm:resizeHandles val="exact"/>
+        </dgm:presLayoutVars>
+      </dgm:prSet>
+      <dgm:spPr/>
+    </dgm:pt>
+    <dgm:pt modelId="{AEB03E13-7A3E-4450-8149-96E0B8F0C476}" type="pres">
+      <dgm:prSet presAssocID="{BC931268-D017-4897-9057-F432516F7B3E}" presName="compNode" presStyleCnt="0"/>
+      <dgm:spPr/>
+    </dgm:pt>
+    <dgm:pt modelId="{E11A5DDC-ED3F-4BD3-8031-AE181CFACF30}" type="pres">
+      <dgm:prSet presAssocID="{BC931268-D017-4897-9057-F432516F7B3E}" presName="iconRect" presStyleLbl="node1" presStyleIdx="0" presStyleCnt="3"/>
+      <dgm:spPr>
+        <a:blipFill>
+          <a:blip xmlns:r="http://schemas.openxmlformats.org/officeDocument/2006/relationships" r:embed="rId1">
+            <a:extLst>
+              <a:ext uri="{28A0092B-C50C-407E-A947-70E740481C1C}">
+                <a14:useLocalDpi xmlns:a14="http://schemas.microsoft.com/office/drawing/2010/main" val="0"/>
+              </a:ext>
+              <a:ext uri="{96DAC541-7B7A-43D3-8B79-37D633B846F1}">
+                <asvg:svgBlip xmlns:asvg="http://schemas.microsoft.com/office/drawing/2016/SVG/main" r:embed="rId2"/>
+              </a:ext>
+            </a:extLst>
+          </a:blip>
+          <a:stretch>
+            <a:fillRect/>
+          </a:stretch>
+        </a:blipFill>
+        <a:ln>
+          <a:noFill/>
+        </a:ln>
+      </dgm:spPr>
+      <dgm:extLst>
+        <a:ext uri="{E40237B7-FDA0-4F09-8148-C483321AD2D9}">
+          <dgm14:cNvPr xmlns:dgm14="http://schemas.microsoft.com/office/drawing/2010/diagram" id="0" name="" descr="Construction Worker"/>
+        </a:ext>
+      </dgm:extLst>
+    </dgm:pt>
+    <dgm:pt modelId="{1AE4C3FF-59B9-4153-8AAD-0199F2B07F5D}" type="pres">
+      <dgm:prSet presAssocID="{BC931268-D017-4897-9057-F432516F7B3E}" presName="spaceRect" presStyleCnt="0"/>
+      <dgm:spPr/>
+    </dgm:pt>
+    <dgm:pt modelId="{1435892B-CD9E-4828-ABAD-C8E9B1B7E827}" type="pres">
+      <dgm:prSet presAssocID="{BC931268-D017-4897-9057-F432516F7B3E}" presName="textRect" presStyleLbl="revTx" presStyleIdx="0" presStyleCnt="3">
+        <dgm:presLayoutVars>
+          <dgm:chMax val="1"/>
+          <dgm:chPref val="1"/>
+        </dgm:presLayoutVars>
+      </dgm:prSet>
+      <dgm:spPr/>
+    </dgm:pt>
+    <dgm:pt modelId="{51E0792F-BFAB-4354-9B6E-029093B34B4B}" type="pres">
+      <dgm:prSet presAssocID="{EBD4532F-05B5-46F0-A7DF-DFB0AC919424}" presName="sibTrans" presStyleCnt="0"/>
+      <dgm:spPr/>
+    </dgm:pt>
+    <dgm:pt modelId="{6065EF87-2E16-44D6-8961-BF5D74C74962}" type="pres">
+      <dgm:prSet presAssocID="{2F8AF2E5-A791-477C-9068-496783033EC5}" presName="compNode" presStyleCnt="0"/>
+      <dgm:spPr/>
+    </dgm:pt>
+    <dgm:pt modelId="{5F23CDCE-7566-4B28-8BEC-DFB98DC757F2}" type="pres">
+      <dgm:prSet presAssocID="{2F8AF2E5-A791-477C-9068-496783033EC5}" presName="iconRect" presStyleLbl="node1" presStyleIdx="1" presStyleCnt="3"/>
+      <dgm:spPr>
+        <a:blipFill>
+          <a:blip xmlns:r="http://schemas.openxmlformats.org/officeDocument/2006/relationships" r:embed="rId3">
+            <a:extLst>
+              <a:ext uri="{28A0092B-C50C-407E-A947-70E740481C1C}">
+                <a14:useLocalDpi xmlns:a14="http://schemas.microsoft.com/office/drawing/2010/main" val="0"/>
+              </a:ext>
+              <a:ext uri="{96DAC541-7B7A-43D3-8B79-37D633B846F1}">
+                <asvg:svgBlip xmlns:asvg="http://schemas.microsoft.com/office/drawing/2016/SVG/main" r:embed="rId4"/>
+              </a:ext>
+            </a:extLst>
+          </a:blip>
+          <a:stretch>
+            <a:fillRect/>
+          </a:stretch>
+        </a:blipFill>
+        <a:ln>
+          <a:noFill/>
+        </a:ln>
+      </dgm:spPr>
+      <dgm:extLst>
+        <a:ext uri="{E40237B7-FDA0-4F09-8148-C483321AD2D9}">
+          <dgm14:cNvPr xmlns:dgm14="http://schemas.microsoft.com/office/drawing/2010/diagram" id="0" name="" descr="Questions"/>
+        </a:ext>
+      </dgm:extLst>
+    </dgm:pt>
+    <dgm:pt modelId="{47F6CC17-B541-4BB1-9444-6CE45BE649B1}" type="pres">
+      <dgm:prSet presAssocID="{2F8AF2E5-A791-477C-9068-496783033EC5}" presName="spaceRect" presStyleCnt="0"/>
+      <dgm:spPr/>
+    </dgm:pt>
+    <dgm:pt modelId="{95D281C7-2DE4-4E99-9294-7CA6A192C758}" type="pres">
+      <dgm:prSet presAssocID="{2F8AF2E5-A791-477C-9068-496783033EC5}" presName="textRect" presStyleLbl="revTx" presStyleIdx="1" presStyleCnt="3">
+        <dgm:presLayoutVars>
+          <dgm:chMax val="1"/>
+          <dgm:chPref val="1"/>
+        </dgm:presLayoutVars>
+      </dgm:prSet>
+      <dgm:spPr/>
+    </dgm:pt>
+    <dgm:pt modelId="{12A61E2B-AA15-4FBB-B150-544F65796443}" type="pres">
+      <dgm:prSet presAssocID="{1913032A-47D2-40FA-AED0-AC3340590451}" presName="sibTrans" presStyleCnt="0"/>
+      <dgm:spPr/>
+    </dgm:pt>
+    <dgm:pt modelId="{F382C1ED-47A6-47E1-A971-B66EDEBCE038}" type="pres">
+      <dgm:prSet presAssocID="{5F5C79E4-4390-4D36-B1BA-62BACC4E32F1}" presName="compNode" presStyleCnt="0"/>
+      <dgm:spPr/>
+    </dgm:pt>
+    <dgm:pt modelId="{51E105AA-D3E9-4174-BB07-442990278F26}" type="pres">
+      <dgm:prSet presAssocID="{5F5C79E4-4390-4D36-B1BA-62BACC4E32F1}" presName="iconRect" presStyleLbl="node1" presStyleIdx="2" presStyleCnt="3"/>
+      <dgm:spPr>
+        <a:blipFill>
+          <a:blip xmlns:r="http://schemas.openxmlformats.org/officeDocument/2006/relationships" r:embed="rId5">
+            <a:extLst>
+              <a:ext uri="{28A0092B-C50C-407E-A947-70E740481C1C}">
+                <a14:useLocalDpi xmlns:a14="http://schemas.microsoft.com/office/drawing/2010/main" val="0"/>
+              </a:ext>
+              <a:ext uri="{96DAC541-7B7A-43D3-8B79-37D633B846F1}">
+                <asvg:svgBlip xmlns:asvg="http://schemas.microsoft.com/office/drawing/2016/SVG/main" r:embed="rId6"/>
+              </a:ext>
+            </a:extLst>
+          </a:blip>
+          <a:stretch>
+            <a:fillRect/>
+          </a:stretch>
+        </a:blipFill>
+        <a:ln>
+          <a:noFill/>
+        </a:ln>
+      </dgm:spPr>
+      <dgm:extLst>
+        <a:ext uri="{E40237B7-FDA0-4F09-8148-C483321AD2D9}">
+          <dgm14:cNvPr xmlns:dgm14="http://schemas.microsoft.com/office/drawing/2010/diagram" id="0" name="" descr="Megaphone"/>
+        </a:ext>
+      </dgm:extLst>
+    </dgm:pt>
+    <dgm:pt modelId="{FD779E5F-DA83-42F5-B7F8-FC8CA5A70F09}" type="pres">
+      <dgm:prSet presAssocID="{5F5C79E4-4390-4D36-B1BA-62BACC4E32F1}" presName="spaceRect" presStyleCnt="0"/>
+      <dgm:spPr/>
+    </dgm:pt>
+    <dgm:pt modelId="{403C4CF9-F7FC-4D23-A850-F04E9C18B501}" type="pres">
+      <dgm:prSet presAssocID="{5F5C79E4-4390-4D36-B1BA-62BACC4E32F1}" presName="textRect" presStyleLbl="revTx" presStyleIdx="2" presStyleCnt="3">
+        <dgm:presLayoutVars>
+          <dgm:chMax val="1"/>
+          <dgm:chPref val="1"/>
+        </dgm:presLayoutVars>
+      </dgm:prSet>
+      <dgm:spPr/>
+    </dgm:pt>
+  </dgm:ptLst>
+  <dgm:cxnLst>
+    <dgm:cxn modelId="{726D0565-0749-40F1-A762-64B76F73D48E}" type="presOf" srcId="{BC931268-D017-4897-9057-F432516F7B3E}" destId="{1435892B-CD9E-4828-ABAD-C8E9B1B7E827}" srcOrd="0" destOrd="0" presId="urn:microsoft.com/office/officeart/2018/2/layout/IconLabelList"/>
+    <dgm:cxn modelId="{1FA7994A-5A82-4EE7-92DE-245ADB8B29CA}" type="presOf" srcId="{5F5C79E4-4390-4D36-B1BA-62BACC4E32F1}" destId="{403C4CF9-F7FC-4D23-A850-F04E9C18B501}" srcOrd="0" destOrd="0" presId="urn:microsoft.com/office/officeart/2018/2/layout/IconLabelList"/>
+    <dgm:cxn modelId="{045E136B-9EAE-495A-9EF0-AA71A7FB44F1}" srcId="{9A518FC5-22FB-4D91-8E2A-CC43A6038D63}" destId="{5F5C79E4-4390-4D36-B1BA-62BACC4E32F1}" srcOrd="2" destOrd="0" parTransId="{77E3033B-C549-4EF5-9AC2-A646E5850C2A}" sibTransId="{161100FC-5834-451E-BE73-E27EFD80F2BD}"/>
+    <dgm:cxn modelId="{05B54C98-DBEA-4D11-8D99-A08814E91907}" type="presOf" srcId="{9A518FC5-22FB-4D91-8E2A-CC43A6038D63}" destId="{CE056D0A-D021-4E59-B5F6-64156AB53EA9}" srcOrd="0" destOrd="0" presId="urn:microsoft.com/office/officeart/2018/2/layout/IconLabelList"/>
+    <dgm:cxn modelId="{39EF2E99-233A-4BBC-AC2C-C997B96F40AA}" srcId="{9A518FC5-22FB-4D91-8E2A-CC43A6038D63}" destId="{BC931268-D017-4897-9057-F432516F7B3E}" srcOrd="0" destOrd="0" parTransId="{C464CB59-AAAE-4A69-80DD-078FD6FA1A40}" sibTransId="{EBD4532F-05B5-46F0-A7DF-DFB0AC919424}"/>
+    <dgm:cxn modelId="{DB0A3899-877A-4522-B106-9B8787F61F1A}" type="presOf" srcId="{2F8AF2E5-A791-477C-9068-496783033EC5}" destId="{95D281C7-2DE4-4E99-9294-7CA6A192C758}" srcOrd="0" destOrd="0" presId="urn:microsoft.com/office/officeart/2018/2/layout/IconLabelList"/>
+    <dgm:cxn modelId="{233C4AB8-64A8-4F7F-96D5-D6456ECA719E}" srcId="{9A518FC5-22FB-4D91-8E2A-CC43A6038D63}" destId="{2F8AF2E5-A791-477C-9068-496783033EC5}" srcOrd="1" destOrd="0" parTransId="{F6938DE9-1CF1-484C-8B07-DD8A37BAD0FA}" sibTransId="{1913032A-47D2-40FA-AED0-AC3340590451}"/>
+    <dgm:cxn modelId="{DFF634D7-7457-452B-80AC-4B43B4530960}" type="presParOf" srcId="{CE056D0A-D021-4E59-B5F6-64156AB53EA9}" destId="{AEB03E13-7A3E-4450-8149-96E0B8F0C476}" srcOrd="0" destOrd="0" presId="urn:microsoft.com/office/officeart/2018/2/layout/IconLabelList"/>
+    <dgm:cxn modelId="{937C5E10-4E89-4331-A8D6-880FA81A71FC}" type="presParOf" srcId="{AEB03E13-7A3E-4450-8149-96E0B8F0C476}" destId="{E11A5DDC-ED3F-4BD3-8031-AE181CFACF30}" srcOrd="0" destOrd="0" presId="urn:microsoft.com/office/officeart/2018/2/layout/IconLabelList"/>
+    <dgm:cxn modelId="{081C4416-396A-47B9-8131-32567D7E99BC}" type="presParOf" srcId="{AEB03E13-7A3E-4450-8149-96E0B8F0C476}" destId="{1AE4C3FF-59B9-4153-8AAD-0199F2B07F5D}" srcOrd="1" destOrd="0" presId="urn:microsoft.com/office/officeart/2018/2/layout/IconLabelList"/>
+    <dgm:cxn modelId="{D794FDBF-4ACA-4581-89D2-2A3434A568EF}" type="presParOf" srcId="{AEB03E13-7A3E-4450-8149-96E0B8F0C476}" destId="{1435892B-CD9E-4828-ABAD-C8E9B1B7E827}" srcOrd="2" destOrd="0" presId="urn:microsoft.com/office/officeart/2018/2/layout/IconLabelList"/>
+    <dgm:cxn modelId="{5ADDEC04-4EF1-4CA6-9AE4-ABDA68736EE1}" type="presParOf" srcId="{CE056D0A-D021-4E59-B5F6-64156AB53EA9}" destId="{51E0792F-BFAB-4354-9B6E-029093B34B4B}" srcOrd="1" destOrd="0" presId="urn:microsoft.com/office/officeart/2018/2/layout/IconLabelList"/>
+    <dgm:cxn modelId="{23003D19-DD09-4C79-B1FC-ACD1D46F00D8}" type="presParOf" srcId="{CE056D0A-D021-4E59-B5F6-64156AB53EA9}" destId="{6065EF87-2E16-44D6-8961-BF5D74C74962}" srcOrd="2" destOrd="0" presId="urn:microsoft.com/office/officeart/2018/2/layout/IconLabelList"/>
+    <dgm:cxn modelId="{F2506000-D6BB-4328-AECC-A7D0026F6105}" type="presParOf" srcId="{6065EF87-2E16-44D6-8961-BF5D74C74962}" destId="{5F23CDCE-7566-4B28-8BEC-DFB98DC757F2}" srcOrd="0" destOrd="0" presId="urn:microsoft.com/office/officeart/2018/2/layout/IconLabelList"/>
+    <dgm:cxn modelId="{CF05B0B2-F551-48FB-874C-CEFAC4BB6E08}" type="presParOf" srcId="{6065EF87-2E16-44D6-8961-BF5D74C74962}" destId="{47F6CC17-B541-4BB1-9444-6CE45BE649B1}" srcOrd="1" destOrd="0" presId="urn:microsoft.com/office/officeart/2018/2/layout/IconLabelList"/>
+    <dgm:cxn modelId="{8609FDB6-2C35-4312-8BBF-38EBA5B255AE}" type="presParOf" srcId="{6065EF87-2E16-44D6-8961-BF5D74C74962}" destId="{95D281C7-2DE4-4E99-9294-7CA6A192C758}" srcOrd="2" destOrd="0" presId="urn:microsoft.com/office/officeart/2018/2/layout/IconLabelList"/>
+    <dgm:cxn modelId="{AABABBD2-BB91-4265-B6C7-72BB329A205E}" type="presParOf" srcId="{CE056D0A-D021-4E59-B5F6-64156AB53EA9}" destId="{12A61E2B-AA15-4FBB-B150-544F65796443}" srcOrd="3" destOrd="0" presId="urn:microsoft.com/office/officeart/2018/2/layout/IconLabelList"/>
+    <dgm:cxn modelId="{5F6FCD46-6A73-4D4B-AB96-8E2D101343E2}" type="presParOf" srcId="{CE056D0A-D021-4E59-B5F6-64156AB53EA9}" destId="{F382C1ED-47A6-47E1-A971-B66EDEBCE038}" srcOrd="4" destOrd="0" presId="urn:microsoft.com/office/officeart/2018/2/layout/IconLabelList"/>
+    <dgm:cxn modelId="{1B33BFE3-305E-48C3-BF54-D063A4B15647}" type="presParOf" srcId="{F382C1ED-47A6-47E1-A971-B66EDEBCE038}" destId="{51E105AA-D3E9-4174-BB07-442990278F26}" srcOrd="0" destOrd="0" presId="urn:microsoft.com/office/officeart/2018/2/layout/IconLabelList"/>
+    <dgm:cxn modelId="{5739AE07-BAE7-4E1C-878C-D4BAECE62BA6}" type="presParOf" srcId="{F382C1ED-47A6-47E1-A971-B66EDEBCE038}" destId="{FD779E5F-DA83-42F5-B7F8-FC8CA5A70F09}" srcOrd="1" destOrd="0" presId="urn:microsoft.com/office/officeart/2018/2/layout/IconLabelList"/>
+    <dgm:cxn modelId="{BC10E713-2200-493A-81DA-161E3A2B368A}" type="presParOf" srcId="{F382C1ED-47A6-47E1-A971-B66EDEBCE038}" destId="{403C4CF9-F7FC-4D23-A850-F04E9C18B501}" srcOrd="2" destOrd="0" presId="urn:microsoft.com/office/officeart/2018/2/layout/IconLabelList"/>
+  </dgm:cxnLst>
+  <dgm:bg/>
+  <dgm:whole/>
+  <dgm:extLst>
+    <a:ext uri="http://schemas.microsoft.com/office/drawing/2008/diagram">
+      <dsp:dataModelExt xmlns:dsp="http://schemas.microsoft.com/office/drawing/2008/diagram" relId="rId7" minVer="http://schemas.openxmlformats.org/drawingml/2006/diagram"/>
+    </a:ext>
+  </dgm:extLst>
+</dgm:dataModel>
+</file>
+
 <file path=ppt/diagrams/drawing1.xml><?xml version="1.0" encoding="utf-8"?>
 <dsp:drawing xmlns:dgm="http://schemas.openxmlformats.org/drawingml/2006/diagram" xmlns:dsp="http://schemas.microsoft.com/office/drawing/2008/diagram" xmlns:a="http://schemas.openxmlformats.org/drawingml/2006/main">
   <dsp:spTree>
@@ -2582,6 +3829,345 @@
       <dsp:txXfrm>
         <a:off x="749727" y="4058492"/>
         <a:ext cx="6262642" cy="649115"/>
+      </dsp:txXfrm>
+    </dsp:sp>
+  </dsp:spTree>
+</dsp:drawing>
+</file>
+
+<file path=ppt/diagrams/drawing2.xml><?xml version="1.0" encoding="utf-8"?>
+<dsp:drawing xmlns:dgm="http://schemas.openxmlformats.org/drawingml/2006/diagram" xmlns:dsp="http://schemas.microsoft.com/office/drawing/2008/diagram" xmlns:a="http://schemas.openxmlformats.org/drawingml/2006/main">
+  <dsp:spTree>
+    <dsp:nvGrpSpPr>
+      <dsp:cNvPr id="0" name=""/>
+      <dsp:cNvGrpSpPr/>
+    </dsp:nvGrpSpPr>
+    <dsp:grpSpPr/>
+    <dsp:sp modelId="{E11A5DDC-ED3F-4BD3-8031-AE181CFACF30}">
+      <dsp:nvSpPr>
+        <dsp:cNvPr id="0" name=""/>
+        <dsp:cNvSpPr/>
+      </dsp:nvSpPr>
+      <dsp:spPr>
+        <a:xfrm>
+          <a:off x="975923" y="535138"/>
+          <a:ext cx="1458980" cy="1458980"/>
+        </a:xfrm>
+        <a:prstGeom prst="rect">
+          <a:avLst/>
+        </a:prstGeom>
+        <a:blipFill>
+          <a:blip xmlns:r="http://schemas.openxmlformats.org/officeDocument/2006/relationships" r:embed="rId1">
+            <a:extLst>
+              <a:ext uri="{28A0092B-C50C-407E-A947-70E740481C1C}">
+                <a14:useLocalDpi xmlns:a14="http://schemas.microsoft.com/office/drawing/2010/main" val="0"/>
+              </a:ext>
+              <a:ext uri="{96DAC541-7B7A-43D3-8B79-37D633B846F1}">
+                <asvg:svgBlip xmlns:asvg="http://schemas.microsoft.com/office/drawing/2016/SVG/main" r:embed="rId2"/>
+              </a:ext>
+            </a:extLst>
+          </a:blip>
+          <a:stretch>
+            <a:fillRect/>
+          </a:stretch>
+        </a:blipFill>
+        <a:ln w="22225" cap="rnd" cmpd="sng" algn="ctr">
+          <a:noFill/>
+          <a:prstDash val="solid"/>
+        </a:ln>
+        <a:effectLst/>
+      </dsp:spPr>
+      <dsp:style>
+        <a:lnRef idx="2">
+          <a:scrgbClr r="0" g="0" b="0"/>
+        </a:lnRef>
+        <a:fillRef idx="1">
+          <a:scrgbClr r="0" g="0" b="0"/>
+        </a:fillRef>
+        <a:effectRef idx="0">
+          <a:scrgbClr r="0" g="0" b="0"/>
+        </a:effectRef>
+        <a:fontRef idx="minor">
+          <a:schemeClr val="lt1"/>
+        </a:fontRef>
+      </dsp:style>
+    </dsp:sp>
+    <dsp:sp modelId="{1435892B-CD9E-4828-ABAD-C8E9B1B7E827}">
+      <dsp:nvSpPr>
+        <dsp:cNvPr id="0" name=""/>
+        <dsp:cNvSpPr/>
+      </dsp:nvSpPr>
+      <dsp:spPr>
+        <a:xfrm>
+          <a:off x="84324" y="2378648"/>
+          <a:ext cx="3242179" cy="720000"/>
+        </a:xfrm>
+        <a:prstGeom prst="rect">
+          <a:avLst/>
+        </a:prstGeom>
+        <a:noFill/>
+        <a:ln>
+          <a:noFill/>
+        </a:ln>
+        <a:effectLst/>
+      </dsp:spPr>
+      <dsp:style>
+        <a:lnRef idx="0">
+          <a:scrgbClr r="0" g="0" b="0"/>
+        </a:lnRef>
+        <a:fillRef idx="0">
+          <a:scrgbClr r="0" g="0" b="0"/>
+        </a:fillRef>
+        <a:effectRef idx="0">
+          <a:scrgbClr r="0" g="0" b="0"/>
+        </a:effectRef>
+        <a:fontRef idx="minor"/>
+      </dsp:style>
+      <dsp:txBody>
+        <a:bodyPr spcFirstLastPara="0" vert="horz" wrap="square" lIns="0" tIns="0" rIns="0" bIns="0" numCol="1" spcCol="1270" anchor="t" anchorCtr="0">
+          <a:noAutofit/>
+        </a:bodyPr>
+        <a:lstStyle/>
+        <a:p>
+          <a:pPr marL="0" lvl="0" indent="0" algn="ctr" defTabSz="1111250">
+            <a:lnSpc>
+              <a:spcPct val="100000"/>
+            </a:lnSpc>
+            <a:spcBef>
+              <a:spcPct val="0"/>
+            </a:spcBef>
+            <a:spcAft>
+              <a:spcPct val="35000"/>
+            </a:spcAft>
+            <a:buNone/>
+          </a:pPr>
+          <a:r>
+            <a:rPr lang="en-US" sz="2500" kern="1200" dirty="0"/>
+            <a:t>They just work</a:t>
+          </a:r>
+        </a:p>
+      </dsp:txBody>
+      <dsp:txXfrm>
+        <a:off x="84324" y="2378648"/>
+        <a:ext cx="3242179" cy="720000"/>
+      </dsp:txXfrm>
+    </dsp:sp>
+    <dsp:sp modelId="{5F23CDCE-7566-4B28-8BEC-DFB98DC757F2}">
+      <dsp:nvSpPr>
+        <dsp:cNvPr id="0" name=""/>
+        <dsp:cNvSpPr/>
+      </dsp:nvSpPr>
+      <dsp:spPr>
+        <a:xfrm>
+          <a:off x="4785484" y="535138"/>
+          <a:ext cx="1458980" cy="1458980"/>
+        </a:xfrm>
+        <a:prstGeom prst="rect">
+          <a:avLst/>
+        </a:prstGeom>
+        <a:blipFill>
+          <a:blip xmlns:r="http://schemas.openxmlformats.org/officeDocument/2006/relationships" r:embed="rId3">
+            <a:extLst>
+              <a:ext uri="{28A0092B-C50C-407E-A947-70E740481C1C}">
+                <a14:useLocalDpi xmlns:a14="http://schemas.microsoft.com/office/drawing/2010/main" val="0"/>
+              </a:ext>
+              <a:ext uri="{96DAC541-7B7A-43D3-8B79-37D633B846F1}">
+                <asvg:svgBlip xmlns:asvg="http://schemas.microsoft.com/office/drawing/2016/SVG/main" r:embed="rId4"/>
+              </a:ext>
+            </a:extLst>
+          </a:blip>
+          <a:stretch>
+            <a:fillRect/>
+          </a:stretch>
+        </a:blipFill>
+        <a:ln w="22225" cap="rnd" cmpd="sng" algn="ctr">
+          <a:noFill/>
+          <a:prstDash val="solid"/>
+        </a:ln>
+        <a:effectLst/>
+      </dsp:spPr>
+      <dsp:style>
+        <a:lnRef idx="2">
+          <a:scrgbClr r="0" g="0" b="0"/>
+        </a:lnRef>
+        <a:fillRef idx="1">
+          <a:scrgbClr r="0" g="0" b="0"/>
+        </a:fillRef>
+        <a:effectRef idx="0">
+          <a:scrgbClr r="0" g="0" b="0"/>
+        </a:effectRef>
+        <a:fontRef idx="minor">
+          <a:schemeClr val="lt1"/>
+        </a:fontRef>
+      </dsp:style>
+    </dsp:sp>
+    <dsp:sp modelId="{95D281C7-2DE4-4E99-9294-7CA6A192C758}">
+      <dsp:nvSpPr>
+        <dsp:cNvPr id="0" name=""/>
+        <dsp:cNvSpPr/>
+      </dsp:nvSpPr>
+      <dsp:spPr>
+        <a:xfrm>
+          <a:off x="3893885" y="2378648"/>
+          <a:ext cx="3242179" cy="720000"/>
+        </a:xfrm>
+        <a:prstGeom prst="rect">
+          <a:avLst/>
+        </a:prstGeom>
+        <a:noFill/>
+        <a:ln>
+          <a:noFill/>
+        </a:ln>
+        <a:effectLst/>
+      </dsp:spPr>
+      <dsp:style>
+        <a:lnRef idx="0">
+          <a:scrgbClr r="0" g="0" b="0"/>
+        </a:lnRef>
+        <a:fillRef idx="0">
+          <a:scrgbClr r="0" g="0" b="0"/>
+        </a:fillRef>
+        <a:effectRef idx="0">
+          <a:scrgbClr r="0" g="0" b="0"/>
+        </a:effectRef>
+        <a:fontRef idx="minor"/>
+      </dsp:style>
+      <dsp:txBody>
+        <a:bodyPr spcFirstLastPara="0" vert="horz" wrap="square" lIns="0" tIns="0" rIns="0" bIns="0" numCol="1" spcCol="1270" anchor="t" anchorCtr="0">
+          <a:noAutofit/>
+        </a:bodyPr>
+        <a:lstStyle/>
+        <a:p>
+          <a:pPr marL="0" lvl="0" indent="0" algn="ctr" defTabSz="1111250">
+            <a:lnSpc>
+              <a:spcPct val="100000"/>
+            </a:lnSpc>
+            <a:spcBef>
+              <a:spcPct val="0"/>
+            </a:spcBef>
+            <a:spcAft>
+              <a:spcPct val="35000"/>
+            </a:spcAft>
+            <a:buNone/>
+          </a:pPr>
+          <a:r>
+            <a:rPr lang="en-US" sz="2500" kern="1200" dirty="0"/>
+            <a:t>We can’t tell the difference</a:t>
+          </a:r>
+        </a:p>
+      </dsp:txBody>
+      <dsp:txXfrm>
+        <a:off x="3893885" y="2378648"/>
+        <a:ext cx="3242179" cy="720000"/>
+      </dsp:txXfrm>
+    </dsp:sp>
+    <dsp:sp modelId="{51E105AA-D3E9-4174-BB07-442990278F26}">
+      <dsp:nvSpPr>
+        <dsp:cNvPr id="0" name=""/>
+        <dsp:cNvSpPr/>
+      </dsp:nvSpPr>
+      <dsp:spPr>
+        <a:xfrm>
+          <a:off x="8595045" y="535138"/>
+          <a:ext cx="1458980" cy="1458980"/>
+        </a:xfrm>
+        <a:prstGeom prst="rect">
+          <a:avLst/>
+        </a:prstGeom>
+        <a:blipFill>
+          <a:blip xmlns:r="http://schemas.openxmlformats.org/officeDocument/2006/relationships" r:embed="rId5">
+            <a:extLst>
+              <a:ext uri="{28A0092B-C50C-407E-A947-70E740481C1C}">
+                <a14:useLocalDpi xmlns:a14="http://schemas.microsoft.com/office/drawing/2010/main" val="0"/>
+              </a:ext>
+              <a:ext uri="{96DAC541-7B7A-43D3-8B79-37D633B846F1}">
+                <asvg:svgBlip xmlns:asvg="http://schemas.microsoft.com/office/drawing/2016/SVG/main" r:embed="rId6"/>
+              </a:ext>
+            </a:extLst>
+          </a:blip>
+          <a:stretch>
+            <a:fillRect/>
+          </a:stretch>
+        </a:blipFill>
+        <a:ln w="22225" cap="rnd" cmpd="sng" algn="ctr">
+          <a:noFill/>
+          <a:prstDash val="solid"/>
+        </a:ln>
+        <a:effectLst/>
+      </dsp:spPr>
+      <dsp:style>
+        <a:lnRef idx="2">
+          <a:scrgbClr r="0" g="0" b="0"/>
+        </a:lnRef>
+        <a:fillRef idx="1">
+          <a:scrgbClr r="0" g="0" b="0"/>
+        </a:fillRef>
+        <a:effectRef idx="0">
+          <a:scrgbClr r="0" g="0" b="0"/>
+        </a:effectRef>
+        <a:fontRef idx="minor">
+          <a:schemeClr val="lt1"/>
+        </a:fontRef>
+      </dsp:style>
+    </dsp:sp>
+    <dsp:sp modelId="{403C4CF9-F7FC-4D23-A850-F04E9C18B501}">
+      <dsp:nvSpPr>
+        <dsp:cNvPr id="0" name=""/>
+        <dsp:cNvSpPr/>
+      </dsp:nvSpPr>
+      <dsp:spPr>
+        <a:xfrm>
+          <a:off x="7703446" y="2378648"/>
+          <a:ext cx="3242179" cy="720000"/>
+        </a:xfrm>
+        <a:prstGeom prst="rect">
+          <a:avLst/>
+        </a:prstGeom>
+        <a:noFill/>
+        <a:ln>
+          <a:noFill/>
+        </a:ln>
+        <a:effectLst/>
+      </dsp:spPr>
+      <dsp:style>
+        <a:lnRef idx="0">
+          <a:scrgbClr r="0" g="0" b="0"/>
+        </a:lnRef>
+        <a:fillRef idx="0">
+          <a:scrgbClr r="0" g="0" b="0"/>
+        </a:fillRef>
+        <a:effectRef idx="0">
+          <a:scrgbClr r="0" g="0" b="0"/>
+        </a:effectRef>
+        <a:fontRef idx="minor"/>
+      </dsp:style>
+      <dsp:txBody>
+        <a:bodyPr spcFirstLastPara="0" vert="horz" wrap="square" lIns="0" tIns="0" rIns="0" bIns="0" numCol="1" spcCol="1270" anchor="t" anchorCtr="0">
+          <a:noAutofit/>
+        </a:bodyPr>
+        <a:lstStyle/>
+        <a:p>
+          <a:pPr marL="0" lvl="0" indent="0" algn="ctr" defTabSz="1111250">
+            <a:lnSpc>
+              <a:spcPct val="100000"/>
+            </a:lnSpc>
+            <a:spcBef>
+              <a:spcPct val="0"/>
+            </a:spcBef>
+            <a:spcAft>
+              <a:spcPct val="35000"/>
+            </a:spcAft>
+            <a:buNone/>
+          </a:pPr>
+          <a:r>
+            <a:rPr lang="en-US" sz="2500" kern="1200" dirty="0"/>
+            <a:t>Awareness to the rescue</a:t>
+          </a:r>
+        </a:p>
+      </dsp:txBody>
+      <dsp:txXfrm>
+        <a:off x="7703446" y="2378648"/>
+        <a:ext cx="3242179" cy="720000"/>
       </dsp:txXfrm>
     </dsp:sp>
   </dsp:spTree>
@@ -2882,6 +4468,196 @@
 </dgm:layoutDef>
 </file>
 
+<file path=ppt/diagrams/layout2.xml><?xml version="1.0" encoding="utf-8"?>
+<dgm:layoutDef xmlns:dgm="http://schemas.openxmlformats.org/drawingml/2006/diagram" xmlns:a="http://schemas.openxmlformats.org/drawingml/2006/main" uniqueId="urn:microsoft.com/office/officeart/2018/2/layout/IconLabelList">
+  <dgm:title val="Icon Label List"/>
+  <dgm:desc val="Use to show non-sequential or grouped chunks of information accompanied by a related visuals. Works best with icons or small pictures with short text captions."/>
+  <dgm:catLst>
+    <dgm:cat type="icon" pri="500"/>
+  </dgm:catLst>
+  <dgm:sampData useDef="1">
+    <dgm:dataModel>
+      <dgm:ptLst/>
+      <dgm:bg/>
+      <dgm:whole/>
+    </dgm:dataModel>
+  </dgm:sampData>
+  <dgm:styleData useDef="1">
+    <dgm:dataModel>
+      <dgm:ptLst/>
+      <dgm:bg/>
+      <dgm:whole/>
+    </dgm:dataModel>
+  </dgm:styleData>
+  <dgm:clrData useDef="1">
+    <dgm:dataModel>
+      <dgm:ptLst/>
+      <dgm:bg/>
+      <dgm:whole/>
+    </dgm:dataModel>
+  </dgm:clrData>
+  <dgm:layoutNode name="root">
+    <dgm:varLst>
+      <dgm:dir/>
+      <dgm:resizeHandles val="exact"/>
+    </dgm:varLst>
+    <dgm:choose name="Name0">
+      <dgm:if name="Name1" axis="self" func="var" arg="dir" op="equ" val="norm">
+        <dgm:alg type="snake">
+          <dgm:param type="grDir" val="tL"/>
+          <dgm:param type="flowDir" val="row"/>
+          <dgm:param type="contDir" val="sameDir"/>
+          <dgm:param type="off" val="ctr"/>
+          <dgm:param type="vertAlign" val="mid"/>
+          <dgm:param type="horzAlign" val="ctr"/>
+        </dgm:alg>
+      </dgm:if>
+      <dgm:else name="Name2">
+        <dgm:alg type="snake">
+          <dgm:param type="grDir" val="tR"/>
+          <dgm:param type="flowDir" val="row"/>
+          <dgm:param type="contDir" val="sameDir"/>
+          <dgm:param type="off" val="ctr"/>
+          <dgm:param type="vertAlign" val="mid"/>
+          <dgm:param type="horzAlign" val="ctr"/>
+        </dgm:alg>
+      </dgm:else>
+    </dgm:choose>
+    <dgm:shape xmlns:r="http://schemas.openxmlformats.org/officeDocument/2006/relationships" r:blip="">
+      <dgm:adjLst/>
+    </dgm:shape>
+    <dgm:presOf/>
+    <dgm:choose name="Name3">
+      <dgm:if name="Name4" axis="ch" ptType="node" func="cnt" op="lte" val="2">
+        <dgm:constrLst>
+          <dgm:constr type="h" for="ch" forName="compNode" refType="h" fact="0.4"/>
+          <dgm:constr type="w" for="ch" forName="compNode" val="120"/>
+          <dgm:constr type="w" for="ch" forName="sibTrans" refType="w" refFor="ch" refForName="compNode" fact="0.175"/>
+          <dgm:constr type="sp" refType="w" refFor="ch" refForName="compNode" op="equ" fact="0.25"/>
+          <dgm:constr type="primFontSz" for="des" ptType="node" op="equ" val="50"/>
+          <dgm:constr type="h" for="des" forName="compNode" op="equ"/>
+          <dgm:constr type="h" for="des" forName="textRect" op="equ"/>
+        </dgm:constrLst>
+      </dgm:if>
+      <dgm:if name="Name5" axis="ch" ptType="node" func="cnt" op="lte" val="4">
+        <dgm:constrLst>
+          <dgm:constr type="h" for="ch" forName="compNode" refType="h" fact="0.4"/>
+          <dgm:constr type="w" for="ch" forName="compNode" refType="w"/>
+          <dgm:constr type="w" for="ch" forName="sibTrans" refType="w" refFor="ch" refForName="compNode" fact="0.175"/>
+          <dgm:constr type="sp" refType="w" refFor="ch" refForName="compNode" op="equ" fact="0.25"/>
+          <dgm:constr type="primFontSz" for="des" ptType="node" op="equ" val="36"/>
+          <dgm:constr type="h" for="des" forName="compNode" op="equ"/>
+          <dgm:constr type="h" for="des" forName="textRect" op="equ"/>
+        </dgm:constrLst>
+      </dgm:if>
+      <dgm:else name="Name6">
+        <dgm:constrLst>
+          <dgm:constr type="h" for="ch" forName="compNode" refType="h" fact="0.4"/>
+          <dgm:constr type="w" for="ch" forName="compNode" refType="w"/>
+          <dgm:constr type="w" for="ch" forName="sibTrans" refType="w" refFor="ch" refForName="compNode" fact="0.175"/>
+          <dgm:constr type="sp" refType="w" refFor="ch" refForName="compNode" op="equ" fact="0.25"/>
+          <dgm:constr type="primFontSz" for="des" ptType="node" op="equ" val="24"/>
+          <dgm:constr type="h" for="des" forName="compNode" op="equ"/>
+          <dgm:constr type="h" for="des" forName="textRect" op="equ"/>
+        </dgm:constrLst>
+      </dgm:else>
+    </dgm:choose>
+    <dgm:ruleLst>
+      <dgm:rule type="w" for="ch" forName="compNode" val="50" fact="NaN" max="NaN"/>
+    </dgm:ruleLst>
+    <dgm:forEach name="Name7" axis="ch" ptType="node">
+      <dgm:layoutNode name="compNode">
+        <dgm:alg type="composite"/>
+        <dgm:shape xmlns:r="http://schemas.openxmlformats.org/officeDocument/2006/relationships" r:blip="">
+          <dgm:adjLst/>
+        </dgm:shape>
+        <dgm:presOf axis="self"/>
+        <dgm:constrLst>
+          <dgm:constr type="w" for="ch" forName="iconRect" refType="w" fact="0.45"/>
+          <dgm:constr type="h" for="ch" forName="iconRect" refType="w" refFor="ch" refForName="iconRect"/>
+          <dgm:constr type="ctrX" for="ch" forName="iconRect" refType="w" fact="0.5"/>
+          <dgm:constr type="t" for="ch" forName="iconRect"/>
+          <dgm:constr type="h" for="ch" forName="spaceRect" refType="h" fact="0.15"/>
+          <dgm:constr type="w" for="ch" forName="spaceRect" refType="w"/>
+          <dgm:constr type="l" for="ch" forName="spaceRect"/>
+          <dgm:constr type="t" for="ch" forName="spaceRect" refType="b" refFor="ch" refForName="iconRect"/>
+          <dgm:constr type="h" for="ch" forName="textRect" val="20"/>
+          <dgm:constr type="w" for="ch" forName="textRect" refType="w"/>
+          <dgm:constr type="l" for="ch" forName="textRect"/>
+          <dgm:constr type="t" for="ch" forName="textRect" refType="b" refFor="ch" refForName="spaceRect"/>
+        </dgm:constrLst>
+        <dgm:ruleLst>
+          <dgm:rule type="h" val="INF" fact="NaN" max="NaN"/>
+        </dgm:ruleLst>
+        <dgm:layoutNode name="iconRect" styleLbl="node1">
+          <dgm:alg type="sp"/>
+          <dgm:shape xmlns:r="http://schemas.openxmlformats.org/officeDocument/2006/relationships" type="rect" r:blip="" blipPhldr="1">
+            <dgm:adjLst/>
+          </dgm:shape>
+          <dgm:presOf/>
+          <dgm:constrLst/>
+          <dgm:ruleLst/>
+        </dgm:layoutNode>
+        <dgm:layoutNode name="spaceRect">
+          <dgm:alg type="sp"/>
+          <dgm:shape xmlns:r="http://schemas.openxmlformats.org/officeDocument/2006/relationships" r:blip="">
+            <dgm:adjLst/>
+          </dgm:shape>
+          <dgm:presOf/>
+          <dgm:constrLst/>
+          <dgm:ruleLst/>
+        </dgm:layoutNode>
+        <dgm:layoutNode name="textRect" styleLbl="revTx">
+          <dgm:varLst>
+            <dgm:chMax val="1"/>
+            <dgm:chPref val="1"/>
+          </dgm:varLst>
+          <dgm:alg type="tx">
+            <dgm:param type="txAnchorVert" val="t"/>
+          </dgm:alg>
+          <dgm:shape xmlns:r="http://schemas.openxmlformats.org/officeDocument/2006/relationships" type="rect" r:blip="">
+            <dgm:adjLst/>
+          </dgm:shape>
+          <dgm:presOf axis="self" ptType="node"/>
+          <dgm:constrLst>
+            <dgm:constr type="lMarg"/>
+            <dgm:constr type="rMarg"/>
+            <dgm:constr type="tMarg"/>
+            <dgm:constr type="bMarg"/>
+          </dgm:constrLst>
+          <dgm:ruleLst>
+            <dgm:rule type="primFontSz" val="11" fact="NaN" max="NaN"/>
+            <dgm:rule type="h" val="INF" fact="NaN" max="NaN"/>
+          </dgm:ruleLst>
+        </dgm:layoutNode>
+      </dgm:layoutNode>
+      <dgm:forEach name="Name8" axis="followSib" ptType="sibTrans" cnt="1">
+        <dgm:layoutNode name="sibTrans">
+          <dgm:alg type="sp"/>
+          <dgm:shape xmlns:r="http://schemas.openxmlformats.org/officeDocument/2006/relationships" r:blip="">
+            <dgm:adjLst/>
+          </dgm:shape>
+          <dgm:presOf axis="self"/>
+          <dgm:constrLst/>
+          <dgm:ruleLst/>
+        </dgm:layoutNode>
+      </dgm:forEach>
+    </dgm:forEach>
+  </dgm:layoutNode>
+  <dgm:extLst>
+    <a:ext uri="{68A01E43-0DF5-4B5B-8FA6-DAF915123BFB}">
+      <dgm1612:lstStyle xmlns:dgm1612="http://schemas.microsoft.com/office/drawing/2016/12/diagram">
+        <a:lvl1pPr>
+          <a:lnSpc>
+            <a:spcPct val="100000"/>
+          </a:lnSpc>
+        </a:lvl1pPr>
+      </dgm1612:lstStyle>
+    </a:ext>
+  </dgm:extLst>
+</dgm:layoutDef>
+</file>
+
 <file path=ppt/diagrams/quickStyle1.xml><?xml version="1.0" encoding="utf-8"?>
 <dgm:styleDef xmlns:dgm="http://schemas.openxmlformats.org/drawingml/2006/diagram" xmlns:a="http://schemas.openxmlformats.org/drawingml/2006/main" uniqueId="urn:microsoft.com/office/officeart/2005/8/quickstyle/simple1">
   <dgm:title val=""/>
@@ -3914,6 +5690,1588 @@
     </dgm:style>
   </dgm:styleLbl>
 </dgm:styleDef>
+</file>
+
+<file path=ppt/diagrams/quickStyle2.xml><?xml version="1.0" encoding="utf-8"?>
+<dgm:styleDef xmlns:dgm="http://schemas.openxmlformats.org/drawingml/2006/diagram" xmlns:a="http://schemas.openxmlformats.org/drawingml/2006/main" uniqueId="urn:microsoft.com/office/officeart/2005/8/quickstyle/simple1">
+  <dgm:title val=""/>
+  <dgm:desc val=""/>
+  <dgm:catLst>
+    <dgm:cat type="simple" pri="10100"/>
+  </dgm:catLst>
+  <dgm:scene3d>
+    <a:camera prst="orthographicFront"/>
+    <a:lightRig rig="threePt" dir="t"/>
+  </dgm:scene3d>
+  <dgm:styleLbl name="node0">
+    <dgm:scene3d>
+      <a:camera prst="orthographicFront"/>
+      <a:lightRig rig="threePt" dir="t"/>
+    </dgm:scene3d>
+    <dgm:sp3d/>
+    <dgm:txPr/>
+    <dgm:style>
+      <a:lnRef idx="2">
+        <a:scrgbClr r="0" g="0" b="0"/>
+      </a:lnRef>
+      <a:fillRef idx="1">
+        <a:scrgbClr r="0" g="0" b="0"/>
+      </a:fillRef>
+      <a:effectRef idx="0">
+        <a:scrgbClr r="0" g="0" b="0"/>
+      </a:effectRef>
+      <a:fontRef idx="minor">
+        <a:schemeClr val="lt1"/>
+      </a:fontRef>
+    </dgm:style>
+  </dgm:styleLbl>
+  <dgm:styleLbl name="lnNode1">
+    <dgm:scene3d>
+      <a:camera prst="orthographicFront"/>
+      <a:lightRig rig="threePt" dir="t"/>
+    </dgm:scene3d>
+    <dgm:sp3d/>
+    <dgm:txPr/>
+    <dgm:style>
+      <a:lnRef idx="2">
+        <a:scrgbClr r="0" g="0" b="0"/>
+      </a:lnRef>
+      <a:fillRef idx="1">
+        <a:scrgbClr r="0" g="0" b="0"/>
+      </a:fillRef>
+      <a:effectRef idx="0">
+        <a:scrgbClr r="0" g="0" b="0"/>
+      </a:effectRef>
+      <a:fontRef idx="minor">
+        <a:schemeClr val="lt1"/>
+      </a:fontRef>
+    </dgm:style>
+  </dgm:styleLbl>
+  <dgm:styleLbl name="vennNode1">
+    <dgm:scene3d>
+      <a:camera prst="orthographicFront"/>
+      <a:lightRig rig="threePt" dir="t"/>
+    </dgm:scene3d>
+    <dgm:sp3d/>
+    <dgm:txPr/>
+    <dgm:style>
+      <a:lnRef idx="2">
+        <a:scrgbClr r="0" g="0" b="0"/>
+      </a:lnRef>
+      <a:fillRef idx="1">
+        <a:scrgbClr r="0" g="0" b="0"/>
+      </a:fillRef>
+      <a:effectRef idx="0">
+        <a:scrgbClr r="0" g="0" b="0"/>
+      </a:effectRef>
+      <a:fontRef idx="minor">
+        <a:schemeClr val="tx1"/>
+      </a:fontRef>
+    </dgm:style>
+  </dgm:styleLbl>
+  <dgm:styleLbl name="alignNode1">
+    <dgm:scene3d>
+      <a:camera prst="orthographicFront"/>
+      <a:lightRig rig="threePt" dir="t"/>
+    </dgm:scene3d>
+    <dgm:sp3d/>
+    <dgm:txPr/>
+    <dgm:style>
+      <a:lnRef idx="2">
+        <a:scrgbClr r="0" g="0" b="0"/>
+      </a:lnRef>
+      <a:fillRef idx="1">
+        <a:scrgbClr r="0" g="0" b="0"/>
+      </a:fillRef>
+      <a:effectRef idx="0">
+        <a:scrgbClr r="0" g="0" b="0"/>
+      </a:effectRef>
+      <a:fontRef idx="minor">
+        <a:schemeClr val="lt1"/>
+      </a:fontRef>
+    </dgm:style>
+  </dgm:styleLbl>
+  <dgm:styleLbl name="node1">
+    <dgm:scene3d>
+      <a:camera prst="orthographicFront"/>
+      <a:lightRig rig="threePt" dir="t"/>
+    </dgm:scene3d>
+    <dgm:sp3d/>
+    <dgm:txPr/>
+    <dgm:style>
+      <a:lnRef idx="2">
+        <a:scrgbClr r="0" g="0" b="0"/>
+      </a:lnRef>
+      <a:fillRef idx="1">
+        <a:scrgbClr r="0" g="0" b="0"/>
+      </a:fillRef>
+      <a:effectRef idx="0">
+        <a:scrgbClr r="0" g="0" b="0"/>
+      </a:effectRef>
+      <a:fontRef idx="minor">
+        <a:schemeClr val="lt1"/>
+      </a:fontRef>
+    </dgm:style>
+  </dgm:styleLbl>
+  <dgm:styleLbl name="node2">
+    <dgm:scene3d>
+      <a:camera prst="orthographicFront"/>
+      <a:lightRig rig="threePt" dir="t"/>
+    </dgm:scene3d>
+    <dgm:sp3d/>
+    <dgm:txPr/>
+    <dgm:style>
+      <a:lnRef idx="2">
+        <a:scrgbClr r="0" g="0" b="0"/>
+      </a:lnRef>
+      <a:fillRef idx="1">
+        <a:scrgbClr r="0" g="0" b="0"/>
+      </a:fillRef>
+      <a:effectRef idx="0">
+        <a:scrgbClr r="0" g="0" b="0"/>
+      </a:effectRef>
+      <a:fontRef idx="minor">
+        <a:schemeClr val="lt1"/>
+      </a:fontRef>
+    </dgm:style>
+  </dgm:styleLbl>
+  <dgm:styleLbl name="node3">
+    <dgm:scene3d>
+      <a:camera prst="orthographicFront"/>
+      <a:lightRig rig="threePt" dir="t"/>
+    </dgm:scene3d>
+    <dgm:sp3d/>
+    <dgm:txPr/>
+    <dgm:style>
+      <a:lnRef idx="2">
+        <a:scrgbClr r="0" g="0" b="0"/>
+      </a:lnRef>
+      <a:fillRef idx="1">
+        <a:scrgbClr r="0" g="0" b="0"/>
+      </a:fillRef>
+      <a:effectRef idx="0">
+        <a:scrgbClr r="0" g="0" b="0"/>
+      </a:effectRef>
+      <a:fontRef idx="minor">
+        <a:schemeClr val="lt1"/>
+      </a:fontRef>
+    </dgm:style>
+  </dgm:styleLbl>
+  <dgm:styleLbl name="node4">
+    <dgm:scene3d>
+      <a:camera prst="orthographicFront"/>
+      <a:lightRig rig="threePt" dir="t"/>
+    </dgm:scene3d>
+    <dgm:sp3d/>
+    <dgm:txPr/>
+    <dgm:style>
+      <a:lnRef idx="2">
+        <a:scrgbClr r="0" g="0" b="0"/>
+      </a:lnRef>
+      <a:fillRef idx="1">
+        <a:scrgbClr r="0" g="0" b="0"/>
+      </a:fillRef>
+      <a:effectRef idx="0">
+        <a:scrgbClr r="0" g="0" b="0"/>
+      </a:effectRef>
+      <a:fontRef idx="minor">
+        <a:schemeClr val="lt1"/>
+      </a:fontRef>
+    </dgm:style>
+  </dgm:styleLbl>
+  <dgm:styleLbl name="fgImgPlace1">
+    <dgm:scene3d>
+      <a:camera prst="orthographicFront"/>
+      <a:lightRig rig="threePt" dir="t"/>
+    </dgm:scene3d>
+    <dgm:sp3d/>
+    <dgm:txPr/>
+    <dgm:style>
+      <a:lnRef idx="2">
+        <a:scrgbClr r="0" g="0" b="0"/>
+      </a:lnRef>
+      <a:fillRef idx="1">
+        <a:scrgbClr r="0" g="0" b="0"/>
+      </a:fillRef>
+      <a:effectRef idx="0">
+        <a:scrgbClr r="0" g="0" b="0"/>
+      </a:effectRef>
+      <a:fontRef idx="minor"/>
+    </dgm:style>
+  </dgm:styleLbl>
+  <dgm:styleLbl name="alignImgPlace1">
+    <dgm:scene3d>
+      <a:camera prst="orthographicFront"/>
+      <a:lightRig rig="threePt" dir="t"/>
+    </dgm:scene3d>
+    <dgm:sp3d/>
+    <dgm:txPr/>
+    <dgm:style>
+      <a:lnRef idx="2">
+        <a:scrgbClr r="0" g="0" b="0"/>
+      </a:lnRef>
+      <a:fillRef idx="1">
+        <a:scrgbClr r="0" g="0" b="0"/>
+      </a:fillRef>
+      <a:effectRef idx="0">
+        <a:scrgbClr r="0" g="0" b="0"/>
+      </a:effectRef>
+      <a:fontRef idx="minor"/>
+    </dgm:style>
+  </dgm:styleLbl>
+  <dgm:styleLbl name="bgImgPlace1">
+    <dgm:scene3d>
+      <a:camera prst="orthographicFront"/>
+      <a:lightRig rig="threePt" dir="t"/>
+    </dgm:scene3d>
+    <dgm:sp3d/>
+    <dgm:txPr/>
+    <dgm:style>
+      <a:lnRef idx="2">
+        <a:scrgbClr r="0" g="0" b="0"/>
+      </a:lnRef>
+      <a:fillRef idx="1">
+        <a:scrgbClr r="0" g="0" b="0"/>
+      </a:fillRef>
+      <a:effectRef idx="0">
+        <a:scrgbClr r="0" g="0" b="0"/>
+      </a:effectRef>
+      <a:fontRef idx="minor"/>
+    </dgm:style>
+  </dgm:styleLbl>
+  <dgm:styleLbl name="sibTrans2D1">
+    <dgm:scene3d>
+      <a:camera prst="orthographicFront"/>
+      <a:lightRig rig="threePt" dir="t"/>
+    </dgm:scene3d>
+    <dgm:sp3d/>
+    <dgm:txPr/>
+    <dgm:style>
+      <a:lnRef idx="0">
+        <a:scrgbClr r="0" g="0" b="0"/>
+      </a:lnRef>
+      <a:fillRef idx="1">
+        <a:scrgbClr r="0" g="0" b="0"/>
+      </a:fillRef>
+      <a:effectRef idx="0">
+        <a:scrgbClr r="0" g="0" b="0"/>
+      </a:effectRef>
+      <a:fontRef idx="minor">
+        <a:schemeClr val="lt1"/>
+      </a:fontRef>
+    </dgm:style>
+  </dgm:styleLbl>
+  <dgm:styleLbl name="fgSibTrans2D1">
+    <dgm:scene3d>
+      <a:camera prst="orthographicFront"/>
+      <a:lightRig rig="threePt" dir="t"/>
+    </dgm:scene3d>
+    <dgm:sp3d/>
+    <dgm:txPr/>
+    <dgm:style>
+      <a:lnRef idx="0">
+        <a:scrgbClr r="0" g="0" b="0"/>
+      </a:lnRef>
+      <a:fillRef idx="1">
+        <a:scrgbClr r="0" g="0" b="0"/>
+      </a:fillRef>
+      <a:effectRef idx="0">
+        <a:scrgbClr r="0" g="0" b="0"/>
+      </a:effectRef>
+      <a:fontRef idx="minor">
+        <a:schemeClr val="lt1"/>
+      </a:fontRef>
+    </dgm:style>
+  </dgm:styleLbl>
+  <dgm:styleLbl name="bgSibTrans2D1">
+    <dgm:scene3d>
+      <a:camera prst="orthographicFront"/>
+      <a:lightRig rig="threePt" dir="t"/>
+    </dgm:scene3d>
+    <dgm:sp3d/>
+    <dgm:txPr/>
+    <dgm:style>
+      <a:lnRef idx="0">
+        <a:scrgbClr r="0" g="0" b="0"/>
+      </a:lnRef>
+      <a:fillRef idx="1">
+        <a:scrgbClr r="0" g="0" b="0"/>
+      </a:fillRef>
+      <a:effectRef idx="0">
+        <a:scrgbClr r="0" g="0" b="0"/>
+      </a:effectRef>
+      <a:fontRef idx="minor">
+        <a:schemeClr val="lt1"/>
+      </a:fontRef>
+    </dgm:style>
+  </dgm:styleLbl>
+  <dgm:styleLbl name="sibTrans1D1">
+    <dgm:scene3d>
+      <a:camera prst="orthographicFront"/>
+      <a:lightRig rig="threePt" dir="t"/>
+    </dgm:scene3d>
+    <dgm:sp3d/>
+    <dgm:txPr/>
+    <dgm:style>
+      <a:lnRef idx="1">
+        <a:scrgbClr r="0" g="0" b="0"/>
+      </a:lnRef>
+      <a:fillRef idx="0">
+        <a:scrgbClr r="0" g="0" b="0"/>
+      </a:fillRef>
+      <a:effectRef idx="0">
+        <a:scrgbClr r="0" g="0" b="0"/>
+      </a:effectRef>
+      <a:fontRef idx="minor"/>
+    </dgm:style>
+  </dgm:styleLbl>
+  <dgm:styleLbl name="callout">
+    <dgm:scene3d>
+      <a:camera prst="orthographicFront"/>
+      <a:lightRig rig="threePt" dir="t"/>
+    </dgm:scene3d>
+    <dgm:sp3d/>
+    <dgm:txPr/>
+    <dgm:style>
+      <a:lnRef idx="2">
+        <a:scrgbClr r="0" g="0" b="0"/>
+      </a:lnRef>
+      <a:fillRef idx="1">
+        <a:scrgbClr r="0" g="0" b="0"/>
+      </a:fillRef>
+      <a:effectRef idx="0">
+        <a:scrgbClr r="0" g="0" b="0"/>
+      </a:effectRef>
+      <a:fontRef idx="minor"/>
+    </dgm:style>
+  </dgm:styleLbl>
+  <dgm:styleLbl name="asst0">
+    <dgm:scene3d>
+      <a:camera prst="orthographicFront"/>
+      <a:lightRig rig="threePt" dir="t"/>
+    </dgm:scene3d>
+    <dgm:sp3d/>
+    <dgm:txPr/>
+    <dgm:style>
+      <a:lnRef idx="2">
+        <a:scrgbClr r="0" g="0" b="0"/>
+      </a:lnRef>
+      <a:fillRef idx="1">
+        <a:scrgbClr r="0" g="0" b="0"/>
+      </a:fillRef>
+      <a:effectRef idx="0">
+        <a:scrgbClr r="0" g="0" b="0"/>
+      </a:effectRef>
+      <a:fontRef idx="minor">
+        <a:schemeClr val="lt1"/>
+      </a:fontRef>
+    </dgm:style>
+  </dgm:styleLbl>
+  <dgm:styleLbl name="asst1">
+    <dgm:scene3d>
+      <a:camera prst="orthographicFront"/>
+      <a:lightRig rig="threePt" dir="t"/>
+    </dgm:scene3d>
+    <dgm:sp3d/>
+    <dgm:txPr/>
+    <dgm:style>
+      <a:lnRef idx="2">
+        <a:scrgbClr r="0" g="0" b="0"/>
+      </a:lnRef>
+      <a:fillRef idx="1">
+        <a:scrgbClr r="0" g="0" b="0"/>
+      </a:fillRef>
+      <a:effectRef idx="0">
+        <a:scrgbClr r="0" g="0" b="0"/>
+      </a:effectRef>
+      <a:fontRef idx="minor">
+        <a:schemeClr val="lt1"/>
+      </a:fontRef>
+    </dgm:style>
+  </dgm:styleLbl>
+  <dgm:styleLbl name="asst2">
+    <dgm:scene3d>
+      <a:camera prst="orthographicFront"/>
+      <a:lightRig rig="threePt" dir="t"/>
+    </dgm:scene3d>
+    <dgm:sp3d/>
+    <dgm:txPr/>
+    <dgm:style>
+      <a:lnRef idx="2">
+        <a:scrgbClr r="0" g="0" b="0"/>
+      </a:lnRef>
+      <a:fillRef idx="1">
+        <a:scrgbClr r="0" g="0" b="0"/>
+      </a:fillRef>
+      <a:effectRef idx="0">
+        <a:scrgbClr r="0" g="0" b="0"/>
+      </a:effectRef>
+      <a:fontRef idx="minor">
+        <a:schemeClr val="lt1"/>
+      </a:fontRef>
+    </dgm:style>
+  </dgm:styleLbl>
+  <dgm:styleLbl name="asst3">
+    <dgm:scene3d>
+      <a:camera prst="orthographicFront"/>
+      <a:lightRig rig="threePt" dir="t"/>
+    </dgm:scene3d>
+    <dgm:sp3d/>
+    <dgm:txPr/>
+    <dgm:style>
+      <a:lnRef idx="2">
+        <a:scrgbClr r="0" g="0" b="0"/>
+      </a:lnRef>
+      <a:fillRef idx="1">
+        <a:scrgbClr r="0" g="0" b="0"/>
+      </a:fillRef>
+      <a:effectRef idx="0">
+        <a:scrgbClr r="0" g="0" b="0"/>
+      </a:effectRef>
+      <a:fontRef idx="minor">
+        <a:schemeClr val="lt1"/>
+      </a:fontRef>
+    </dgm:style>
+  </dgm:styleLbl>
+  <dgm:styleLbl name="asst4">
+    <dgm:scene3d>
+      <a:camera prst="orthographicFront"/>
+      <a:lightRig rig="threePt" dir="t"/>
+    </dgm:scene3d>
+    <dgm:sp3d/>
+    <dgm:txPr/>
+    <dgm:style>
+      <a:lnRef idx="2">
+        <a:scrgbClr r="0" g="0" b="0"/>
+      </a:lnRef>
+      <a:fillRef idx="1">
+        <a:scrgbClr r="0" g="0" b="0"/>
+      </a:fillRef>
+      <a:effectRef idx="0">
+        <a:scrgbClr r="0" g="0" b="0"/>
+      </a:effectRef>
+      <a:fontRef idx="minor">
+        <a:schemeClr val="lt1"/>
+      </a:fontRef>
+    </dgm:style>
+  </dgm:styleLbl>
+  <dgm:styleLbl name="parChTrans2D1">
+    <dgm:scene3d>
+      <a:camera prst="orthographicFront"/>
+      <a:lightRig rig="threePt" dir="t"/>
+    </dgm:scene3d>
+    <dgm:sp3d/>
+    <dgm:txPr/>
+    <dgm:style>
+      <a:lnRef idx="2">
+        <a:scrgbClr r="0" g="0" b="0"/>
+      </a:lnRef>
+      <a:fillRef idx="1">
+        <a:scrgbClr r="0" g="0" b="0"/>
+      </a:fillRef>
+      <a:effectRef idx="0">
+        <a:scrgbClr r="0" g="0" b="0"/>
+      </a:effectRef>
+      <a:fontRef idx="minor">
+        <a:schemeClr val="lt1"/>
+      </a:fontRef>
+    </dgm:style>
+  </dgm:styleLbl>
+  <dgm:styleLbl name="parChTrans2D2">
+    <dgm:scene3d>
+      <a:camera prst="orthographicFront"/>
+      <a:lightRig rig="threePt" dir="t"/>
+    </dgm:scene3d>
+    <dgm:sp3d/>
+    <dgm:txPr/>
+    <dgm:style>
+      <a:lnRef idx="2">
+        <a:scrgbClr r="0" g="0" b="0"/>
+      </a:lnRef>
+      <a:fillRef idx="1">
+        <a:scrgbClr r="0" g="0" b="0"/>
+      </a:fillRef>
+      <a:effectRef idx="0">
+        <a:scrgbClr r="0" g="0" b="0"/>
+      </a:effectRef>
+      <a:fontRef idx="minor">
+        <a:schemeClr val="lt1"/>
+      </a:fontRef>
+    </dgm:style>
+  </dgm:styleLbl>
+  <dgm:styleLbl name="parChTrans2D3">
+    <dgm:scene3d>
+      <a:camera prst="orthographicFront"/>
+      <a:lightRig rig="threePt" dir="t"/>
+    </dgm:scene3d>
+    <dgm:sp3d/>
+    <dgm:txPr/>
+    <dgm:style>
+      <a:lnRef idx="2">
+        <a:scrgbClr r="0" g="0" b="0"/>
+      </a:lnRef>
+      <a:fillRef idx="1">
+        <a:scrgbClr r="0" g="0" b="0"/>
+      </a:fillRef>
+      <a:effectRef idx="0">
+        <a:scrgbClr r="0" g="0" b="0"/>
+      </a:effectRef>
+      <a:fontRef idx="minor">
+        <a:schemeClr val="lt1"/>
+      </a:fontRef>
+    </dgm:style>
+  </dgm:styleLbl>
+  <dgm:styleLbl name="parChTrans2D4">
+    <dgm:scene3d>
+      <a:camera prst="orthographicFront"/>
+      <a:lightRig rig="threePt" dir="t"/>
+    </dgm:scene3d>
+    <dgm:sp3d/>
+    <dgm:txPr/>
+    <dgm:style>
+      <a:lnRef idx="2">
+        <a:scrgbClr r="0" g="0" b="0"/>
+      </a:lnRef>
+      <a:fillRef idx="1">
+        <a:scrgbClr r="0" g="0" b="0"/>
+      </a:fillRef>
+      <a:effectRef idx="0">
+        <a:scrgbClr r="0" g="0" b="0"/>
+      </a:effectRef>
+      <a:fontRef idx="minor">
+        <a:schemeClr val="lt1"/>
+      </a:fontRef>
+    </dgm:style>
+  </dgm:styleLbl>
+  <dgm:styleLbl name="parChTrans1D1">
+    <dgm:scene3d>
+      <a:camera prst="orthographicFront"/>
+      <a:lightRig rig="threePt" dir="t"/>
+    </dgm:scene3d>
+    <dgm:sp3d/>
+    <dgm:txPr/>
+    <dgm:style>
+      <a:lnRef idx="2">
+        <a:scrgbClr r="0" g="0" b="0"/>
+      </a:lnRef>
+      <a:fillRef idx="0">
+        <a:scrgbClr r="0" g="0" b="0"/>
+      </a:fillRef>
+      <a:effectRef idx="0">
+        <a:scrgbClr r="0" g="0" b="0"/>
+      </a:effectRef>
+      <a:fontRef idx="minor"/>
+    </dgm:style>
+  </dgm:styleLbl>
+  <dgm:styleLbl name="parChTrans1D2">
+    <dgm:scene3d>
+      <a:camera prst="orthographicFront"/>
+      <a:lightRig rig="threePt" dir="t"/>
+    </dgm:scene3d>
+    <dgm:sp3d/>
+    <dgm:txPr/>
+    <dgm:style>
+      <a:lnRef idx="2">
+        <a:scrgbClr r="0" g="0" b="0"/>
+      </a:lnRef>
+      <a:fillRef idx="0">
+        <a:scrgbClr r="0" g="0" b="0"/>
+      </a:fillRef>
+      <a:effectRef idx="0">
+        <a:scrgbClr r="0" g="0" b="0"/>
+      </a:effectRef>
+      <a:fontRef idx="minor"/>
+    </dgm:style>
+  </dgm:styleLbl>
+  <dgm:styleLbl name="parChTrans1D3">
+    <dgm:scene3d>
+      <a:camera prst="orthographicFront"/>
+      <a:lightRig rig="threePt" dir="t"/>
+    </dgm:scene3d>
+    <dgm:sp3d/>
+    <dgm:txPr/>
+    <dgm:style>
+      <a:lnRef idx="2">
+        <a:scrgbClr r="0" g="0" b="0"/>
+      </a:lnRef>
+      <a:fillRef idx="0">
+        <a:scrgbClr r="0" g="0" b="0"/>
+      </a:fillRef>
+      <a:effectRef idx="0">
+        <a:scrgbClr r="0" g="0" b="0"/>
+      </a:effectRef>
+      <a:fontRef idx="minor"/>
+    </dgm:style>
+  </dgm:styleLbl>
+  <dgm:styleLbl name="parChTrans1D4">
+    <dgm:scene3d>
+      <a:camera prst="orthographicFront"/>
+      <a:lightRig rig="threePt" dir="t"/>
+    </dgm:scene3d>
+    <dgm:sp3d/>
+    <dgm:txPr/>
+    <dgm:style>
+      <a:lnRef idx="2">
+        <a:scrgbClr r="0" g="0" b="0"/>
+      </a:lnRef>
+      <a:fillRef idx="0">
+        <a:scrgbClr r="0" g="0" b="0"/>
+      </a:fillRef>
+      <a:effectRef idx="0">
+        <a:scrgbClr r="0" g="0" b="0"/>
+      </a:effectRef>
+      <a:fontRef idx="minor"/>
+    </dgm:style>
+  </dgm:styleLbl>
+  <dgm:styleLbl name="fgAcc1">
+    <dgm:scene3d>
+      <a:camera prst="orthographicFront"/>
+      <a:lightRig rig="threePt" dir="t"/>
+    </dgm:scene3d>
+    <dgm:sp3d/>
+    <dgm:txPr/>
+    <dgm:style>
+      <a:lnRef idx="2">
+        <a:scrgbClr r="0" g="0" b="0"/>
+      </a:lnRef>
+      <a:fillRef idx="1">
+        <a:scrgbClr r="0" g="0" b="0"/>
+      </a:fillRef>
+      <a:effectRef idx="0">
+        <a:scrgbClr r="0" g="0" b="0"/>
+      </a:effectRef>
+      <a:fontRef idx="minor"/>
+    </dgm:style>
+  </dgm:styleLbl>
+  <dgm:styleLbl name="conFgAcc1">
+    <dgm:scene3d>
+      <a:camera prst="orthographicFront"/>
+      <a:lightRig rig="threePt" dir="t"/>
+    </dgm:scene3d>
+    <dgm:sp3d/>
+    <dgm:txPr/>
+    <dgm:style>
+      <a:lnRef idx="2">
+        <a:scrgbClr r="0" g="0" b="0"/>
+      </a:lnRef>
+      <a:fillRef idx="1">
+        <a:scrgbClr r="0" g="0" b="0"/>
+      </a:fillRef>
+      <a:effectRef idx="0">
+        <a:scrgbClr r="0" g="0" b="0"/>
+      </a:effectRef>
+      <a:fontRef idx="minor"/>
+    </dgm:style>
+  </dgm:styleLbl>
+  <dgm:styleLbl name="alignAcc1">
+    <dgm:scene3d>
+      <a:camera prst="orthographicFront"/>
+      <a:lightRig rig="threePt" dir="t"/>
+    </dgm:scene3d>
+    <dgm:sp3d/>
+    <dgm:txPr/>
+    <dgm:style>
+      <a:lnRef idx="2">
+        <a:scrgbClr r="0" g="0" b="0"/>
+      </a:lnRef>
+      <a:fillRef idx="1">
+        <a:scrgbClr r="0" g="0" b="0"/>
+      </a:fillRef>
+      <a:effectRef idx="0">
+        <a:scrgbClr r="0" g="0" b="0"/>
+      </a:effectRef>
+      <a:fontRef idx="minor"/>
+    </dgm:style>
+  </dgm:styleLbl>
+  <dgm:styleLbl name="trAlignAcc1">
+    <dgm:scene3d>
+      <a:camera prst="orthographicFront"/>
+      <a:lightRig rig="threePt" dir="t"/>
+    </dgm:scene3d>
+    <dgm:sp3d/>
+    <dgm:txPr/>
+    <dgm:style>
+      <a:lnRef idx="1">
+        <a:scrgbClr r="0" g="0" b="0"/>
+      </a:lnRef>
+      <a:fillRef idx="1">
+        <a:scrgbClr r="0" g="0" b="0"/>
+      </a:fillRef>
+      <a:effectRef idx="0">
+        <a:scrgbClr r="0" g="0" b="0"/>
+      </a:effectRef>
+      <a:fontRef idx="minor"/>
+    </dgm:style>
+  </dgm:styleLbl>
+  <dgm:styleLbl name="bgAcc1">
+    <dgm:scene3d>
+      <a:camera prst="orthographicFront"/>
+      <a:lightRig rig="threePt" dir="t"/>
+    </dgm:scene3d>
+    <dgm:sp3d/>
+    <dgm:txPr/>
+    <dgm:style>
+      <a:lnRef idx="2">
+        <a:scrgbClr r="0" g="0" b="0"/>
+      </a:lnRef>
+      <a:fillRef idx="1">
+        <a:scrgbClr r="0" g="0" b="0"/>
+      </a:fillRef>
+      <a:effectRef idx="0">
+        <a:scrgbClr r="0" g="0" b="0"/>
+      </a:effectRef>
+      <a:fontRef idx="minor"/>
+    </dgm:style>
+  </dgm:styleLbl>
+  <dgm:styleLbl name="solidFgAcc1">
+    <dgm:scene3d>
+      <a:camera prst="orthographicFront"/>
+      <a:lightRig rig="threePt" dir="t"/>
+    </dgm:scene3d>
+    <dgm:sp3d/>
+    <dgm:txPr/>
+    <dgm:style>
+      <a:lnRef idx="2">
+        <a:scrgbClr r="0" g="0" b="0"/>
+      </a:lnRef>
+      <a:fillRef idx="1">
+        <a:scrgbClr r="0" g="0" b="0"/>
+      </a:fillRef>
+      <a:effectRef idx="0">
+        <a:scrgbClr r="0" g="0" b="0"/>
+      </a:effectRef>
+      <a:fontRef idx="minor"/>
+    </dgm:style>
+  </dgm:styleLbl>
+  <dgm:styleLbl name="solidAlignAcc1">
+    <dgm:scene3d>
+      <a:camera prst="orthographicFront"/>
+      <a:lightRig rig="threePt" dir="t"/>
+    </dgm:scene3d>
+    <dgm:sp3d/>
+    <dgm:txPr/>
+    <dgm:style>
+      <a:lnRef idx="2">
+        <a:scrgbClr r="0" g="0" b="0"/>
+      </a:lnRef>
+      <a:fillRef idx="1">
+        <a:scrgbClr r="0" g="0" b="0"/>
+      </a:fillRef>
+      <a:effectRef idx="0">
+        <a:scrgbClr r="0" g="0" b="0"/>
+      </a:effectRef>
+      <a:fontRef idx="minor"/>
+    </dgm:style>
+  </dgm:styleLbl>
+  <dgm:styleLbl name="solidBgAcc1">
+    <dgm:scene3d>
+      <a:camera prst="orthographicFront"/>
+      <a:lightRig rig="threePt" dir="t"/>
+    </dgm:scene3d>
+    <dgm:sp3d/>
+    <dgm:txPr/>
+    <dgm:style>
+      <a:lnRef idx="2">
+        <a:scrgbClr r="0" g="0" b="0"/>
+      </a:lnRef>
+      <a:fillRef idx="1">
+        <a:scrgbClr r="0" g="0" b="0"/>
+      </a:fillRef>
+      <a:effectRef idx="0">
+        <a:scrgbClr r="0" g="0" b="0"/>
+      </a:effectRef>
+      <a:fontRef idx="minor"/>
+    </dgm:style>
+  </dgm:styleLbl>
+  <dgm:styleLbl name="fgAccFollowNode1">
+    <dgm:scene3d>
+      <a:camera prst="orthographicFront"/>
+      <a:lightRig rig="threePt" dir="t"/>
+    </dgm:scene3d>
+    <dgm:sp3d/>
+    <dgm:txPr/>
+    <dgm:style>
+      <a:lnRef idx="2">
+        <a:scrgbClr r="0" g="0" b="0"/>
+      </a:lnRef>
+      <a:fillRef idx="1">
+        <a:scrgbClr r="0" g="0" b="0"/>
+      </a:fillRef>
+      <a:effectRef idx="0">
+        <a:scrgbClr r="0" g="0" b="0"/>
+      </a:effectRef>
+      <a:fontRef idx="minor"/>
+    </dgm:style>
+  </dgm:styleLbl>
+  <dgm:styleLbl name="alignAccFollowNode1">
+    <dgm:scene3d>
+      <a:camera prst="orthographicFront"/>
+      <a:lightRig rig="threePt" dir="t"/>
+    </dgm:scene3d>
+    <dgm:sp3d/>
+    <dgm:txPr/>
+    <dgm:style>
+      <a:lnRef idx="2">
+        <a:scrgbClr r="0" g="0" b="0"/>
+      </a:lnRef>
+      <a:fillRef idx="1">
+        <a:scrgbClr r="0" g="0" b="0"/>
+      </a:fillRef>
+      <a:effectRef idx="0">
+        <a:scrgbClr r="0" g="0" b="0"/>
+      </a:effectRef>
+      <a:fontRef idx="minor"/>
+    </dgm:style>
+  </dgm:styleLbl>
+  <dgm:styleLbl name="bgAccFollowNode1">
+    <dgm:scene3d>
+      <a:camera prst="orthographicFront"/>
+      <a:lightRig rig="threePt" dir="t"/>
+    </dgm:scene3d>
+    <dgm:sp3d/>
+    <dgm:txPr/>
+    <dgm:style>
+      <a:lnRef idx="2">
+        <a:scrgbClr r="0" g="0" b="0"/>
+      </a:lnRef>
+      <a:fillRef idx="1">
+        <a:scrgbClr r="0" g="0" b="0"/>
+      </a:fillRef>
+      <a:effectRef idx="0">
+        <a:scrgbClr r="0" g="0" b="0"/>
+      </a:effectRef>
+      <a:fontRef idx="minor"/>
+    </dgm:style>
+  </dgm:styleLbl>
+  <dgm:styleLbl name="fgAcc0">
+    <dgm:scene3d>
+      <a:camera prst="orthographicFront"/>
+      <a:lightRig rig="threePt" dir="t"/>
+    </dgm:scene3d>
+    <dgm:sp3d/>
+    <dgm:txPr/>
+    <dgm:style>
+      <a:lnRef idx="2">
+        <a:scrgbClr r="0" g="0" b="0"/>
+      </a:lnRef>
+      <a:fillRef idx="1">
+        <a:scrgbClr r="0" g="0" b="0"/>
+      </a:fillRef>
+      <a:effectRef idx="0">
+        <a:scrgbClr r="0" g="0" b="0"/>
+      </a:effectRef>
+      <a:fontRef idx="minor"/>
+    </dgm:style>
+  </dgm:styleLbl>
+  <dgm:styleLbl name="fgAcc2">
+    <dgm:scene3d>
+      <a:camera prst="orthographicFront"/>
+      <a:lightRig rig="threePt" dir="t"/>
+    </dgm:scene3d>
+    <dgm:sp3d/>
+    <dgm:txPr/>
+    <dgm:style>
+      <a:lnRef idx="2">
+        <a:scrgbClr r="0" g="0" b="0"/>
+      </a:lnRef>
+      <a:fillRef idx="1">
+        <a:scrgbClr r="0" g="0" b="0"/>
+      </a:fillRef>
+      <a:effectRef idx="0">
+        <a:scrgbClr r="0" g="0" b="0"/>
+      </a:effectRef>
+      <a:fontRef idx="minor"/>
+    </dgm:style>
+  </dgm:styleLbl>
+  <dgm:styleLbl name="fgAcc3">
+    <dgm:scene3d>
+      <a:camera prst="orthographicFront"/>
+      <a:lightRig rig="threePt" dir="t"/>
+    </dgm:scene3d>
+    <dgm:sp3d/>
+    <dgm:txPr/>
+    <dgm:style>
+      <a:lnRef idx="2">
+        <a:scrgbClr r="0" g="0" b="0"/>
+      </a:lnRef>
+      <a:fillRef idx="1">
+        <a:scrgbClr r="0" g="0" b="0"/>
+      </a:fillRef>
+      <a:effectRef idx="0">
+        <a:scrgbClr r="0" g="0" b="0"/>
+      </a:effectRef>
+      <a:fontRef idx="minor"/>
+    </dgm:style>
+  </dgm:styleLbl>
+  <dgm:styleLbl name="fgAcc4">
+    <dgm:scene3d>
+      <a:camera prst="orthographicFront"/>
+      <a:lightRig rig="threePt" dir="t"/>
+    </dgm:scene3d>
+    <dgm:sp3d/>
+    <dgm:txPr/>
+    <dgm:style>
+      <a:lnRef idx="2">
+        <a:scrgbClr r="0" g="0" b="0"/>
+      </a:lnRef>
+      <a:fillRef idx="1">
+        <a:scrgbClr r="0" g="0" b="0"/>
+      </a:fillRef>
+      <a:effectRef idx="0">
+        <a:scrgbClr r="0" g="0" b="0"/>
+      </a:effectRef>
+      <a:fontRef idx="minor"/>
+    </dgm:style>
+  </dgm:styleLbl>
+  <dgm:styleLbl name="bgShp">
+    <dgm:scene3d>
+      <a:camera prst="orthographicFront"/>
+      <a:lightRig rig="threePt" dir="t"/>
+    </dgm:scene3d>
+    <dgm:sp3d/>
+    <dgm:txPr/>
+    <dgm:style>
+      <a:lnRef idx="0">
+        <a:scrgbClr r="0" g="0" b="0"/>
+      </a:lnRef>
+      <a:fillRef idx="1">
+        <a:scrgbClr r="0" g="0" b="0"/>
+      </a:fillRef>
+      <a:effectRef idx="0">
+        <a:scrgbClr r="0" g="0" b="0"/>
+      </a:effectRef>
+      <a:fontRef idx="minor"/>
+    </dgm:style>
+  </dgm:styleLbl>
+  <dgm:styleLbl name="dkBgShp">
+    <dgm:scene3d>
+      <a:camera prst="orthographicFront"/>
+      <a:lightRig rig="threePt" dir="t"/>
+    </dgm:scene3d>
+    <dgm:sp3d/>
+    <dgm:txPr/>
+    <dgm:style>
+      <a:lnRef idx="0">
+        <a:scrgbClr r="0" g="0" b="0"/>
+      </a:lnRef>
+      <a:fillRef idx="1">
+        <a:scrgbClr r="0" g="0" b="0"/>
+      </a:fillRef>
+      <a:effectRef idx="0">
+        <a:scrgbClr r="0" g="0" b="0"/>
+      </a:effectRef>
+      <a:fontRef idx="minor"/>
+    </dgm:style>
+  </dgm:styleLbl>
+  <dgm:styleLbl name="trBgShp">
+    <dgm:scene3d>
+      <a:camera prst="orthographicFront"/>
+      <a:lightRig rig="threePt" dir="t"/>
+    </dgm:scene3d>
+    <dgm:sp3d/>
+    <dgm:txPr/>
+    <dgm:style>
+      <a:lnRef idx="0">
+        <a:scrgbClr r="0" g="0" b="0"/>
+      </a:lnRef>
+      <a:fillRef idx="1">
+        <a:scrgbClr r="0" g="0" b="0"/>
+      </a:fillRef>
+      <a:effectRef idx="0">
+        <a:scrgbClr r="0" g="0" b="0"/>
+      </a:effectRef>
+      <a:fontRef idx="minor"/>
+    </dgm:style>
+  </dgm:styleLbl>
+  <dgm:styleLbl name="fgShp">
+    <dgm:scene3d>
+      <a:camera prst="orthographicFront"/>
+      <a:lightRig rig="threePt" dir="t"/>
+    </dgm:scene3d>
+    <dgm:sp3d/>
+    <dgm:txPr/>
+    <dgm:style>
+      <a:lnRef idx="2">
+        <a:scrgbClr r="0" g="0" b="0"/>
+      </a:lnRef>
+      <a:fillRef idx="1">
+        <a:scrgbClr r="0" g="0" b="0"/>
+      </a:fillRef>
+      <a:effectRef idx="0">
+        <a:scrgbClr r="0" g="0" b="0"/>
+      </a:effectRef>
+      <a:fontRef idx="minor"/>
+    </dgm:style>
+  </dgm:styleLbl>
+  <dgm:styleLbl name="revTx">
+    <dgm:scene3d>
+      <a:camera prst="orthographicFront"/>
+      <a:lightRig rig="threePt" dir="t"/>
+    </dgm:scene3d>
+    <dgm:sp3d/>
+    <dgm:txPr/>
+    <dgm:style>
+      <a:lnRef idx="0">
+        <a:scrgbClr r="0" g="0" b="0"/>
+      </a:lnRef>
+      <a:fillRef idx="0">
+        <a:scrgbClr r="0" g="0" b="0"/>
+      </a:fillRef>
+      <a:effectRef idx="0">
+        <a:scrgbClr r="0" g="0" b="0"/>
+      </a:effectRef>
+      <a:fontRef idx="minor"/>
+    </dgm:style>
+  </dgm:styleLbl>
+</dgm:styleDef>
+</file>
+
+<file path=ppt/notesMasters/notesMaster1.xml><?xml version="1.0" encoding="utf-8"?>
+<p:notesMaster xmlns:a="http://schemas.openxmlformats.org/drawingml/2006/main" xmlns:r="http://schemas.openxmlformats.org/officeDocument/2006/relationships" xmlns:p="http://schemas.openxmlformats.org/presentationml/2006/main">
+  <p:cSld>
+    <p:bg>
+      <p:bgRef idx="1001">
+        <a:schemeClr val="bg1"/>
+      </p:bgRef>
+    </p:bg>
+    <p:spTree>
+      <p:nvGrpSpPr>
+        <p:cNvPr id="1" name=""/>
+        <p:cNvGrpSpPr/>
+        <p:nvPr/>
+      </p:nvGrpSpPr>
+      <p:grpSpPr>
+        <a:xfrm>
+          <a:off x="0" y="0"/>
+          <a:ext cx="0" cy="0"/>
+          <a:chOff x="0" y="0"/>
+          <a:chExt cx="0" cy="0"/>
+        </a:xfrm>
+      </p:grpSpPr>
+      <p:sp>
+        <p:nvSpPr>
+          <p:cNvPr id="2" name="Header Placeholder 1"/>
+          <p:cNvSpPr>
+            <a:spLocks noGrp="1"/>
+          </p:cNvSpPr>
+          <p:nvPr>
+            <p:ph type="hdr" sz="quarter"/>
+          </p:nvPr>
+        </p:nvSpPr>
+        <p:spPr>
+          <a:xfrm>
+            <a:off x="0" y="0"/>
+            <a:ext cx="2971800" cy="458788"/>
+          </a:xfrm>
+          <a:prstGeom prst="rect">
+            <a:avLst/>
+          </a:prstGeom>
+        </p:spPr>
+        <p:txBody>
+          <a:bodyPr vert="horz" lIns="91440" tIns="45720" rIns="91440" bIns="45720" rtlCol="0"/>
+          <a:lstStyle>
+            <a:lvl1pPr algn="l">
+              <a:defRPr sz="1200"/>
+            </a:lvl1pPr>
+          </a:lstStyle>
+          <a:p>
+            <a:endParaRPr lang="en-US"/>
+          </a:p>
+        </p:txBody>
+      </p:sp>
+      <p:sp>
+        <p:nvSpPr>
+          <p:cNvPr id="3" name="Date Placeholder 2"/>
+          <p:cNvSpPr>
+            <a:spLocks noGrp="1"/>
+          </p:cNvSpPr>
+          <p:nvPr>
+            <p:ph type="dt" idx="1"/>
+          </p:nvPr>
+        </p:nvSpPr>
+        <p:spPr>
+          <a:xfrm>
+            <a:off x="3884613" y="0"/>
+            <a:ext cx="2971800" cy="458788"/>
+          </a:xfrm>
+          <a:prstGeom prst="rect">
+            <a:avLst/>
+          </a:prstGeom>
+        </p:spPr>
+        <p:txBody>
+          <a:bodyPr vert="horz" lIns="91440" tIns="45720" rIns="91440" bIns="45720" rtlCol="0"/>
+          <a:lstStyle>
+            <a:lvl1pPr algn="r">
+              <a:defRPr sz="1200"/>
+            </a:lvl1pPr>
+          </a:lstStyle>
+          <a:p>
+            <a:fld id="{806E9FE5-C050-4A81-AD57-D702D14823F0}" type="datetimeFigureOut">
+              <a:rPr lang="en-US" smtClean="0"/>
+              <a:t>5/23/2020</a:t>
+            </a:fld>
+            <a:endParaRPr lang="en-US"/>
+          </a:p>
+        </p:txBody>
+      </p:sp>
+      <p:sp>
+        <p:nvSpPr>
+          <p:cNvPr id="4" name="Slide Image Placeholder 3"/>
+          <p:cNvSpPr>
+            <a:spLocks noGrp="1" noRot="1" noChangeAspect="1"/>
+          </p:cNvSpPr>
+          <p:nvPr>
+            <p:ph type="sldImg" idx="2"/>
+          </p:nvPr>
+        </p:nvSpPr>
+        <p:spPr>
+          <a:xfrm>
+            <a:off x="685800" y="1143000"/>
+            <a:ext cx="5486400" cy="3086100"/>
+          </a:xfrm>
+          <a:prstGeom prst="rect">
+            <a:avLst/>
+          </a:prstGeom>
+          <a:noFill/>
+          <a:ln w="12700">
+            <a:solidFill>
+              <a:prstClr val="black"/>
+            </a:solidFill>
+          </a:ln>
+        </p:spPr>
+        <p:txBody>
+          <a:bodyPr vert="horz" lIns="91440" tIns="45720" rIns="91440" bIns="45720" rtlCol="0" anchor="ctr"/>
+          <a:lstStyle/>
+          <a:p>
+            <a:endParaRPr lang="en-US"/>
+          </a:p>
+        </p:txBody>
+      </p:sp>
+      <p:sp>
+        <p:nvSpPr>
+          <p:cNvPr id="5" name="Notes Placeholder 4"/>
+          <p:cNvSpPr>
+            <a:spLocks noGrp="1"/>
+          </p:cNvSpPr>
+          <p:nvPr>
+            <p:ph type="body" sz="quarter" idx="3"/>
+          </p:nvPr>
+        </p:nvSpPr>
+        <p:spPr>
+          <a:xfrm>
+            <a:off x="685800" y="4400550"/>
+            <a:ext cx="5486400" cy="3600450"/>
+          </a:xfrm>
+          <a:prstGeom prst="rect">
+            <a:avLst/>
+          </a:prstGeom>
+        </p:spPr>
+        <p:txBody>
+          <a:bodyPr vert="horz" lIns="91440" tIns="45720" rIns="91440" bIns="45720" rtlCol="0"/>
+          <a:lstStyle/>
+          <a:p>
+            <a:pPr lvl="0"/>
+            <a:r>
+              <a:rPr lang="en-US"/>
+              <a:t>Click to edit Master text styles</a:t>
+            </a:r>
+          </a:p>
+          <a:p>
+            <a:pPr lvl="1"/>
+            <a:r>
+              <a:rPr lang="en-US"/>
+              <a:t>Second level</a:t>
+            </a:r>
+          </a:p>
+          <a:p>
+            <a:pPr lvl="2"/>
+            <a:r>
+              <a:rPr lang="en-US"/>
+              <a:t>Third level</a:t>
+            </a:r>
+          </a:p>
+          <a:p>
+            <a:pPr lvl="3"/>
+            <a:r>
+              <a:rPr lang="en-US"/>
+              <a:t>Fourth level</a:t>
+            </a:r>
+          </a:p>
+          <a:p>
+            <a:pPr lvl="4"/>
+            <a:r>
+              <a:rPr lang="en-US"/>
+              <a:t>Fifth level</a:t>
+            </a:r>
+          </a:p>
+        </p:txBody>
+      </p:sp>
+      <p:sp>
+        <p:nvSpPr>
+          <p:cNvPr id="6" name="Footer Placeholder 5"/>
+          <p:cNvSpPr>
+            <a:spLocks noGrp="1"/>
+          </p:cNvSpPr>
+          <p:nvPr>
+            <p:ph type="ftr" sz="quarter" idx="4"/>
+          </p:nvPr>
+        </p:nvSpPr>
+        <p:spPr>
+          <a:xfrm>
+            <a:off x="0" y="8685213"/>
+            <a:ext cx="2971800" cy="458787"/>
+          </a:xfrm>
+          <a:prstGeom prst="rect">
+            <a:avLst/>
+          </a:prstGeom>
+        </p:spPr>
+        <p:txBody>
+          <a:bodyPr vert="horz" lIns="91440" tIns="45720" rIns="91440" bIns="45720" rtlCol="0" anchor="b"/>
+          <a:lstStyle>
+            <a:lvl1pPr algn="l">
+              <a:defRPr sz="1200"/>
+            </a:lvl1pPr>
+          </a:lstStyle>
+          <a:p>
+            <a:endParaRPr lang="en-US"/>
+          </a:p>
+        </p:txBody>
+      </p:sp>
+      <p:sp>
+        <p:nvSpPr>
+          <p:cNvPr id="7" name="Slide Number Placeholder 6"/>
+          <p:cNvSpPr>
+            <a:spLocks noGrp="1"/>
+          </p:cNvSpPr>
+          <p:nvPr>
+            <p:ph type="sldNum" sz="quarter" idx="5"/>
+          </p:nvPr>
+        </p:nvSpPr>
+        <p:spPr>
+          <a:xfrm>
+            <a:off x="3884613" y="8685213"/>
+            <a:ext cx="2971800" cy="458787"/>
+          </a:xfrm>
+          <a:prstGeom prst="rect">
+            <a:avLst/>
+          </a:prstGeom>
+        </p:spPr>
+        <p:txBody>
+          <a:bodyPr vert="horz" lIns="91440" tIns="45720" rIns="91440" bIns="45720" rtlCol="0" anchor="b"/>
+          <a:lstStyle>
+            <a:lvl1pPr algn="r">
+              <a:defRPr sz="1200"/>
+            </a:lvl1pPr>
+          </a:lstStyle>
+          <a:p>
+            <a:fld id="{A03D08BC-40AD-479A-BB74-C1986F84DA16}" type="slidenum">
+              <a:rPr lang="en-US" smtClean="0"/>
+              <a:t>‹#›</a:t>
+            </a:fld>
+            <a:endParaRPr lang="en-US"/>
+          </a:p>
+        </p:txBody>
+      </p:sp>
+    </p:spTree>
+    <p:extLst>
+      <p:ext uri="{BB962C8B-B14F-4D97-AF65-F5344CB8AC3E}">
+        <p14:creationId xmlns:p14="http://schemas.microsoft.com/office/powerpoint/2010/main" val="1763512334"/>
+      </p:ext>
+    </p:extLst>
+  </p:cSld>
+  <p:clrMap bg1="lt1" tx1="dk1" bg2="lt2" tx2="dk2" accent1="accent1" accent2="accent2" accent3="accent3" accent4="accent4" accent5="accent5" accent6="accent6" hlink="hlink" folHlink="folHlink"/>
+  <p:notesStyle>
+    <a:lvl1pPr marL="0" algn="l" defTabSz="914400" rtl="0" eaLnBrk="1" latinLnBrk="0" hangingPunct="1">
+      <a:defRPr sz="1200" kern="1200">
+        <a:solidFill>
+          <a:schemeClr val="tx1"/>
+        </a:solidFill>
+        <a:latin typeface="+mn-lt"/>
+        <a:ea typeface="+mn-ea"/>
+        <a:cs typeface="+mn-cs"/>
+      </a:defRPr>
+    </a:lvl1pPr>
+    <a:lvl2pPr marL="457200" algn="l" defTabSz="914400" rtl="0" eaLnBrk="1" latinLnBrk="0" hangingPunct="1">
+      <a:defRPr sz="1200" kern="1200">
+        <a:solidFill>
+          <a:schemeClr val="tx1"/>
+        </a:solidFill>
+        <a:latin typeface="+mn-lt"/>
+        <a:ea typeface="+mn-ea"/>
+        <a:cs typeface="+mn-cs"/>
+      </a:defRPr>
+    </a:lvl2pPr>
+    <a:lvl3pPr marL="914400" algn="l" defTabSz="914400" rtl="0" eaLnBrk="1" latinLnBrk="0" hangingPunct="1">
+      <a:defRPr sz="1200" kern="1200">
+        <a:solidFill>
+          <a:schemeClr val="tx1"/>
+        </a:solidFill>
+        <a:latin typeface="+mn-lt"/>
+        <a:ea typeface="+mn-ea"/>
+        <a:cs typeface="+mn-cs"/>
+      </a:defRPr>
+    </a:lvl3pPr>
+    <a:lvl4pPr marL="1371600" algn="l" defTabSz="914400" rtl="0" eaLnBrk="1" latinLnBrk="0" hangingPunct="1">
+      <a:defRPr sz="1200" kern="1200">
+        <a:solidFill>
+          <a:schemeClr val="tx1"/>
+        </a:solidFill>
+        <a:latin typeface="+mn-lt"/>
+        <a:ea typeface="+mn-ea"/>
+        <a:cs typeface="+mn-cs"/>
+      </a:defRPr>
+    </a:lvl4pPr>
+    <a:lvl5pPr marL="1828800" algn="l" defTabSz="914400" rtl="0" eaLnBrk="1" latinLnBrk="0" hangingPunct="1">
+      <a:defRPr sz="1200" kern="1200">
+        <a:solidFill>
+          <a:schemeClr val="tx1"/>
+        </a:solidFill>
+        <a:latin typeface="+mn-lt"/>
+        <a:ea typeface="+mn-ea"/>
+        <a:cs typeface="+mn-cs"/>
+      </a:defRPr>
+    </a:lvl5pPr>
+    <a:lvl6pPr marL="2286000" algn="l" defTabSz="914400" rtl="0" eaLnBrk="1" latinLnBrk="0" hangingPunct="1">
+      <a:defRPr sz="1200" kern="1200">
+        <a:solidFill>
+          <a:schemeClr val="tx1"/>
+        </a:solidFill>
+        <a:latin typeface="+mn-lt"/>
+        <a:ea typeface="+mn-ea"/>
+        <a:cs typeface="+mn-cs"/>
+      </a:defRPr>
+    </a:lvl6pPr>
+    <a:lvl7pPr marL="2743200" algn="l" defTabSz="914400" rtl="0" eaLnBrk="1" latinLnBrk="0" hangingPunct="1">
+      <a:defRPr sz="1200" kern="1200">
+        <a:solidFill>
+          <a:schemeClr val="tx1"/>
+        </a:solidFill>
+        <a:latin typeface="+mn-lt"/>
+        <a:ea typeface="+mn-ea"/>
+        <a:cs typeface="+mn-cs"/>
+      </a:defRPr>
+    </a:lvl7pPr>
+    <a:lvl8pPr marL="3200400" algn="l" defTabSz="914400" rtl="0" eaLnBrk="1" latinLnBrk="0" hangingPunct="1">
+      <a:defRPr sz="1200" kern="1200">
+        <a:solidFill>
+          <a:schemeClr val="tx1"/>
+        </a:solidFill>
+        <a:latin typeface="+mn-lt"/>
+        <a:ea typeface="+mn-ea"/>
+        <a:cs typeface="+mn-cs"/>
+      </a:defRPr>
+    </a:lvl8pPr>
+    <a:lvl9pPr marL="3657600" algn="l" defTabSz="914400" rtl="0" eaLnBrk="1" latinLnBrk="0" hangingPunct="1">
+      <a:defRPr sz="1200" kern="1200">
+        <a:solidFill>
+          <a:schemeClr val="tx1"/>
+        </a:solidFill>
+        <a:latin typeface="+mn-lt"/>
+        <a:ea typeface="+mn-ea"/>
+        <a:cs typeface="+mn-cs"/>
+      </a:defRPr>
+    </a:lvl9pPr>
+  </p:notesStyle>
+</p:notesMaster>
+</file>
+
+<file path=ppt/notesSlides/notesSlide1.xml><?xml version="1.0" encoding="utf-8"?>
+<p:notes xmlns:a="http://schemas.openxmlformats.org/drawingml/2006/main" xmlns:r="http://schemas.openxmlformats.org/officeDocument/2006/relationships" xmlns:p="http://schemas.openxmlformats.org/presentationml/2006/main">
+  <p:cSld>
+    <p:spTree>
+      <p:nvGrpSpPr>
+        <p:cNvPr id="1" name=""/>
+        <p:cNvGrpSpPr/>
+        <p:nvPr/>
+      </p:nvGrpSpPr>
+      <p:grpSpPr>
+        <a:xfrm>
+          <a:off x="0" y="0"/>
+          <a:ext cx="0" cy="0"/>
+          <a:chOff x="0" y="0"/>
+          <a:chExt cx="0" cy="0"/>
+        </a:xfrm>
+      </p:grpSpPr>
+      <p:sp>
+        <p:nvSpPr>
+          <p:cNvPr id="2" name="Slide Image Placeholder 1"/>
+          <p:cNvSpPr>
+            <a:spLocks noGrp="1" noRot="1" noChangeAspect="1"/>
+          </p:cNvSpPr>
+          <p:nvPr>
+            <p:ph type="sldImg"/>
+          </p:nvPr>
+        </p:nvSpPr>
+        <p:spPr/>
+      </p:sp>
+      <p:sp>
+        <p:nvSpPr>
+          <p:cNvPr id="3" name="Notes Placeholder 2"/>
+          <p:cNvSpPr>
+            <a:spLocks noGrp="1"/>
+          </p:cNvSpPr>
+          <p:nvPr>
+            <p:ph type="body" idx="1"/>
+          </p:nvPr>
+        </p:nvSpPr>
+        <p:spPr/>
+        <p:txBody>
+          <a:bodyPr/>
+          <a:lstStyle/>
+          <a:p>
+            <a:pPr marL="0" marR="0" lvl="0" indent="0" algn="l" defTabSz="914400" rtl="0" eaLnBrk="1" fontAlgn="auto" latinLnBrk="0" hangingPunct="1">
+              <a:lnSpc>
+                <a:spcPct val="100000"/>
+              </a:lnSpc>
+              <a:spcBef>
+                <a:spcPts val="0"/>
+              </a:spcBef>
+              <a:spcAft>
+                <a:spcPts val="0"/>
+              </a:spcAft>
+              <a:buClrTx/>
+              <a:buSzTx/>
+              <a:buFontTx/>
+              <a:buNone/>
+              <a:tabLst/>
+              <a:defRPr/>
+            </a:pPr>
+            <a:r>
+              <a:rPr lang="en-US" sz="1200" kern="1200" dirty="0">
+                <a:solidFill>
+                  <a:schemeClr val="tx1"/>
+                </a:solidFill>
+                <a:effectLst/>
+                <a:latin typeface="+mn-lt"/>
+                <a:ea typeface="+mn-ea"/>
+                <a:cs typeface="+mn-cs"/>
+              </a:rPr>
+              <a:t>Users interact with spoofed resources through cold-calling or name squatting scenarios, such as emails directing them to netflix.com.evil.com.  Previous security messages tell the user to look for details, like misspellings, as evidence of being fake (Proctor &amp; J, 2015).  However, this implicitly implies that perfect grammar infers being real.  When users connect to websites, training has also told them to look for the security icon, but this only means the traffic is encrypted (Hunt, 2019).  Without a consistent and reliable method to determine that a resource is genuine, the only alternative is skepticism.  For instance, when a banker calls for account information, hang up and call them back through the main switchboard.  If the call were real, there would be a note on the file, and another representative will assist.  Along those same lines, if netflix.com.evil.com, needs an update to your information, start at Bing and search for Netflix login, scrolling past the advertisements to the real site.  While none of these methods are fool-proof, they increase the odds of ending at the right location.</a:t>
+            </a:r>
+          </a:p>
+          <a:p>
+            <a:endParaRPr lang="en-US" dirty="0"/>
+          </a:p>
+        </p:txBody>
+      </p:sp>
+      <p:sp>
+        <p:nvSpPr>
+          <p:cNvPr id="4" name="Slide Number Placeholder 3"/>
+          <p:cNvSpPr>
+            <a:spLocks noGrp="1"/>
+          </p:cNvSpPr>
+          <p:nvPr>
+            <p:ph type="sldNum" sz="quarter" idx="5"/>
+          </p:nvPr>
+        </p:nvSpPr>
+        <p:spPr/>
+        <p:txBody>
+          <a:bodyPr/>
+          <a:lstStyle/>
+          <a:p>
+            <a:fld id="{A03D08BC-40AD-479A-BB74-C1986F84DA16}" type="slidenum">
+              <a:rPr lang="en-US" smtClean="0"/>
+              <a:t>16</a:t>
+            </a:fld>
+            <a:endParaRPr lang="en-US"/>
+          </a:p>
+        </p:txBody>
+      </p:sp>
+    </p:spTree>
+    <p:extLst>
+      <p:ext uri="{BB962C8B-B14F-4D97-AF65-F5344CB8AC3E}">
+        <p14:creationId xmlns:p14="http://schemas.microsoft.com/office/powerpoint/2010/main" val="618583207"/>
+      </p:ext>
+    </p:extLst>
+  </p:cSld>
+  <p:clrMapOvr>
+    <a:masterClrMapping/>
+  </p:clrMapOvr>
+</p:notes>
+</file>
+
+<file path=ppt/notesSlides/notesSlide2.xml><?xml version="1.0" encoding="utf-8"?>
+<p:notes xmlns:a="http://schemas.openxmlformats.org/drawingml/2006/main" xmlns:r="http://schemas.openxmlformats.org/officeDocument/2006/relationships" xmlns:p="http://schemas.openxmlformats.org/presentationml/2006/main">
+  <p:cSld>
+    <p:spTree>
+      <p:nvGrpSpPr>
+        <p:cNvPr id="1" name=""/>
+        <p:cNvGrpSpPr/>
+        <p:nvPr/>
+      </p:nvGrpSpPr>
+      <p:grpSpPr>
+        <a:xfrm>
+          <a:off x="0" y="0"/>
+          <a:ext cx="0" cy="0"/>
+          <a:chOff x="0" y="0"/>
+          <a:chExt cx="0" cy="0"/>
+        </a:xfrm>
+      </p:grpSpPr>
+      <p:sp>
+        <p:nvSpPr>
+          <p:cNvPr id="2" name="Slide Image Placeholder 1"/>
+          <p:cNvSpPr>
+            <a:spLocks noGrp="1" noRot="1" noChangeAspect="1"/>
+          </p:cNvSpPr>
+          <p:nvPr>
+            <p:ph type="sldImg"/>
+          </p:nvPr>
+        </p:nvSpPr>
+        <p:spPr/>
+      </p:sp>
+      <p:sp>
+        <p:nvSpPr>
+          <p:cNvPr id="3" name="Notes Placeholder 2"/>
+          <p:cNvSpPr>
+            <a:spLocks noGrp="1"/>
+          </p:cNvSpPr>
+          <p:nvPr>
+            <p:ph type="body" idx="1"/>
+          </p:nvPr>
+        </p:nvSpPr>
+        <p:spPr/>
+        <p:txBody>
+          <a:bodyPr/>
+          <a:lstStyle/>
+          <a:p>
+            <a:endParaRPr lang="en-US"/>
+          </a:p>
+        </p:txBody>
+      </p:sp>
+      <p:sp>
+        <p:nvSpPr>
+          <p:cNvPr id="4" name="Slide Number Placeholder 3"/>
+          <p:cNvSpPr>
+            <a:spLocks noGrp="1"/>
+          </p:cNvSpPr>
+          <p:nvPr>
+            <p:ph type="sldNum" sz="quarter" idx="5"/>
+          </p:nvPr>
+        </p:nvSpPr>
+        <p:spPr/>
+        <p:txBody>
+          <a:bodyPr/>
+          <a:lstStyle/>
+          <a:p>
+            <a:fld id="{A03D08BC-40AD-479A-BB74-C1986F84DA16}" type="slidenum">
+              <a:rPr lang="en-US" smtClean="0"/>
+              <a:t>17</a:t>
+            </a:fld>
+            <a:endParaRPr lang="en-US"/>
+          </a:p>
+        </p:txBody>
+      </p:sp>
+    </p:spTree>
+    <p:extLst>
+      <p:ext uri="{BB962C8B-B14F-4D97-AF65-F5344CB8AC3E}">
+        <p14:creationId xmlns:p14="http://schemas.microsoft.com/office/powerpoint/2010/main" val="2604833366"/>
+      </p:ext>
+    </p:extLst>
+  </p:cSld>
+  <p:clrMapOvr>
+    <a:masterClrMapping/>
+  </p:clrMapOvr>
+</p:notes>
 </file>
 
 <file path=ppt/slideLayouts/slideLayout1.xml><?xml version="1.0" encoding="utf-8"?>
@@ -9727,31 +13085,32 @@
           </a:p>
         </p:txBody>
       </p:sp>
-      <p:sp>
-        <p:nvSpPr>
-          <p:cNvPr id="3" name="Content Placeholder 2">
+      <p:graphicFrame>
+        <p:nvGraphicFramePr>
+          <p:cNvPr id="4" name="Content Placeholder 2">
             <a:extLst>
               <a:ext uri="{FF2B5EF4-FFF2-40B4-BE49-F238E27FC236}">
-                <a16:creationId xmlns:a16="http://schemas.microsoft.com/office/drawing/2014/main" id="{E1F08575-032E-4F74-9BAD-5C12E7F52734}"/>
+                <a16:creationId xmlns:a16="http://schemas.microsoft.com/office/drawing/2014/main" id="{485E32D8-0549-4654-A985-A11D00AA2080}"/>
               </a:ext>
             </a:extLst>
           </p:cNvPr>
-          <p:cNvSpPr>
-            <a:spLocks noGrp="1"/>
-          </p:cNvSpPr>
+          <p:cNvGraphicFramePr>
+            <a:graphicFrameLocks noGrp="1"/>
+          </p:cNvGraphicFramePr>
           <p:nvPr>
             <p:ph idx="1"/>
           </p:nvPr>
-        </p:nvSpPr>
-        <p:spPr/>
-        <p:txBody>
-          <a:bodyPr/>
-          <a:lstStyle/>
-          <a:p>
-            <a:endParaRPr lang="en-US"/>
-          </a:p>
-        </p:txBody>
-      </p:sp>
+        </p:nvGraphicFramePr>
+        <p:xfrm>
+          <a:off x="581025" y="2341563"/>
+          <a:ext cx="11029950" cy="3633787"/>
+        </p:xfrm>
+        <a:graphic>
+          <a:graphicData uri="http://schemas.openxmlformats.org/drawingml/2006/diagram">
+            <dgm:relIds xmlns:dgm="http://schemas.openxmlformats.org/drawingml/2006/diagram" xmlns:r="http://schemas.openxmlformats.org/officeDocument/2006/relationships" r:dm="rId3" r:lo="rId4" r:qs="rId5" r:cs="rId6"/>
+          </a:graphicData>
+        </a:graphic>
+      </p:graphicFrame>
     </p:spTree>
     <p:extLst>
       <p:ext uri="{BB962C8B-B14F-4D97-AF65-F5344CB8AC3E}">
@@ -13767,6 +17126,301 @@
 </a:theme>
 </file>
 
+<file path=ppt/theme/theme2.xml><?xml version="1.0" encoding="utf-8"?>
+<a:theme xmlns:a="http://schemas.openxmlformats.org/drawingml/2006/main" name="Office Theme">
+  <a:themeElements>
+    <a:clrScheme name="Office">
+      <a:dk1>
+        <a:sysClr val="windowText" lastClr="000000"/>
+      </a:dk1>
+      <a:lt1>
+        <a:sysClr val="window" lastClr="FFFFFF"/>
+      </a:lt1>
+      <a:dk2>
+        <a:srgbClr val="44546A"/>
+      </a:dk2>
+      <a:lt2>
+        <a:srgbClr val="E7E6E6"/>
+      </a:lt2>
+      <a:accent1>
+        <a:srgbClr val="4472C4"/>
+      </a:accent1>
+      <a:accent2>
+        <a:srgbClr val="ED7D31"/>
+      </a:accent2>
+      <a:accent3>
+        <a:srgbClr val="A5A5A5"/>
+      </a:accent3>
+      <a:accent4>
+        <a:srgbClr val="FFC000"/>
+      </a:accent4>
+      <a:accent5>
+        <a:srgbClr val="5B9BD5"/>
+      </a:accent5>
+      <a:accent6>
+        <a:srgbClr val="70AD47"/>
+      </a:accent6>
+      <a:hlink>
+        <a:srgbClr val="0563C1"/>
+      </a:hlink>
+      <a:folHlink>
+        <a:srgbClr val="954F72"/>
+      </a:folHlink>
+    </a:clrScheme>
+    <a:fontScheme name="Office">
+      <a:majorFont>
+        <a:latin typeface="Calibri Light" panose="020F0302020204030204"/>
+        <a:ea typeface=""/>
+        <a:cs typeface=""/>
+        <a:font script="Jpan" typeface="游ゴシック Light"/>
+        <a:font script="Hang" typeface="맑은 고딕"/>
+        <a:font script="Hans" typeface="等线 Light"/>
+        <a:font script="Hant" typeface="新細明體"/>
+        <a:font script="Arab" typeface="Times New Roman"/>
+        <a:font script="Hebr" typeface="Times New Roman"/>
+        <a:font script="Thai" typeface="Angsana New"/>
+        <a:font script="Ethi" typeface="Nyala"/>
+        <a:font script="Beng" typeface="Vrinda"/>
+        <a:font script="Gujr" typeface="Shruti"/>
+        <a:font script="Khmr" typeface="MoolBoran"/>
+        <a:font script="Knda" typeface="Tunga"/>
+        <a:font script="Guru" typeface="Raavi"/>
+        <a:font script="Cans" typeface="Euphemia"/>
+        <a:font script="Cher" typeface="Plantagenet Cherokee"/>
+        <a:font script="Yiii" typeface="Microsoft Yi Baiti"/>
+        <a:font script="Tibt" typeface="Microsoft Himalaya"/>
+        <a:font script="Thaa" typeface="MV Boli"/>
+        <a:font script="Deva" typeface="Mangal"/>
+        <a:font script="Telu" typeface="Gautami"/>
+        <a:font script="Taml" typeface="Latha"/>
+        <a:font script="Syrc" typeface="Estrangelo Edessa"/>
+        <a:font script="Orya" typeface="Kalinga"/>
+        <a:font script="Mlym" typeface="Kartika"/>
+        <a:font script="Laoo" typeface="DokChampa"/>
+        <a:font script="Sinh" typeface="Iskoola Pota"/>
+        <a:font script="Mong" typeface="Mongolian Baiti"/>
+        <a:font script="Viet" typeface="Times New Roman"/>
+        <a:font script="Uigh" typeface="Microsoft Uighur"/>
+        <a:font script="Geor" typeface="Sylfaen"/>
+        <a:font script="Armn" typeface="Arial"/>
+        <a:font script="Bugi" typeface="Leelawadee UI"/>
+        <a:font script="Bopo" typeface="Microsoft JhengHei"/>
+        <a:font script="Java" typeface="Javanese Text"/>
+        <a:font script="Lisu" typeface="Segoe UI"/>
+        <a:font script="Mymr" typeface="Myanmar Text"/>
+        <a:font script="Nkoo" typeface="Ebrima"/>
+        <a:font script="Olck" typeface="Nirmala UI"/>
+        <a:font script="Osma" typeface="Ebrima"/>
+        <a:font script="Phag" typeface="Phagspa"/>
+        <a:font script="Syrn" typeface="Estrangelo Edessa"/>
+        <a:font script="Syrj" typeface="Estrangelo Edessa"/>
+        <a:font script="Syre" typeface="Estrangelo Edessa"/>
+        <a:font script="Sora" typeface="Nirmala UI"/>
+        <a:font script="Tale" typeface="Microsoft Tai Le"/>
+        <a:font script="Talu" typeface="Microsoft New Tai Lue"/>
+        <a:font script="Tfng" typeface="Ebrima"/>
+      </a:majorFont>
+      <a:minorFont>
+        <a:latin typeface="Calibri" panose="020F0502020204030204"/>
+        <a:ea typeface=""/>
+        <a:cs typeface=""/>
+        <a:font script="Jpan" typeface="游ゴシック"/>
+        <a:font script="Hang" typeface="맑은 고딕"/>
+        <a:font script="Hans" typeface="等线"/>
+        <a:font script="Hant" typeface="新細明體"/>
+        <a:font script="Arab" typeface="Arial"/>
+        <a:font script="Hebr" typeface="Arial"/>
+        <a:font script="Thai" typeface="Cordia New"/>
+        <a:font script="Ethi" typeface="Nyala"/>
+        <a:font script="Beng" typeface="Vrinda"/>
+        <a:font script="Gujr" typeface="Shruti"/>
+        <a:font script="Khmr" typeface="DaunPenh"/>
+        <a:font script="Knda" typeface="Tunga"/>
+        <a:font script="Guru" typeface="Raavi"/>
+        <a:font script="Cans" typeface="Euphemia"/>
+        <a:font script="Cher" typeface="Plantagenet Cherokee"/>
+        <a:font script="Yiii" typeface="Microsoft Yi Baiti"/>
+        <a:font script="Tibt" typeface="Microsoft Himalaya"/>
+        <a:font script="Thaa" typeface="MV Boli"/>
+        <a:font script="Deva" typeface="Mangal"/>
+        <a:font script="Telu" typeface="Gautami"/>
+        <a:font script="Taml" typeface="Latha"/>
+        <a:font script="Syrc" typeface="Estrangelo Edessa"/>
+        <a:font script="Orya" typeface="Kalinga"/>
+        <a:font script="Mlym" typeface="Kartika"/>
+        <a:font script="Laoo" typeface="DokChampa"/>
+        <a:font script="Sinh" typeface="Iskoola Pota"/>
+        <a:font script="Mong" typeface="Mongolian Baiti"/>
+        <a:font script="Viet" typeface="Arial"/>
+        <a:font script="Uigh" typeface="Microsoft Uighur"/>
+        <a:font script="Geor" typeface="Sylfaen"/>
+        <a:font script="Armn" typeface="Arial"/>
+        <a:font script="Bugi" typeface="Leelawadee UI"/>
+        <a:font script="Bopo" typeface="Microsoft JhengHei"/>
+        <a:font script="Java" typeface="Javanese Text"/>
+        <a:font script="Lisu" typeface="Segoe UI"/>
+        <a:font script="Mymr" typeface="Myanmar Text"/>
+        <a:font script="Nkoo" typeface="Ebrima"/>
+        <a:font script="Olck" typeface="Nirmala UI"/>
+        <a:font script="Osma" typeface="Ebrima"/>
+        <a:font script="Phag" typeface="Phagspa"/>
+        <a:font script="Syrn" typeface="Estrangelo Edessa"/>
+        <a:font script="Syrj" typeface="Estrangelo Edessa"/>
+        <a:font script="Syre" typeface="Estrangelo Edessa"/>
+        <a:font script="Sora" typeface="Nirmala UI"/>
+        <a:font script="Tale" typeface="Microsoft Tai Le"/>
+        <a:font script="Talu" typeface="Microsoft New Tai Lue"/>
+        <a:font script="Tfng" typeface="Ebrima"/>
+      </a:minorFont>
+    </a:fontScheme>
+    <a:fmtScheme name="Office">
+      <a:fillStyleLst>
+        <a:solidFill>
+          <a:schemeClr val="phClr"/>
+        </a:solidFill>
+        <a:gradFill rotWithShape="1">
+          <a:gsLst>
+            <a:gs pos="0">
+              <a:schemeClr val="phClr">
+                <a:lumMod val="110000"/>
+                <a:satMod val="105000"/>
+                <a:tint val="67000"/>
+              </a:schemeClr>
+            </a:gs>
+            <a:gs pos="50000">
+              <a:schemeClr val="phClr">
+                <a:lumMod val="105000"/>
+                <a:satMod val="103000"/>
+                <a:tint val="73000"/>
+              </a:schemeClr>
+            </a:gs>
+            <a:gs pos="100000">
+              <a:schemeClr val="phClr">
+                <a:lumMod val="105000"/>
+                <a:satMod val="109000"/>
+                <a:tint val="81000"/>
+              </a:schemeClr>
+            </a:gs>
+          </a:gsLst>
+          <a:lin ang="5400000" scaled="0"/>
+        </a:gradFill>
+        <a:gradFill rotWithShape="1">
+          <a:gsLst>
+            <a:gs pos="0">
+              <a:schemeClr val="phClr">
+                <a:satMod val="103000"/>
+                <a:lumMod val="102000"/>
+                <a:tint val="94000"/>
+              </a:schemeClr>
+            </a:gs>
+            <a:gs pos="50000">
+              <a:schemeClr val="phClr">
+                <a:satMod val="110000"/>
+                <a:lumMod val="100000"/>
+                <a:shade val="100000"/>
+              </a:schemeClr>
+            </a:gs>
+            <a:gs pos="100000">
+              <a:schemeClr val="phClr">
+                <a:lumMod val="99000"/>
+                <a:satMod val="120000"/>
+                <a:shade val="78000"/>
+              </a:schemeClr>
+            </a:gs>
+          </a:gsLst>
+          <a:lin ang="5400000" scaled="0"/>
+        </a:gradFill>
+      </a:fillStyleLst>
+      <a:lnStyleLst>
+        <a:ln w="6350" cap="flat" cmpd="sng" algn="ctr">
+          <a:solidFill>
+            <a:schemeClr val="phClr"/>
+          </a:solidFill>
+          <a:prstDash val="solid"/>
+          <a:miter lim="800000"/>
+        </a:ln>
+        <a:ln w="12700" cap="flat" cmpd="sng" algn="ctr">
+          <a:solidFill>
+            <a:schemeClr val="phClr"/>
+          </a:solidFill>
+          <a:prstDash val="solid"/>
+          <a:miter lim="800000"/>
+        </a:ln>
+        <a:ln w="19050" cap="flat" cmpd="sng" algn="ctr">
+          <a:solidFill>
+            <a:schemeClr val="phClr"/>
+          </a:solidFill>
+          <a:prstDash val="solid"/>
+          <a:miter lim="800000"/>
+        </a:ln>
+      </a:lnStyleLst>
+      <a:effectStyleLst>
+        <a:effectStyle>
+          <a:effectLst/>
+        </a:effectStyle>
+        <a:effectStyle>
+          <a:effectLst/>
+        </a:effectStyle>
+        <a:effectStyle>
+          <a:effectLst>
+            <a:outerShdw blurRad="57150" dist="19050" dir="5400000" algn="ctr" rotWithShape="0">
+              <a:srgbClr val="000000">
+                <a:alpha val="63000"/>
+              </a:srgbClr>
+            </a:outerShdw>
+          </a:effectLst>
+        </a:effectStyle>
+      </a:effectStyleLst>
+      <a:bgFillStyleLst>
+        <a:solidFill>
+          <a:schemeClr val="phClr"/>
+        </a:solidFill>
+        <a:solidFill>
+          <a:schemeClr val="phClr">
+            <a:tint val="95000"/>
+            <a:satMod val="170000"/>
+          </a:schemeClr>
+        </a:solidFill>
+        <a:gradFill rotWithShape="1">
+          <a:gsLst>
+            <a:gs pos="0">
+              <a:schemeClr val="phClr">
+                <a:tint val="93000"/>
+                <a:satMod val="150000"/>
+                <a:shade val="98000"/>
+                <a:lumMod val="102000"/>
+              </a:schemeClr>
+            </a:gs>
+            <a:gs pos="50000">
+              <a:schemeClr val="phClr">
+                <a:tint val="98000"/>
+                <a:satMod val="130000"/>
+                <a:shade val="90000"/>
+                <a:lumMod val="103000"/>
+              </a:schemeClr>
+            </a:gs>
+            <a:gs pos="100000">
+              <a:schemeClr val="phClr">
+                <a:shade val="63000"/>
+                <a:satMod val="120000"/>
+              </a:schemeClr>
+            </a:gs>
+          </a:gsLst>
+          <a:lin ang="5400000" scaled="0"/>
+        </a:gradFill>
+      </a:bgFillStyleLst>
+    </a:fmtScheme>
+  </a:themeElements>
+  <a:objectDefaults/>
+  <a:extraClrSchemeLst/>
+  <a:extLst>
+    <a:ext uri="{05A4C25C-085E-4340-85A3-A5531E510DB2}">
+      <thm15:themeFamily xmlns:thm15="http://schemas.microsoft.com/office/thememl/2012/main" name="Office Theme" id="{62F939B6-93AF-4DB8-9C6B-D6C7DFDC589F}" vid="{4A3C46E8-61CC-4603-A589-7422A47A8E4A}"/>
+    </a:ext>
+  </a:extLst>
+</a:theme>
+</file>
+
 <file path=customXml/item1.xml><?xml version="1.0" encoding="utf-8"?>
 <p:properties xmlns:p="http://schemas.microsoft.com/office/2006/metadata/properties" xmlns:xsi="http://www.w3.org/2001/XMLSchema-instance" xmlns:pc="http://schemas.microsoft.com/office/infopath/2007/PartnerControls">
   <documentManagement>

</xml_diff>

<commit_message>
do first round of editing, after assembly
</commit_message>
<xml_diff>
--- a/Week8_OrgNeedsPresentation/BachmeierNTIM8301-8.pptx
+++ b/Week8_OrgNeedsPresentation/BachmeierNTIM8301-8.pptx
@@ -1973,6 +1973,927 @@
     <dgm:txLinClrLst/>
     <dgm:txFillClrLst meth="repeat">
       <a:schemeClr val="tx1"/>
+    </dgm:txFillClrLst>
+    <dgm:txEffectClrLst/>
+  </dgm:styleLbl>
+</dgm:colorsDef>
+</file>
+
+<file path=ppt/diagrams/colors11.xml><?xml version="1.0" encoding="utf-8"?>
+<dgm:colorsDef xmlns:dgm="http://schemas.openxmlformats.org/drawingml/2006/diagram" xmlns:a="http://schemas.openxmlformats.org/drawingml/2006/main" uniqueId="urn:microsoft.com/office/officeart/2018/5/colors/Iconchunking_neutralicontext_colorful1">
+  <dgm:title val=""/>
+  <dgm:desc val=""/>
+  <dgm:catLst>
+    <dgm:cat type="colorful" pri="10100"/>
+  </dgm:catLst>
+  <dgm:styleLbl name="node0">
+    <dgm:fillClrLst meth="repeat">
+      <a:schemeClr val="accent1"/>
+    </dgm:fillClrLst>
+    <dgm:linClrLst meth="repeat">
+      <a:schemeClr val="lt1"/>
+    </dgm:linClrLst>
+    <dgm:effectClrLst/>
+    <dgm:txLinClrLst/>
+    <dgm:txFillClrLst/>
+    <dgm:txEffectClrLst/>
+  </dgm:styleLbl>
+  <dgm:styleLbl name="node1">
+    <dgm:fillClrLst meth="repeat">
+      <a:schemeClr val="bg1"/>
+    </dgm:fillClrLst>
+    <dgm:linClrLst meth="repeat">
+      <a:schemeClr val="lt1">
+        <a:alpha val="0"/>
+      </a:schemeClr>
+    </dgm:linClrLst>
+    <dgm:effectClrLst/>
+    <dgm:txLinClrLst/>
+    <dgm:txFillClrLst meth="repeat">
+      <a:schemeClr val="dk1"/>
+    </dgm:txFillClrLst>
+    <dgm:txEffectClrLst/>
+  </dgm:styleLbl>
+  <dgm:styleLbl name="alignNode1">
+    <dgm:fillClrLst meth="repeat">
+      <a:schemeClr val="accent2"/>
+      <a:schemeClr val="accent3"/>
+      <a:schemeClr val="accent4"/>
+      <a:schemeClr val="accent5"/>
+      <a:schemeClr val="accent6"/>
+    </dgm:fillClrLst>
+    <dgm:linClrLst meth="repeat">
+      <a:schemeClr val="accent2"/>
+      <a:schemeClr val="accent3"/>
+      <a:schemeClr val="accent4"/>
+      <a:schemeClr val="accent5"/>
+      <a:schemeClr val="accent6"/>
+    </dgm:linClrLst>
+    <dgm:effectClrLst/>
+    <dgm:txLinClrLst/>
+    <dgm:txFillClrLst/>
+    <dgm:txEffectClrLst/>
+  </dgm:styleLbl>
+  <dgm:styleLbl name="lnNode1">
+    <dgm:fillClrLst meth="repeat">
+      <a:schemeClr val="accent2"/>
+      <a:schemeClr val="accent3"/>
+      <a:schemeClr val="accent4"/>
+      <a:schemeClr val="accent5"/>
+      <a:schemeClr val="accent6"/>
+    </dgm:fillClrLst>
+    <dgm:linClrLst meth="repeat">
+      <a:schemeClr val="lt1"/>
+    </dgm:linClrLst>
+    <dgm:effectClrLst/>
+    <dgm:txLinClrLst/>
+    <dgm:txFillClrLst/>
+    <dgm:txEffectClrLst/>
+  </dgm:styleLbl>
+  <dgm:styleLbl name="vennNode1">
+    <dgm:fillClrLst meth="repeat">
+      <a:schemeClr val="accent2">
+        <a:alpha val="50000"/>
+      </a:schemeClr>
+      <a:schemeClr val="accent3">
+        <a:alpha val="50000"/>
+      </a:schemeClr>
+      <a:schemeClr val="accent4">
+        <a:alpha val="50000"/>
+      </a:schemeClr>
+      <a:schemeClr val="accent5">
+        <a:alpha val="50000"/>
+      </a:schemeClr>
+      <a:schemeClr val="accent6">
+        <a:alpha val="50000"/>
+      </a:schemeClr>
+    </dgm:fillClrLst>
+    <dgm:linClrLst meth="repeat">
+      <a:schemeClr val="lt1"/>
+    </dgm:linClrLst>
+    <dgm:effectClrLst/>
+    <dgm:txLinClrLst/>
+    <dgm:txFillClrLst/>
+    <dgm:txEffectClrLst/>
+  </dgm:styleLbl>
+  <dgm:styleLbl name="node2">
+    <dgm:fillClrLst>
+      <a:schemeClr val="accent2"/>
+    </dgm:fillClrLst>
+    <dgm:linClrLst meth="repeat">
+      <a:schemeClr val="lt1"/>
+    </dgm:linClrLst>
+    <dgm:effectClrLst/>
+    <dgm:txLinClrLst/>
+    <dgm:txFillClrLst/>
+    <dgm:txEffectClrLst/>
+  </dgm:styleLbl>
+  <dgm:styleLbl name="node3">
+    <dgm:fillClrLst>
+      <a:schemeClr val="accent3"/>
+    </dgm:fillClrLst>
+    <dgm:linClrLst meth="repeat">
+      <a:schemeClr val="lt1"/>
+    </dgm:linClrLst>
+    <dgm:effectClrLst/>
+    <dgm:txLinClrLst/>
+    <dgm:txFillClrLst/>
+    <dgm:txEffectClrLst/>
+  </dgm:styleLbl>
+  <dgm:styleLbl name="node4">
+    <dgm:fillClrLst>
+      <a:schemeClr val="accent4"/>
+    </dgm:fillClrLst>
+    <dgm:linClrLst meth="repeat">
+      <a:schemeClr val="lt1"/>
+    </dgm:linClrLst>
+    <dgm:effectClrLst/>
+    <dgm:txLinClrLst/>
+    <dgm:txFillClrLst/>
+    <dgm:txEffectClrLst/>
+  </dgm:styleLbl>
+  <dgm:styleLbl name="fgImgPlace1">
+    <dgm:fillClrLst meth="repeat">
+      <a:schemeClr val="accent2">
+        <a:tint val="50000"/>
+      </a:schemeClr>
+      <a:schemeClr val="accent3">
+        <a:tint val="50000"/>
+      </a:schemeClr>
+      <a:schemeClr val="accent4">
+        <a:tint val="50000"/>
+      </a:schemeClr>
+      <a:schemeClr val="accent5">
+        <a:tint val="50000"/>
+      </a:schemeClr>
+      <a:schemeClr val="accent6">
+        <a:tint val="50000"/>
+      </a:schemeClr>
+    </dgm:fillClrLst>
+    <dgm:linClrLst meth="repeat">
+      <a:schemeClr val="lt1"/>
+    </dgm:linClrLst>
+    <dgm:effectClrLst/>
+    <dgm:txLinClrLst/>
+    <dgm:txFillClrLst meth="repeat">
+      <a:schemeClr val="lt1"/>
+    </dgm:txFillClrLst>
+    <dgm:txEffectClrLst/>
+  </dgm:styleLbl>
+  <dgm:styleLbl name="alignImgPlace1">
+    <dgm:fillClrLst>
+      <a:schemeClr val="accent1">
+        <a:tint val="50000"/>
+      </a:schemeClr>
+      <a:schemeClr val="accent2">
+        <a:tint val="20000"/>
+      </a:schemeClr>
+    </dgm:fillClrLst>
+    <dgm:linClrLst meth="repeat">
+      <a:schemeClr val="lt1"/>
+    </dgm:linClrLst>
+    <dgm:effectClrLst/>
+    <dgm:txLinClrLst/>
+    <dgm:txFillClrLst meth="repeat">
+      <a:schemeClr val="lt1"/>
+    </dgm:txFillClrLst>
+    <dgm:txEffectClrLst/>
+  </dgm:styleLbl>
+  <dgm:styleLbl name="bgImgPlace1">
+    <dgm:fillClrLst>
+      <a:schemeClr val="accent1">
+        <a:tint val="50000"/>
+      </a:schemeClr>
+      <a:schemeClr val="accent2">
+        <a:tint val="20000"/>
+      </a:schemeClr>
+    </dgm:fillClrLst>
+    <dgm:linClrLst meth="repeat">
+      <a:schemeClr val="lt1"/>
+    </dgm:linClrLst>
+    <dgm:effectClrLst/>
+    <dgm:txLinClrLst/>
+    <dgm:txFillClrLst meth="repeat">
+      <a:schemeClr val="lt1"/>
+    </dgm:txFillClrLst>
+    <dgm:txEffectClrLst/>
+  </dgm:styleLbl>
+  <dgm:styleLbl name="sibTrans2D1">
+    <dgm:fillClrLst meth="repeat">
+      <a:schemeClr val="accent2"/>
+      <a:schemeClr val="accent3"/>
+      <a:schemeClr val="accent4"/>
+      <a:schemeClr val="accent5"/>
+      <a:schemeClr val="accent6"/>
+    </dgm:fillClrLst>
+    <dgm:linClrLst meth="cycle">
+      <a:schemeClr val="lt1"/>
+    </dgm:linClrLst>
+    <dgm:effectClrLst/>
+    <dgm:txLinClrLst/>
+    <dgm:txFillClrLst/>
+    <dgm:txEffectClrLst/>
+  </dgm:styleLbl>
+  <dgm:styleLbl name="fgSibTrans2D1">
+    <dgm:fillClrLst meth="repeat">
+      <a:schemeClr val="accent2"/>
+      <a:schemeClr val="accent3"/>
+      <a:schemeClr val="accent4"/>
+      <a:schemeClr val="accent5"/>
+      <a:schemeClr val="accent6"/>
+    </dgm:fillClrLst>
+    <dgm:linClrLst meth="cycle">
+      <a:schemeClr val="lt1"/>
+    </dgm:linClrLst>
+    <dgm:effectClrLst/>
+    <dgm:txLinClrLst/>
+    <dgm:txFillClrLst meth="repeat">
+      <a:schemeClr val="lt1"/>
+    </dgm:txFillClrLst>
+    <dgm:txEffectClrLst/>
+  </dgm:styleLbl>
+  <dgm:styleLbl name="bgSibTrans2D1">
+    <dgm:fillClrLst meth="repeat">
+      <a:schemeClr val="accent2"/>
+      <a:schemeClr val="accent3"/>
+      <a:schemeClr val="accent4"/>
+      <a:schemeClr val="accent5"/>
+      <a:schemeClr val="accent6"/>
+    </dgm:fillClrLst>
+    <dgm:linClrLst meth="cycle">
+      <a:schemeClr val="lt1"/>
+    </dgm:linClrLst>
+    <dgm:effectClrLst/>
+    <dgm:txLinClrLst/>
+    <dgm:txFillClrLst meth="repeat">
+      <a:schemeClr val="lt1"/>
+    </dgm:txFillClrLst>
+    <dgm:txEffectClrLst/>
+  </dgm:styleLbl>
+  <dgm:styleLbl name="sibTrans1D1">
+    <dgm:fillClrLst meth="repeat">
+      <a:schemeClr val="accent2"/>
+      <a:schemeClr val="accent3"/>
+      <a:schemeClr val="accent4"/>
+      <a:schemeClr val="accent5"/>
+      <a:schemeClr val="accent6"/>
+    </dgm:fillClrLst>
+    <dgm:linClrLst meth="repeat">
+      <a:schemeClr val="accent2"/>
+      <a:schemeClr val="accent3"/>
+      <a:schemeClr val="accent4"/>
+      <a:schemeClr val="accent5"/>
+      <a:schemeClr val="accent6"/>
+    </dgm:linClrLst>
+    <dgm:effectClrLst/>
+    <dgm:txLinClrLst/>
+    <dgm:txFillClrLst meth="repeat">
+      <a:schemeClr val="tx1"/>
+    </dgm:txFillClrLst>
+    <dgm:txEffectClrLst/>
+  </dgm:styleLbl>
+  <dgm:styleLbl name="callout">
+    <dgm:fillClrLst meth="repeat">
+      <a:schemeClr val="accent2"/>
+    </dgm:fillClrLst>
+    <dgm:linClrLst meth="repeat">
+      <a:schemeClr val="accent2">
+        <a:tint val="50000"/>
+      </a:schemeClr>
+    </dgm:linClrLst>
+    <dgm:effectClrLst/>
+    <dgm:txLinClrLst/>
+    <dgm:txFillClrLst meth="repeat">
+      <a:schemeClr val="tx1"/>
+    </dgm:txFillClrLst>
+    <dgm:txEffectClrLst/>
+  </dgm:styleLbl>
+  <dgm:styleLbl name="asst0">
+    <dgm:fillClrLst meth="repeat">
+      <a:schemeClr val="accent1"/>
+    </dgm:fillClrLst>
+    <dgm:linClrLst meth="repeat">
+      <a:schemeClr val="lt1"/>
+    </dgm:linClrLst>
+    <dgm:effectClrLst/>
+    <dgm:txLinClrLst/>
+    <dgm:txFillClrLst/>
+    <dgm:txEffectClrLst/>
+  </dgm:styleLbl>
+  <dgm:styleLbl name="asst1">
+    <dgm:fillClrLst meth="repeat">
+      <a:schemeClr val="accent2"/>
+    </dgm:fillClrLst>
+    <dgm:linClrLst meth="repeat">
+      <a:schemeClr val="lt1"/>
+    </dgm:linClrLst>
+    <dgm:effectClrLst/>
+    <dgm:txLinClrLst/>
+    <dgm:txFillClrLst/>
+    <dgm:txEffectClrLst/>
+  </dgm:styleLbl>
+  <dgm:styleLbl name="asst2">
+    <dgm:fillClrLst>
+      <a:schemeClr val="accent3"/>
+    </dgm:fillClrLst>
+    <dgm:linClrLst meth="repeat">
+      <a:schemeClr val="lt1"/>
+    </dgm:linClrLst>
+    <dgm:effectClrLst/>
+    <dgm:txLinClrLst/>
+    <dgm:txFillClrLst/>
+    <dgm:txEffectClrLst/>
+  </dgm:styleLbl>
+  <dgm:styleLbl name="asst3">
+    <dgm:fillClrLst>
+      <a:schemeClr val="accent4"/>
+    </dgm:fillClrLst>
+    <dgm:linClrLst meth="repeat">
+      <a:schemeClr val="lt1"/>
+    </dgm:linClrLst>
+    <dgm:effectClrLst/>
+    <dgm:txLinClrLst/>
+    <dgm:txFillClrLst/>
+    <dgm:txEffectClrLst/>
+  </dgm:styleLbl>
+  <dgm:styleLbl name="asst4">
+    <dgm:fillClrLst>
+      <a:schemeClr val="accent5"/>
+    </dgm:fillClrLst>
+    <dgm:linClrLst meth="repeat">
+      <a:schemeClr val="lt1"/>
+    </dgm:linClrLst>
+    <dgm:effectClrLst/>
+    <dgm:txLinClrLst/>
+    <dgm:txFillClrLst/>
+    <dgm:txEffectClrLst/>
+  </dgm:styleLbl>
+  <dgm:styleLbl name="parChTrans2D1">
+    <dgm:fillClrLst meth="repeat">
+      <a:schemeClr val="accent2"/>
+    </dgm:fillClrLst>
+    <dgm:linClrLst meth="repeat">
+      <a:schemeClr val="lt1"/>
+    </dgm:linClrLst>
+    <dgm:effectClrLst/>
+    <dgm:txLinClrLst/>
+    <dgm:txFillClrLst meth="repeat">
+      <a:schemeClr val="lt1"/>
+    </dgm:txFillClrLst>
+    <dgm:txEffectClrLst/>
+  </dgm:styleLbl>
+  <dgm:styleLbl name="parChTrans2D2">
+    <dgm:fillClrLst meth="repeat">
+      <a:schemeClr val="accent3"/>
+    </dgm:fillClrLst>
+    <dgm:linClrLst meth="repeat">
+      <a:schemeClr val="lt1"/>
+    </dgm:linClrLst>
+    <dgm:effectClrLst/>
+    <dgm:txLinClrLst/>
+    <dgm:txFillClrLst/>
+    <dgm:txEffectClrLst/>
+  </dgm:styleLbl>
+  <dgm:styleLbl name="parChTrans2D3">
+    <dgm:fillClrLst meth="repeat">
+      <a:schemeClr val="accent4"/>
+    </dgm:fillClrLst>
+    <dgm:linClrLst meth="repeat">
+      <a:schemeClr val="lt1"/>
+    </dgm:linClrLst>
+    <dgm:effectClrLst/>
+    <dgm:txLinClrLst/>
+    <dgm:txFillClrLst/>
+    <dgm:txEffectClrLst/>
+  </dgm:styleLbl>
+  <dgm:styleLbl name="parChTrans2D4">
+    <dgm:fillClrLst meth="repeat">
+      <a:schemeClr val="accent5"/>
+    </dgm:fillClrLst>
+    <dgm:linClrLst meth="repeat">
+      <a:schemeClr val="lt1"/>
+    </dgm:linClrLst>
+    <dgm:effectClrLst/>
+    <dgm:txLinClrLst/>
+    <dgm:txFillClrLst meth="repeat">
+      <a:schemeClr val="lt1"/>
+    </dgm:txFillClrLst>
+    <dgm:txEffectClrLst/>
+  </dgm:styleLbl>
+  <dgm:styleLbl name="parChTrans1D1">
+    <dgm:fillClrLst meth="repeat">
+      <a:schemeClr val="accent2"/>
+    </dgm:fillClrLst>
+    <dgm:linClrLst meth="repeat">
+      <a:schemeClr val="accent1"/>
+    </dgm:linClrLst>
+    <dgm:effectClrLst/>
+    <dgm:txLinClrLst/>
+    <dgm:txFillClrLst meth="repeat">
+      <a:schemeClr val="tx1"/>
+    </dgm:txFillClrLst>
+    <dgm:txEffectClrLst/>
+  </dgm:styleLbl>
+  <dgm:styleLbl name="parChTrans1D2">
+    <dgm:fillClrLst meth="repeat">
+      <a:schemeClr val="accent3">
+        <a:tint val="90000"/>
+      </a:schemeClr>
+    </dgm:fillClrLst>
+    <dgm:linClrLst meth="repeat">
+      <a:schemeClr val="accent2"/>
+    </dgm:linClrLst>
+    <dgm:effectClrLst/>
+    <dgm:txLinClrLst/>
+    <dgm:txFillClrLst meth="repeat">
+      <a:schemeClr val="tx1"/>
+    </dgm:txFillClrLst>
+    <dgm:txEffectClrLst/>
+  </dgm:styleLbl>
+  <dgm:styleLbl name="parChTrans1D3">
+    <dgm:fillClrLst meth="repeat">
+      <a:schemeClr val="accent4">
+        <a:tint val="70000"/>
+      </a:schemeClr>
+    </dgm:fillClrLst>
+    <dgm:linClrLst meth="repeat">
+      <a:schemeClr val="accent3"/>
+    </dgm:linClrLst>
+    <dgm:effectClrLst/>
+    <dgm:txLinClrLst/>
+    <dgm:txFillClrLst meth="repeat">
+      <a:schemeClr val="tx1"/>
+    </dgm:txFillClrLst>
+    <dgm:txEffectClrLst/>
+  </dgm:styleLbl>
+  <dgm:styleLbl name="parChTrans1D4">
+    <dgm:fillClrLst meth="repeat">
+      <a:schemeClr val="accent5">
+        <a:tint val="50000"/>
+      </a:schemeClr>
+    </dgm:fillClrLst>
+    <dgm:linClrLst meth="repeat">
+      <a:schemeClr val="accent4"/>
+    </dgm:linClrLst>
+    <dgm:effectClrLst/>
+    <dgm:txLinClrLst/>
+    <dgm:txFillClrLst meth="repeat">
+      <a:schemeClr val="tx1"/>
+    </dgm:txFillClrLst>
+    <dgm:txEffectClrLst/>
+  </dgm:styleLbl>
+  <dgm:styleLbl name="fgAcc1">
+    <dgm:fillClrLst meth="repeat">
+      <a:schemeClr val="lt1">
+        <a:alpha val="90000"/>
+      </a:schemeClr>
+    </dgm:fillClrLst>
+    <dgm:linClrLst meth="repeat">
+      <a:schemeClr val="accent2"/>
+      <a:schemeClr val="accent3"/>
+      <a:schemeClr val="accent4"/>
+      <a:schemeClr val="accent5"/>
+      <a:schemeClr val="accent6"/>
+    </dgm:linClrLst>
+    <dgm:effectClrLst/>
+    <dgm:txLinClrLst/>
+    <dgm:txFillClrLst meth="repeat">
+      <a:schemeClr val="dk1"/>
+    </dgm:txFillClrLst>
+    <dgm:txEffectClrLst/>
+  </dgm:styleLbl>
+  <dgm:styleLbl name="conFgAcc1">
+    <dgm:fillClrLst meth="repeat">
+      <a:schemeClr val="lt1">
+        <a:alpha val="90000"/>
+      </a:schemeClr>
+    </dgm:fillClrLst>
+    <dgm:linClrLst meth="repeat">
+      <a:schemeClr val="accent2"/>
+      <a:schemeClr val="accent3"/>
+      <a:schemeClr val="accent4"/>
+      <a:schemeClr val="accent5"/>
+      <a:schemeClr val="accent6"/>
+    </dgm:linClrLst>
+    <dgm:effectClrLst/>
+    <dgm:txLinClrLst/>
+    <dgm:txFillClrLst meth="repeat">
+      <a:schemeClr val="dk1"/>
+    </dgm:txFillClrLst>
+    <dgm:txEffectClrLst/>
+  </dgm:styleLbl>
+  <dgm:styleLbl name="alignAcc1">
+    <dgm:fillClrLst meth="repeat">
+      <a:schemeClr val="lt1">
+        <a:alpha val="90000"/>
+      </a:schemeClr>
+    </dgm:fillClrLst>
+    <dgm:linClrLst meth="repeat">
+      <a:schemeClr val="accent2"/>
+      <a:schemeClr val="accent3"/>
+      <a:schemeClr val="accent4"/>
+      <a:schemeClr val="accent5"/>
+      <a:schemeClr val="accent6"/>
+    </dgm:linClrLst>
+    <dgm:effectClrLst/>
+    <dgm:txLinClrLst/>
+    <dgm:txFillClrLst meth="repeat">
+      <a:schemeClr val="dk1"/>
+    </dgm:txFillClrLst>
+    <dgm:txEffectClrLst/>
+  </dgm:styleLbl>
+  <dgm:styleLbl name="trAlignAcc1">
+    <dgm:fillClrLst meth="repeat">
+      <a:schemeClr val="lt1">
+        <a:alpha val="40000"/>
+      </a:schemeClr>
+    </dgm:fillClrLst>
+    <dgm:linClrLst meth="repeat">
+      <a:schemeClr val="accent1"/>
+    </dgm:linClrLst>
+    <dgm:effectClrLst/>
+    <dgm:txLinClrLst/>
+    <dgm:txFillClrLst meth="repeat">
+      <a:schemeClr val="dk1"/>
+    </dgm:txFillClrLst>
+    <dgm:txEffectClrLst/>
+  </dgm:styleLbl>
+  <dgm:styleLbl name="bgAcc1">
+    <dgm:fillClrLst meth="repeat">
+      <a:schemeClr val="lt1">
+        <a:alpha val="90000"/>
+      </a:schemeClr>
+    </dgm:fillClrLst>
+    <dgm:linClrLst meth="repeat">
+      <a:schemeClr val="accent2"/>
+      <a:schemeClr val="accent3"/>
+      <a:schemeClr val="accent4"/>
+      <a:schemeClr val="accent5"/>
+      <a:schemeClr val="accent6"/>
+    </dgm:linClrLst>
+    <dgm:effectClrLst/>
+    <dgm:txLinClrLst/>
+    <dgm:txFillClrLst meth="repeat">
+      <a:schemeClr val="dk1"/>
+    </dgm:txFillClrLst>
+    <dgm:txEffectClrLst/>
+  </dgm:styleLbl>
+  <dgm:styleLbl name="solidFgAcc1">
+    <dgm:fillClrLst meth="repeat">
+      <a:schemeClr val="lt1"/>
+    </dgm:fillClrLst>
+    <dgm:linClrLst meth="repeat">
+      <a:schemeClr val="accent2"/>
+      <a:schemeClr val="accent3"/>
+      <a:schemeClr val="accent4"/>
+      <a:schemeClr val="accent5"/>
+      <a:schemeClr val="accent6"/>
+    </dgm:linClrLst>
+    <dgm:effectClrLst/>
+    <dgm:txLinClrLst/>
+    <dgm:txFillClrLst meth="repeat">
+      <a:schemeClr val="dk1"/>
+    </dgm:txFillClrLst>
+    <dgm:txEffectClrLst/>
+  </dgm:styleLbl>
+  <dgm:styleLbl name="solidAlignAcc1">
+    <dgm:fillClrLst meth="repeat">
+      <a:schemeClr val="lt1"/>
+    </dgm:fillClrLst>
+    <dgm:linClrLst meth="repeat">
+      <a:schemeClr val="accent2"/>
+      <a:schemeClr val="accent3"/>
+      <a:schemeClr val="accent4"/>
+      <a:schemeClr val="accent5"/>
+      <a:schemeClr val="accent6"/>
+    </dgm:linClrLst>
+    <dgm:effectClrLst/>
+    <dgm:txLinClrLst/>
+    <dgm:txFillClrLst meth="repeat">
+      <a:schemeClr val="dk1"/>
+    </dgm:txFillClrLst>
+    <dgm:txEffectClrLst/>
+  </dgm:styleLbl>
+  <dgm:styleLbl name="solidBgAcc1">
+    <dgm:fillClrLst meth="repeat">
+      <a:schemeClr val="lt1"/>
+    </dgm:fillClrLst>
+    <dgm:linClrLst meth="repeat">
+      <a:schemeClr val="accent2"/>
+      <a:schemeClr val="accent3"/>
+      <a:schemeClr val="accent4"/>
+      <a:schemeClr val="accent5"/>
+      <a:schemeClr val="accent6"/>
+    </dgm:linClrLst>
+    <dgm:effectClrLst/>
+    <dgm:txLinClrLst/>
+    <dgm:txFillClrLst meth="repeat">
+      <a:schemeClr val="dk1"/>
+    </dgm:txFillClrLst>
+    <dgm:txEffectClrLst/>
+  </dgm:styleLbl>
+  <dgm:styleLbl name="fgAccFollowNode1">
+    <dgm:fillClrLst meth="repeat">
+      <a:schemeClr val="accent2">
+        <a:tint val="40000"/>
+        <a:alpha val="90000"/>
+      </a:schemeClr>
+      <a:schemeClr val="accent3">
+        <a:tint val="40000"/>
+        <a:alpha val="90000"/>
+      </a:schemeClr>
+      <a:schemeClr val="accent4">
+        <a:tint val="40000"/>
+        <a:alpha val="90000"/>
+      </a:schemeClr>
+      <a:schemeClr val="accent5">
+        <a:tint val="40000"/>
+        <a:alpha val="90000"/>
+      </a:schemeClr>
+      <a:schemeClr val="accent6">
+        <a:tint val="40000"/>
+        <a:alpha val="90000"/>
+      </a:schemeClr>
+    </dgm:fillClrLst>
+    <dgm:linClrLst meth="repeat">
+      <a:schemeClr val="accent2">
+        <a:tint val="40000"/>
+        <a:alpha val="90000"/>
+      </a:schemeClr>
+      <a:schemeClr val="accent3">
+        <a:tint val="40000"/>
+        <a:alpha val="90000"/>
+      </a:schemeClr>
+      <a:schemeClr val="accent4">
+        <a:tint val="40000"/>
+        <a:alpha val="90000"/>
+      </a:schemeClr>
+      <a:schemeClr val="accent5">
+        <a:tint val="40000"/>
+        <a:alpha val="90000"/>
+      </a:schemeClr>
+      <a:schemeClr val="accent6">
+        <a:tint val="40000"/>
+        <a:alpha val="90000"/>
+      </a:schemeClr>
+    </dgm:linClrLst>
+    <dgm:effectClrLst/>
+    <dgm:txLinClrLst/>
+    <dgm:txFillClrLst meth="repeat">
+      <a:schemeClr val="dk1"/>
+    </dgm:txFillClrLst>
+    <dgm:txEffectClrLst/>
+  </dgm:styleLbl>
+  <dgm:styleLbl name="alignAccFollowNode1">
+    <dgm:fillClrLst meth="repeat">
+      <a:schemeClr val="accent2">
+        <a:tint val="40000"/>
+        <a:alpha val="90000"/>
+      </a:schemeClr>
+      <a:schemeClr val="accent3">
+        <a:tint val="40000"/>
+        <a:alpha val="90000"/>
+      </a:schemeClr>
+      <a:schemeClr val="accent4">
+        <a:tint val="40000"/>
+        <a:alpha val="90000"/>
+      </a:schemeClr>
+      <a:schemeClr val="accent5">
+        <a:tint val="40000"/>
+        <a:alpha val="90000"/>
+      </a:schemeClr>
+      <a:schemeClr val="accent6">
+        <a:tint val="40000"/>
+        <a:alpha val="90000"/>
+      </a:schemeClr>
+    </dgm:fillClrLst>
+    <dgm:linClrLst meth="repeat">
+      <a:schemeClr val="accent2">
+        <a:tint val="40000"/>
+        <a:alpha val="90000"/>
+      </a:schemeClr>
+      <a:schemeClr val="accent3">
+        <a:tint val="40000"/>
+        <a:alpha val="90000"/>
+      </a:schemeClr>
+      <a:schemeClr val="accent4">
+        <a:tint val="40000"/>
+        <a:alpha val="90000"/>
+      </a:schemeClr>
+      <a:schemeClr val="accent5">
+        <a:tint val="40000"/>
+        <a:alpha val="90000"/>
+      </a:schemeClr>
+      <a:schemeClr val="accent6">
+        <a:tint val="40000"/>
+        <a:alpha val="90000"/>
+      </a:schemeClr>
+    </dgm:linClrLst>
+    <dgm:effectClrLst/>
+    <dgm:txLinClrLst/>
+    <dgm:txFillClrLst meth="repeat">
+      <a:schemeClr val="dk1"/>
+    </dgm:txFillClrLst>
+    <dgm:txEffectClrLst/>
+  </dgm:styleLbl>
+  <dgm:styleLbl name="bgAccFollowNode1">
+    <dgm:fillClrLst meth="repeat">
+      <a:schemeClr val="accent2">
+        <a:tint val="40000"/>
+        <a:alpha val="90000"/>
+      </a:schemeClr>
+      <a:schemeClr val="accent3">
+        <a:tint val="40000"/>
+        <a:alpha val="90000"/>
+      </a:schemeClr>
+      <a:schemeClr val="accent4">
+        <a:tint val="40000"/>
+        <a:alpha val="90000"/>
+      </a:schemeClr>
+      <a:schemeClr val="accent5">
+        <a:tint val="40000"/>
+        <a:alpha val="90000"/>
+      </a:schemeClr>
+      <a:schemeClr val="accent6">
+        <a:tint val="40000"/>
+        <a:alpha val="90000"/>
+      </a:schemeClr>
+    </dgm:fillClrLst>
+    <dgm:linClrLst meth="repeat">
+      <a:schemeClr val="accent2">
+        <a:tint val="40000"/>
+        <a:alpha val="90000"/>
+      </a:schemeClr>
+      <a:schemeClr val="accent3">
+        <a:tint val="40000"/>
+        <a:alpha val="90000"/>
+      </a:schemeClr>
+      <a:schemeClr val="accent4">
+        <a:tint val="40000"/>
+        <a:alpha val="90000"/>
+      </a:schemeClr>
+      <a:schemeClr val="accent5">
+        <a:tint val="40000"/>
+        <a:alpha val="90000"/>
+      </a:schemeClr>
+      <a:schemeClr val="accent6">
+        <a:tint val="40000"/>
+        <a:alpha val="90000"/>
+      </a:schemeClr>
+    </dgm:linClrLst>
+    <dgm:effectClrLst/>
+    <dgm:txLinClrLst/>
+    <dgm:txFillClrLst meth="repeat">
+      <a:schemeClr val="dk1"/>
+    </dgm:txFillClrLst>
+    <dgm:txEffectClrLst/>
+  </dgm:styleLbl>
+  <dgm:styleLbl name="fgAcc0">
+    <dgm:fillClrLst meth="repeat">
+      <a:schemeClr val="lt1">
+        <a:alpha val="90000"/>
+      </a:schemeClr>
+    </dgm:fillClrLst>
+    <dgm:linClrLst>
+      <a:schemeClr val="accent1"/>
+    </dgm:linClrLst>
+    <dgm:effectClrLst/>
+    <dgm:txLinClrLst/>
+    <dgm:txFillClrLst meth="repeat">
+      <a:schemeClr val="dk1"/>
+    </dgm:txFillClrLst>
+    <dgm:txEffectClrLst/>
+  </dgm:styleLbl>
+  <dgm:styleLbl name="fgAcc2">
+    <dgm:fillClrLst meth="repeat">
+      <a:schemeClr val="lt1">
+        <a:alpha val="90000"/>
+      </a:schemeClr>
+    </dgm:fillClrLst>
+    <dgm:linClrLst>
+      <a:schemeClr val="accent2"/>
+    </dgm:linClrLst>
+    <dgm:effectClrLst/>
+    <dgm:txLinClrLst/>
+    <dgm:txFillClrLst meth="repeat">
+      <a:schemeClr val="dk1"/>
+    </dgm:txFillClrLst>
+    <dgm:txEffectClrLst/>
+  </dgm:styleLbl>
+  <dgm:styleLbl name="fgAcc3">
+    <dgm:fillClrLst meth="repeat">
+      <a:schemeClr val="lt1">
+        <a:alpha val="90000"/>
+      </a:schemeClr>
+    </dgm:fillClrLst>
+    <dgm:linClrLst>
+      <a:schemeClr val="accent3"/>
+    </dgm:linClrLst>
+    <dgm:effectClrLst/>
+    <dgm:txLinClrLst/>
+    <dgm:txFillClrLst meth="repeat">
+      <a:schemeClr val="dk1"/>
+    </dgm:txFillClrLst>
+    <dgm:txEffectClrLst/>
+  </dgm:styleLbl>
+  <dgm:styleLbl name="fgAcc4">
+    <dgm:fillClrLst meth="repeat">
+      <a:schemeClr val="lt1">
+        <a:alpha val="90000"/>
+      </a:schemeClr>
+    </dgm:fillClrLst>
+    <dgm:linClrLst>
+      <a:schemeClr val="accent4"/>
+    </dgm:linClrLst>
+    <dgm:effectClrLst/>
+    <dgm:txLinClrLst/>
+    <dgm:txFillClrLst meth="repeat">
+      <a:schemeClr val="dk1"/>
+    </dgm:txFillClrLst>
+    <dgm:txEffectClrLst/>
+  </dgm:styleLbl>
+  <dgm:styleLbl name="bgShp">
+    <dgm:fillClrLst meth="repeat">
+      <a:schemeClr val="accent2"/>
+      <a:schemeClr val="accent3"/>
+      <a:schemeClr val="accent4"/>
+      <a:schemeClr val="accent5"/>
+      <a:schemeClr val="accent6"/>
+    </dgm:fillClrLst>
+    <dgm:linClrLst meth="repeat">
+      <a:schemeClr val="lt1">
+        <a:alpha val="0"/>
+      </a:schemeClr>
+    </dgm:linClrLst>
+    <dgm:effectClrLst/>
+    <dgm:txLinClrLst/>
+    <dgm:txFillClrLst/>
+    <dgm:txEffectClrLst/>
+  </dgm:styleLbl>
+  <dgm:styleLbl name="dkBgShp">
+    <dgm:fillClrLst meth="repeat">
+      <a:schemeClr val="accent2">
+        <a:shade val="90000"/>
+      </a:schemeClr>
+    </dgm:fillClrLst>
+    <dgm:linClrLst meth="repeat">
+      <a:schemeClr val="dk1"/>
+    </dgm:linClrLst>
+    <dgm:effectClrLst/>
+    <dgm:txLinClrLst/>
+    <dgm:txFillClrLst meth="repeat">
+      <a:schemeClr val="lt1"/>
+    </dgm:txFillClrLst>
+    <dgm:txEffectClrLst/>
+  </dgm:styleLbl>
+  <dgm:styleLbl name="trBgShp">
+    <dgm:fillClrLst meth="repeat">
+      <a:schemeClr val="accent1">
+        <a:tint val="50000"/>
+        <a:alpha val="40000"/>
+      </a:schemeClr>
+    </dgm:fillClrLst>
+    <dgm:linClrLst meth="repeat">
+      <a:schemeClr val="accent2"/>
+    </dgm:linClrLst>
+    <dgm:effectClrLst/>
+    <dgm:txLinClrLst/>
+    <dgm:txFillClrLst meth="repeat">
+      <a:schemeClr val="lt1"/>
+    </dgm:txFillClrLst>
+    <dgm:txEffectClrLst/>
+  </dgm:styleLbl>
+  <dgm:styleLbl name="fgShp">
+    <dgm:fillClrLst meth="repeat">
+      <a:schemeClr val="accent2">
+        <a:tint val="40000"/>
+      </a:schemeClr>
+    </dgm:fillClrLst>
+    <dgm:linClrLst meth="repeat">
+      <a:schemeClr val="lt1"/>
+    </dgm:linClrLst>
+    <dgm:effectClrLst/>
+    <dgm:txLinClrLst/>
+    <dgm:txFillClrLst meth="repeat">
+      <a:schemeClr val="dk1"/>
+    </dgm:txFillClrLst>
+    <dgm:txEffectClrLst/>
+  </dgm:styleLbl>
+  <dgm:styleLbl name="revTx">
+    <dgm:fillClrLst meth="repeat">
+      <a:schemeClr val="lt1">
+        <a:alpha val="0"/>
+      </a:schemeClr>
+    </dgm:fillClrLst>
+    <dgm:linClrLst meth="repeat">
+      <a:schemeClr val="dk1">
+        <a:alpha val="0"/>
+      </a:schemeClr>
+    </dgm:linClrLst>
+    <dgm:effectClrLst/>
+    <dgm:txLinClrLst/>
+    <dgm:txFillClrLst meth="repeat">
+      <a:schemeClr val="bg1"/>
     </dgm:txFillClrLst>
     <dgm:txEffectClrLst/>
   </dgm:styleLbl>
@@ -9968,6 +10889,450 @@
     <dgm:cxn modelId="{BCD5731E-81CD-438F-B6F6-A004292525C5}" type="presParOf" srcId="{88C01F89-1561-49AA-A639-0EFC2235565B}" destId="{89B5D523-DCC1-456B-8760-0C9B519FDDAF}" srcOrd="1" destOrd="0" presId="urn:microsoft.com/office/officeart/2005/8/layout/process4"/>
     <dgm:cxn modelId="{3FF67479-CD5E-4614-9D01-29C98FABCA71}" type="presParOf" srcId="{88C01F89-1561-49AA-A639-0EFC2235565B}" destId="{AC82F2D5-E2C0-4DAB-94BB-3DE43E0C36E9}" srcOrd="2" destOrd="0" presId="urn:microsoft.com/office/officeart/2005/8/layout/process4"/>
     <dgm:cxn modelId="{0CAE94EF-2DAE-4901-983F-C0154EE362F8}" type="presParOf" srcId="{AC82F2D5-E2C0-4DAB-94BB-3DE43E0C36E9}" destId="{53D54ABB-32AA-445F-AF4B-54BDE7E97528}" srcOrd="0" destOrd="0" presId="urn:microsoft.com/office/officeart/2005/8/layout/process4"/>
+  </dgm:cxnLst>
+  <dgm:bg/>
+  <dgm:whole/>
+  <dgm:extLst>
+    <a:ext uri="http://schemas.microsoft.com/office/drawing/2008/diagram">
+      <dsp:dataModelExt xmlns:dsp="http://schemas.microsoft.com/office/drawing/2008/diagram" relId="rId7" minVer="http://schemas.openxmlformats.org/drawingml/2006/diagram"/>
+    </a:ext>
+  </dgm:extLst>
+</dgm:dataModel>
+</file>
+
+<file path=ppt/diagrams/data11.xml><?xml version="1.0" encoding="utf-8"?>
+<dgm:dataModel xmlns:dgm="http://schemas.openxmlformats.org/drawingml/2006/diagram" xmlns:a="http://schemas.openxmlformats.org/drawingml/2006/main">
+  <dgm:ptLst>
+    <dgm:pt modelId="{CD9226FA-4365-4639-A10D-960D3F45D581}" type="doc">
+      <dgm:prSet loTypeId="urn:microsoft.com/office/officeart/2018/2/layout/IconVerticalSolidList" loCatId="icon" qsTypeId="urn:microsoft.com/office/officeart/2005/8/quickstyle/simple1" qsCatId="simple" csTypeId="urn:microsoft.com/office/officeart/2018/5/colors/Iconchunking_neutralicontext_colorful1" csCatId="colorful" phldr="1"/>
+      <dgm:spPr/>
+      <dgm:t>
+        <a:bodyPr/>
+        <a:lstStyle/>
+        <a:p>
+          <a:endParaRPr lang="en-US"/>
+        </a:p>
+      </dgm:t>
+    </dgm:pt>
+    <dgm:pt modelId="{5A12EAE3-E585-4D5D-B9CE-3D7D5FEA7B2F}">
+      <dgm:prSet/>
+      <dgm:spPr/>
+      <dgm:t>
+        <a:bodyPr/>
+        <a:lstStyle/>
+        <a:p>
+          <a:r>
+            <a:rPr lang="en-US"/>
+            <a:t>Vulnerability exists at the intersection of</a:t>
+          </a:r>
+        </a:p>
+      </dgm:t>
+    </dgm:pt>
+    <dgm:pt modelId="{80B1E4AA-91E1-47A6-B060-B84404141956}" type="parTrans" cxnId="{DBCB8E69-422E-42F4-B1E0-E0176CFC99DA}">
+      <dgm:prSet/>
+      <dgm:spPr/>
+      <dgm:t>
+        <a:bodyPr/>
+        <a:lstStyle/>
+        <a:p>
+          <a:endParaRPr lang="en-US"/>
+        </a:p>
+      </dgm:t>
+    </dgm:pt>
+    <dgm:pt modelId="{364C7B6B-6E83-4ACB-82D4-28FDF9754FEC}" type="sibTrans" cxnId="{DBCB8E69-422E-42F4-B1E0-E0176CFC99DA}">
+      <dgm:prSet/>
+      <dgm:spPr/>
+      <dgm:t>
+        <a:bodyPr/>
+        <a:lstStyle/>
+        <a:p>
+          <a:endParaRPr lang="en-US"/>
+        </a:p>
+      </dgm:t>
+    </dgm:pt>
+    <dgm:pt modelId="{383FC557-68B6-43D3-9E1B-7C6AAE53D084}">
+      <dgm:prSet/>
+      <dgm:spPr/>
+      <dgm:t>
+        <a:bodyPr/>
+        <a:lstStyle/>
+        <a:p>
+          <a:r>
+            <a:rPr lang="en-US"/>
+            <a:t>System susceptibility</a:t>
+          </a:r>
+        </a:p>
+      </dgm:t>
+    </dgm:pt>
+    <dgm:pt modelId="{9C854D09-535E-4626-9E1E-BBC264209B44}" type="parTrans" cxnId="{55971CB0-F38F-458C-A623-59E8193489C1}">
+      <dgm:prSet/>
+      <dgm:spPr/>
+      <dgm:t>
+        <a:bodyPr/>
+        <a:lstStyle/>
+        <a:p>
+          <a:endParaRPr lang="en-US"/>
+        </a:p>
+      </dgm:t>
+    </dgm:pt>
+    <dgm:pt modelId="{96A705F6-9D6A-4354-A96D-05BB559B8843}" type="sibTrans" cxnId="{55971CB0-F38F-458C-A623-59E8193489C1}">
+      <dgm:prSet/>
+      <dgm:spPr/>
+      <dgm:t>
+        <a:bodyPr/>
+        <a:lstStyle/>
+        <a:p>
+          <a:endParaRPr lang="en-US"/>
+        </a:p>
+      </dgm:t>
+    </dgm:pt>
+    <dgm:pt modelId="{BC6FC6FF-DE34-435C-84F6-E64174D9B18E}">
+      <dgm:prSet/>
+      <dgm:spPr/>
+      <dgm:t>
+        <a:bodyPr/>
+        <a:lstStyle/>
+        <a:p>
+          <a:r>
+            <a:rPr lang="en-US"/>
+            <a:t>Threat accessibility</a:t>
+          </a:r>
+        </a:p>
+      </dgm:t>
+    </dgm:pt>
+    <dgm:pt modelId="{01E5FF6F-0476-4F37-AB27-4A4280F5939E}" type="parTrans" cxnId="{6D3E60DC-96A8-4920-802D-D107EEF5F125}">
+      <dgm:prSet/>
+      <dgm:spPr/>
+      <dgm:t>
+        <a:bodyPr/>
+        <a:lstStyle/>
+        <a:p>
+          <a:endParaRPr lang="en-US"/>
+        </a:p>
+      </dgm:t>
+    </dgm:pt>
+    <dgm:pt modelId="{423CC5B4-CCAE-4500-B020-A24119FF4ADB}" type="sibTrans" cxnId="{6D3E60DC-96A8-4920-802D-D107EEF5F125}">
+      <dgm:prSet/>
+      <dgm:spPr/>
+      <dgm:t>
+        <a:bodyPr/>
+        <a:lstStyle/>
+        <a:p>
+          <a:endParaRPr lang="en-US"/>
+        </a:p>
+      </dgm:t>
+    </dgm:pt>
+    <dgm:pt modelId="{ECA3096D-0684-4AB5-8F3B-692E88D94231}">
+      <dgm:prSet/>
+      <dgm:spPr/>
+      <dgm:t>
+        <a:bodyPr/>
+        <a:lstStyle/>
+        <a:p>
+          <a:r>
+            <a:rPr lang="en-US"/>
+            <a:t>Threat capability</a:t>
+          </a:r>
+        </a:p>
+      </dgm:t>
+    </dgm:pt>
+    <dgm:pt modelId="{138A337F-60D7-4E64-AF15-EB2B2696CADD}" type="parTrans" cxnId="{AA1410C5-339E-402F-BE38-605922B49E41}">
+      <dgm:prSet/>
+      <dgm:spPr/>
+      <dgm:t>
+        <a:bodyPr/>
+        <a:lstStyle/>
+        <a:p>
+          <a:endParaRPr lang="en-US"/>
+        </a:p>
+      </dgm:t>
+    </dgm:pt>
+    <dgm:pt modelId="{DBA83E28-C4F9-49DE-A733-D387C8FC0A05}" type="sibTrans" cxnId="{AA1410C5-339E-402F-BE38-605922B49E41}">
+      <dgm:prSet/>
+      <dgm:spPr/>
+      <dgm:t>
+        <a:bodyPr/>
+        <a:lstStyle/>
+        <a:p>
+          <a:endParaRPr lang="en-US"/>
+        </a:p>
+      </dgm:t>
+    </dgm:pt>
+    <dgm:pt modelId="{06A1382C-6A69-491F-9E8E-BB4D4290DB70}">
+      <dgm:prSet/>
+      <dgm:spPr/>
+      <dgm:t>
+        <a:bodyPr/>
+        <a:lstStyle/>
+        <a:p>
+          <a:r>
+            <a:rPr lang="en-US"/>
+            <a:t>Understanding schedule and business impact</a:t>
+          </a:r>
+        </a:p>
+      </dgm:t>
+    </dgm:pt>
+    <dgm:pt modelId="{1B556755-DE1E-4309-B600-2A65FF26DF13}" type="parTrans" cxnId="{E2162EFE-045D-4DD1-B933-86A85F91D180}">
+      <dgm:prSet/>
+      <dgm:spPr/>
+      <dgm:t>
+        <a:bodyPr/>
+        <a:lstStyle/>
+        <a:p>
+          <a:endParaRPr lang="en-US"/>
+        </a:p>
+      </dgm:t>
+    </dgm:pt>
+    <dgm:pt modelId="{74031001-73EB-4B47-8B7B-8A3674D1FE82}" type="sibTrans" cxnId="{E2162EFE-045D-4DD1-B933-86A85F91D180}">
+      <dgm:prSet/>
+      <dgm:spPr/>
+      <dgm:t>
+        <a:bodyPr/>
+        <a:lstStyle/>
+        <a:p>
+          <a:endParaRPr lang="en-US"/>
+        </a:p>
+      </dgm:t>
+    </dgm:pt>
+    <dgm:pt modelId="{94890C4F-7E80-4151-8D4F-43A11D771CC8}">
+      <dgm:prSet/>
+      <dgm:spPr/>
+      <dgm:t>
+        <a:bodyPr/>
+        <a:lstStyle/>
+        <a:p>
+          <a:r>
+            <a:rPr lang="en-US"/>
+            <a:t>Security needs to enhance the business, not the other way around</a:t>
+          </a:r>
+        </a:p>
+      </dgm:t>
+    </dgm:pt>
+    <dgm:pt modelId="{C9AEF248-CD6A-42C0-8934-235913B9A7FA}" type="parTrans" cxnId="{3A0FAE0A-A287-47D4-87A6-46AFC12B8791}">
+      <dgm:prSet/>
+      <dgm:spPr/>
+      <dgm:t>
+        <a:bodyPr/>
+        <a:lstStyle/>
+        <a:p>
+          <a:endParaRPr lang="en-US"/>
+        </a:p>
+      </dgm:t>
+    </dgm:pt>
+    <dgm:pt modelId="{2355150B-A0B1-4B4D-A174-95D53438010D}" type="sibTrans" cxnId="{3A0FAE0A-A287-47D4-87A6-46AFC12B8791}">
+      <dgm:prSet/>
+      <dgm:spPr/>
+      <dgm:t>
+        <a:bodyPr/>
+        <a:lstStyle/>
+        <a:p>
+          <a:endParaRPr lang="en-US"/>
+        </a:p>
+      </dgm:t>
+    </dgm:pt>
+    <dgm:pt modelId="{20A0BC52-AC8F-48FE-94A6-6920875E20C8}" type="pres">
+      <dgm:prSet presAssocID="{CD9226FA-4365-4639-A10D-960D3F45D581}" presName="root" presStyleCnt="0">
+        <dgm:presLayoutVars>
+          <dgm:dir/>
+          <dgm:resizeHandles val="exact"/>
+        </dgm:presLayoutVars>
+      </dgm:prSet>
+      <dgm:spPr/>
+    </dgm:pt>
+    <dgm:pt modelId="{351556C8-BE96-43BD-AD75-EFB0AEC67458}" type="pres">
+      <dgm:prSet presAssocID="{5A12EAE3-E585-4D5D-B9CE-3D7D5FEA7B2F}" presName="compNode" presStyleCnt="0"/>
+      <dgm:spPr/>
+    </dgm:pt>
+    <dgm:pt modelId="{2F2371C7-AFE4-4F8C-A963-219AD2CBAA20}" type="pres">
+      <dgm:prSet presAssocID="{5A12EAE3-E585-4D5D-B9CE-3D7D5FEA7B2F}" presName="bgRect" presStyleLbl="bgShp" presStyleIdx="0" presStyleCnt="3"/>
+      <dgm:spPr/>
+    </dgm:pt>
+    <dgm:pt modelId="{2A2A1CCF-869D-4B92-BF0A-41251B15DC9A}" type="pres">
+      <dgm:prSet presAssocID="{5A12EAE3-E585-4D5D-B9CE-3D7D5FEA7B2F}" presName="iconRect" presStyleLbl="node1" presStyleIdx="0" presStyleCnt="3"/>
+      <dgm:spPr>
+        <a:blipFill>
+          <a:blip xmlns:r="http://schemas.openxmlformats.org/officeDocument/2006/relationships" r:embed="rId1">
+            <a:extLst>
+              <a:ext uri="{28A0092B-C50C-407E-A947-70E740481C1C}">
+                <a14:useLocalDpi xmlns:a14="http://schemas.microsoft.com/office/drawing/2010/main" val="0"/>
+              </a:ext>
+              <a:ext uri="{96DAC541-7B7A-43D3-8B79-37D633B846F1}">
+                <asvg:svgBlip xmlns:asvg="http://schemas.microsoft.com/office/drawing/2016/SVG/main" r:embed="rId2"/>
+              </a:ext>
+            </a:extLst>
+          </a:blip>
+          <a:stretch>
+            <a:fillRect/>
+          </a:stretch>
+        </a:blipFill>
+        <a:ln>
+          <a:noFill/>
+        </a:ln>
+      </dgm:spPr>
+      <dgm:extLst>
+        <a:ext uri="{E40237B7-FDA0-4F09-8148-C483321AD2D9}">
+          <dgm14:cNvPr xmlns:dgm14="http://schemas.microsoft.com/office/drawing/2010/diagram" id="0" name="" descr="Warning"/>
+        </a:ext>
+      </dgm:extLst>
+    </dgm:pt>
+    <dgm:pt modelId="{9B1DE24A-1B63-424F-8B71-48B0361D83FA}" type="pres">
+      <dgm:prSet presAssocID="{5A12EAE3-E585-4D5D-B9CE-3D7D5FEA7B2F}" presName="spaceRect" presStyleCnt="0"/>
+      <dgm:spPr/>
+    </dgm:pt>
+    <dgm:pt modelId="{580038A6-62A9-4DB9-95D0-7EFEEA6583AF}" type="pres">
+      <dgm:prSet presAssocID="{5A12EAE3-E585-4D5D-B9CE-3D7D5FEA7B2F}" presName="parTx" presStyleLbl="revTx" presStyleIdx="0" presStyleCnt="4">
+        <dgm:presLayoutVars>
+          <dgm:chMax val="0"/>
+          <dgm:chPref val="0"/>
+        </dgm:presLayoutVars>
+      </dgm:prSet>
+      <dgm:spPr/>
+    </dgm:pt>
+    <dgm:pt modelId="{AC907F42-FED9-4CF3-8421-CB548E24F89B}" type="pres">
+      <dgm:prSet presAssocID="{5A12EAE3-E585-4D5D-B9CE-3D7D5FEA7B2F}" presName="desTx" presStyleLbl="revTx" presStyleIdx="1" presStyleCnt="4">
+        <dgm:presLayoutVars/>
+      </dgm:prSet>
+      <dgm:spPr/>
+    </dgm:pt>
+    <dgm:pt modelId="{C6F60800-9543-495F-91AA-A3BA5BC877BB}" type="pres">
+      <dgm:prSet presAssocID="{364C7B6B-6E83-4ACB-82D4-28FDF9754FEC}" presName="sibTrans" presStyleCnt="0"/>
+      <dgm:spPr/>
+    </dgm:pt>
+    <dgm:pt modelId="{D0052C13-FF22-46F9-A561-919ED581CFBA}" type="pres">
+      <dgm:prSet presAssocID="{06A1382C-6A69-491F-9E8E-BB4D4290DB70}" presName="compNode" presStyleCnt="0"/>
+      <dgm:spPr/>
+    </dgm:pt>
+    <dgm:pt modelId="{34CC7900-ADE1-4E59-AC92-735B7DE74C39}" type="pres">
+      <dgm:prSet presAssocID="{06A1382C-6A69-491F-9E8E-BB4D4290DB70}" presName="bgRect" presStyleLbl="bgShp" presStyleIdx="1" presStyleCnt="3"/>
+      <dgm:spPr/>
+    </dgm:pt>
+    <dgm:pt modelId="{494D5150-047D-408E-979D-E0F0D9A662C0}" type="pres">
+      <dgm:prSet presAssocID="{06A1382C-6A69-491F-9E8E-BB4D4290DB70}" presName="iconRect" presStyleLbl="node1" presStyleIdx="1" presStyleCnt="3"/>
+      <dgm:spPr>
+        <a:blipFill>
+          <a:blip xmlns:r="http://schemas.openxmlformats.org/officeDocument/2006/relationships" r:embed="rId3">
+            <a:extLst>
+              <a:ext uri="{28A0092B-C50C-407E-A947-70E740481C1C}">
+                <a14:useLocalDpi xmlns:a14="http://schemas.microsoft.com/office/drawing/2010/main" val="0"/>
+              </a:ext>
+              <a:ext uri="{96DAC541-7B7A-43D3-8B79-37D633B846F1}">
+                <asvg:svgBlip xmlns:asvg="http://schemas.microsoft.com/office/drawing/2016/SVG/main" r:embed="rId4"/>
+              </a:ext>
+            </a:extLst>
+          </a:blip>
+          <a:stretch>
+            <a:fillRect/>
+          </a:stretch>
+        </a:blipFill>
+        <a:ln>
+          <a:noFill/>
+        </a:ln>
+      </dgm:spPr>
+      <dgm:extLst>
+        <a:ext uri="{E40237B7-FDA0-4F09-8148-C483321AD2D9}">
+          <dgm14:cNvPr xmlns:dgm14="http://schemas.microsoft.com/office/drawing/2010/diagram" id="0" name="" descr="Daily Calendar"/>
+        </a:ext>
+      </dgm:extLst>
+    </dgm:pt>
+    <dgm:pt modelId="{C8B08D75-6307-4068-86CE-D8FA28CC7BFB}" type="pres">
+      <dgm:prSet presAssocID="{06A1382C-6A69-491F-9E8E-BB4D4290DB70}" presName="spaceRect" presStyleCnt="0"/>
+      <dgm:spPr/>
+    </dgm:pt>
+    <dgm:pt modelId="{57BAA406-879A-4913-94F9-9604555D879F}" type="pres">
+      <dgm:prSet presAssocID="{06A1382C-6A69-491F-9E8E-BB4D4290DB70}" presName="parTx" presStyleLbl="revTx" presStyleIdx="2" presStyleCnt="4">
+        <dgm:presLayoutVars>
+          <dgm:chMax val="0"/>
+          <dgm:chPref val="0"/>
+        </dgm:presLayoutVars>
+      </dgm:prSet>
+      <dgm:spPr/>
+    </dgm:pt>
+    <dgm:pt modelId="{65BA1DE4-91BE-4DF5-B5E5-EB0851994EBF}" type="pres">
+      <dgm:prSet presAssocID="{74031001-73EB-4B47-8B7B-8A3674D1FE82}" presName="sibTrans" presStyleCnt="0"/>
+      <dgm:spPr/>
+    </dgm:pt>
+    <dgm:pt modelId="{C3F4C533-7791-4831-9F7E-8C6B83FA05E2}" type="pres">
+      <dgm:prSet presAssocID="{94890C4F-7E80-4151-8D4F-43A11D771CC8}" presName="compNode" presStyleCnt="0"/>
+      <dgm:spPr/>
+    </dgm:pt>
+    <dgm:pt modelId="{B5884C56-A56B-45AA-A0DC-6BE609C7384B}" type="pres">
+      <dgm:prSet presAssocID="{94890C4F-7E80-4151-8D4F-43A11D771CC8}" presName="bgRect" presStyleLbl="bgShp" presStyleIdx="2" presStyleCnt="3"/>
+      <dgm:spPr/>
+    </dgm:pt>
+    <dgm:pt modelId="{050ECDA3-B741-4323-813F-4362BF6670E6}" type="pres">
+      <dgm:prSet presAssocID="{94890C4F-7E80-4151-8D4F-43A11D771CC8}" presName="iconRect" presStyleLbl="node1" presStyleIdx="2" presStyleCnt="3"/>
+      <dgm:spPr>
+        <a:blipFill>
+          <a:blip xmlns:r="http://schemas.openxmlformats.org/officeDocument/2006/relationships" r:embed="rId5">
+            <a:extLst>
+              <a:ext uri="{28A0092B-C50C-407E-A947-70E740481C1C}">
+                <a14:useLocalDpi xmlns:a14="http://schemas.microsoft.com/office/drawing/2010/main" val="0"/>
+              </a:ext>
+              <a:ext uri="{96DAC541-7B7A-43D3-8B79-37D633B846F1}">
+                <asvg:svgBlip xmlns:asvg="http://schemas.microsoft.com/office/drawing/2016/SVG/main" r:embed="rId6"/>
+              </a:ext>
+            </a:extLst>
+          </a:blip>
+          <a:stretch>
+            <a:fillRect/>
+          </a:stretch>
+        </a:blipFill>
+        <a:ln>
+          <a:noFill/>
+        </a:ln>
+      </dgm:spPr>
+      <dgm:extLst>
+        <a:ext uri="{E40237B7-FDA0-4F09-8148-C483321AD2D9}">
+          <dgm14:cNvPr xmlns:dgm14="http://schemas.microsoft.com/office/drawing/2010/diagram" id="0" name="" descr="Bitcoin"/>
+        </a:ext>
+      </dgm:extLst>
+    </dgm:pt>
+    <dgm:pt modelId="{658E50F6-F9A0-4D6D-88F8-8208B86D9295}" type="pres">
+      <dgm:prSet presAssocID="{94890C4F-7E80-4151-8D4F-43A11D771CC8}" presName="spaceRect" presStyleCnt="0"/>
+      <dgm:spPr/>
+    </dgm:pt>
+    <dgm:pt modelId="{BDC407CD-52B1-4E0E-A33E-FFE44D2CA671}" type="pres">
+      <dgm:prSet presAssocID="{94890C4F-7E80-4151-8D4F-43A11D771CC8}" presName="parTx" presStyleLbl="revTx" presStyleIdx="3" presStyleCnt="4">
+        <dgm:presLayoutVars>
+          <dgm:chMax val="0"/>
+          <dgm:chPref val="0"/>
+        </dgm:presLayoutVars>
+      </dgm:prSet>
+      <dgm:spPr/>
+    </dgm:pt>
+  </dgm:ptLst>
+  <dgm:cxnLst>
+    <dgm:cxn modelId="{3A0FAE0A-A287-47D4-87A6-46AFC12B8791}" srcId="{CD9226FA-4365-4639-A10D-960D3F45D581}" destId="{94890C4F-7E80-4151-8D4F-43A11D771CC8}" srcOrd="2" destOrd="0" parTransId="{C9AEF248-CD6A-42C0-8934-235913B9A7FA}" sibTransId="{2355150B-A0B1-4B4D-A174-95D53438010D}"/>
+    <dgm:cxn modelId="{B64EF140-CF88-456A-9482-00A4B7C608D7}" type="presOf" srcId="{CD9226FA-4365-4639-A10D-960D3F45D581}" destId="{20A0BC52-AC8F-48FE-94A6-6920875E20C8}" srcOrd="0" destOrd="0" presId="urn:microsoft.com/office/officeart/2018/2/layout/IconVerticalSolidList"/>
+    <dgm:cxn modelId="{DBCB8E69-422E-42F4-B1E0-E0176CFC99DA}" srcId="{CD9226FA-4365-4639-A10D-960D3F45D581}" destId="{5A12EAE3-E585-4D5D-B9CE-3D7D5FEA7B2F}" srcOrd="0" destOrd="0" parTransId="{80B1E4AA-91E1-47A6-B060-B84404141956}" sibTransId="{364C7B6B-6E83-4ACB-82D4-28FDF9754FEC}"/>
+    <dgm:cxn modelId="{A4E9D88A-E653-42F7-86B2-A5C82F82A65D}" type="presOf" srcId="{94890C4F-7E80-4151-8D4F-43A11D771CC8}" destId="{BDC407CD-52B1-4E0E-A33E-FFE44D2CA671}" srcOrd="0" destOrd="0" presId="urn:microsoft.com/office/officeart/2018/2/layout/IconVerticalSolidList"/>
+    <dgm:cxn modelId="{8536378B-DC02-4AB6-A2B2-13FB044CE20F}" type="presOf" srcId="{5A12EAE3-E585-4D5D-B9CE-3D7D5FEA7B2F}" destId="{580038A6-62A9-4DB9-95D0-7EFEEA6583AF}" srcOrd="0" destOrd="0" presId="urn:microsoft.com/office/officeart/2018/2/layout/IconVerticalSolidList"/>
+    <dgm:cxn modelId="{D7C9CB94-1C72-4FC1-9692-22DA4ADEF79D}" type="presOf" srcId="{383FC557-68B6-43D3-9E1B-7C6AAE53D084}" destId="{AC907F42-FED9-4CF3-8421-CB548E24F89B}" srcOrd="0" destOrd="0" presId="urn:microsoft.com/office/officeart/2018/2/layout/IconVerticalSolidList"/>
+    <dgm:cxn modelId="{F5DF8C96-6286-4721-AB28-01CBC92B7B9F}" type="presOf" srcId="{06A1382C-6A69-491F-9E8E-BB4D4290DB70}" destId="{57BAA406-879A-4913-94F9-9604555D879F}" srcOrd="0" destOrd="0" presId="urn:microsoft.com/office/officeart/2018/2/layout/IconVerticalSolidList"/>
+    <dgm:cxn modelId="{55971CB0-F38F-458C-A623-59E8193489C1}" srcId="{5A12EAE3-E585-4D5D-B9CE-3D7D5FEA7B2F}" destId="{383FC557-68B6-43D3-9E1B-7C6AAE53D084}" srcOrd="0" destOrd="0" parTransId="{9C854D09-535E-4626-9E1E-BBC264209B44}" sibTransId="{96A705F6-9D6A-4354-A96D-05BB559B8843}"/>
+    <dgm:cxn modelId="{AA1410C5-339E-402F-BE38-605922B49E41}" srcId="{5A12EAE3-E585-4D5D-B9CE-3D7D5FEA7B2F}" destId="{ECA3096D-0684-4AB5-8F3B-692E88D94231}" srcOrd="2" destOrd="0" parTransId="{138A337F-60D7-4E64-AF15-EB2B2696CADD}" sibTransId="{DBA83E28-C4F9-49DE-A733-D387C8FC0A05}"/>
+    <dgm:cxn modelId="{6D3E60DC-96A8-4920-802D-D107EEF5F125}" srcId="{5A12EAE3-E585-4D5D-B9CE-3D7D5FEA7B2F}" destId="{BC6FC6FF-DE34-435C-84F6-E64174D9B18E}" srcOrd="1" destOrd="0" parTransId="{01E5FF6F-0476-4F37-AB27-4A4280F5939E}" sibTransId="{423CC5B4-CCAE-4500-B020-A24119FF4ADB}"/>
+    <dgm:cxn modelId="{B3B0ECE3-EB3A-4B26-A35F-4F04F5051216}" type="presOf" srcId="{BC6FC6FF-DE34-435C-84F6-E64174D9B18E}" destId="{AC907F42-FED9-4CF3-8421-CB548E24F89B}" srcOrd="0" destOrd="1" presId="urn:microsoft.com/office/officeart/2018/2/layout/IconVerticalSolidList"/>
+    <dgm:cxn modelId="{467431EA-5F3B-40DB-8704-A140B272C2BE}" type="presOf" srcId="{ECA3096D-0684-4AB5-8F3B-692E88D94231}" destId="{AC907F42-FED9-4CF3-8421-CB548E24F89B}" srcOrd="0" destOrd="2" presId="urn:microsoft.com/office/officeart/2018/2/layout/IconVerticalSolidList"/>
+    <dgm:cxn modelId="{E2162EFE-045D-4DD1-B933-86A85F91D180}" srcId="{CD9226FA-4365-4639-A10D-960D3F45D581}" destId="{06A1382C-6A69-491F-9E8E-BB4D4290DB70}" srcOrd="1" destOrd="0" parTransId="{1B556755-DE1E-4309-B600-2A65FF26DF13}" sibTransId="{74031001-73EB-4B47-8B7B-8A3674D1FE82}"/>
+    <dgm:cxn modelId="{4F33A487-9249-4FC5-922B-195BBD3F6D1F}" type="presParOf" srcId="{20A0BC52-AC8F-48FE-94A6-6920875E20C8}" destId="{351556C8-BE96-43BD-AD75-EFB0AEC67458}" srcOrd="0" destOrd="0" presId="urn:microsoft.com/office/officeart/2018/2/layout/IconVerticalSolidList"/>
+    <dgm:cxn modelId="{C4B65B9B-8989-40A7-B804-5517ACE3EBE4}" type="presParOf" srcId="{351556C8-BE96-43BD-AD75-EFB0AEC67458}" destId="{2F2371C7-AFE4-4F8C-A963-219AD2CBAA20}" srcOrd="0" destOrd="0" presId="urn:microsoft.com/office/officeart/2018/2/layout/IconVerticalSolidList"/>
+    <dgm:cxn modelId="{0DBD231E-4B30-4A0D-A9AA-13B205B86972}" type="presParOf" srcId="{351556C8-BE96-43BD-AD75-EFB0AEC67458}" destId="{2A2A1CCF-869D-4B92-BF0A-41251B15DC9A}" srcOrd="1" destOrd="0" presId="urn:microsoft.com/office/officeart/2018/2/layout/IconVerticalSolidList"/>
+    <dgm:cxn modelId="{EEB586DB-A1F6-4140-B48F-94F2C3D32520}" type="presParOf" srcId="{351556C8-BE96-43BD-AD75-EFB0AEC67458}" destId="{9B1DE24A-1B63-424F-8B71-48B0361D83FA}" srcOrd="2" destOrd="0" presId="urn:microsoft.com/office/officeart/2018/2/layout/IconVerticalSolidList"/>
+    <dgm:cxn modelId="{AA184CD9-16F1-40D0-879D-31578E099728}" type="presParOf" srcId="{351556C8-BE96-43BD-AD75-EFB0AEC67458}" destId="{580038A6-62A9-4DB9-95D0-7EFEEA6583AF}" srcOrd="3" destOrd="0" presId="urn:microsoft.com/office/officeart/2018/2/layout/IconVerticalSolidList"/>
+    <dgm:cxn modelId="{C1427987-1B01-4A45-B090-D52238138F21}" type="presParOf" srcId="{351556C8-BE96-43BD-AD75-EFB0AEC67458}" destId="{AC907F42-FED9-4CF3-8421-CB548E24F89B}" srcOrd="4" destOrd="0" presId="urn:microsoft.com/office/officeart/2018/2/layout/IconVerticalSolidList"/>
+    <dgm:cxn modelId="{F6FCD6CA-C4B3-424D-9F28-854D0639D0D5}" type="presParOf" srcId="{20A0BC52-AC8F-48FE-94A6-6920875E20C8}" destId="{C6F60800-9543-495F-91AA-A3BA5BC877BB}" srcOrd="1" destOrd="0" presId="urn:microsoft.com/office/officeart/2018/2/layout/IconVerticalSolidList"/>
+    <dgm:cxn modelId="{F9C3B413-297D-48FF-B283-D98F7E9C8422}" type="presParOf" srcId="{20A0BC52-AC8F-48FE-94A6-6920875E20C8}" destId="{D0052C13-FF22-46F9-A561-919ED581CFBA}" srcOrd="2" destOrd="0" presId="urn:microsoft.com/office/officeart/2018/2/layout/IconVerticalSolidList"/>
+    <dgm:cxn modelId="{B7685B62-F469-497C-BD2B-487E56999685}" type="presParOf" srcId="{D0052C13-FF22-46F9-A561-919ED581CFBA}" destId="{34CC7900-ADE1-4E59-AC92-735B7DE74C39}" srcOrd="0" destOrd="0" presId="urn:microsoft.com/office/officeart/2018/2/layout/IconVerticalSolidList"/>
+    <dgm:cxn modelId="{A7217307-C30C-4A66-A791-D6D456AC091C}" type="presParOf" srcId="{D0052C13-FF22-46F9-A561-919ED581CFBA}" destId="{494D5150-047D-408E-979D-E0F0D9A662C0}" srcOrd="1" destOrd="0" presId="urn:microsoft.com/office/officeart/2018/2/layout/IconVerticalSolidList"/>
+    <dgm:cxn modelId="{C98A6955-31C0-473F-B1EA-1CAFBE87F409}" type="presParOf" srcId="{D0052C13-FF22-46F9-A561-919ED581CFBA}" destId="{C8B08D75-6307-4068-86CE-D8FA28CC7BFB}" srcOrd="2" destOrd="0" presId="urn:microsoft.com/office/officeart/2018/2/layout/IconVerticalSolidList"/>
+    <dgm:cxn modelId="{1A83F1F1-760C-4516-A8FE-2EFB49F94D69}" type="presParOf" srcId="{D0052C13-FF22-46F9-A561-919ED581CFBA}" destId="{57BAA406-879A-4913-94F9-9604555D879F}" srcOrd="3" destOrd="0" presId="urn:microsoft.com/office/officeart/2018/2/layout/IconVerticalSolidList"/>
+    <dgm:cxn modelId="{07815CE0-E995-4321-B6BB-EA1767260073}" type="presParOf" srcId="{20A0BC52-AC8F-48FE-94A6-6920875E20C8}" destId="{65BA1DE4-91BE-4DF5-B5E5-EB0851994EBF}" srcOrd="3" destOrd="0" presId="urn:microsoft.com/office/officeart/2018/2/layout/IconVerticalSolidList"/>
+    <dgm:cxn modelId="{92DD4B9D-75BD-4534-938C-DEBA4A606B34}" type="presParOf" srcId="{20A0BC52-AC8F-48FE-94A6-6920875E20C8}" destId="{C3F4C533-7791-4831-9F7E-8C6B83FA05E2}" srcOrd="4" destOrd="0" presId="urn:microsoft.com/office/officeart/2018/2/layout/IconVerticalSolidList"/>
+    <dgm:cxn modelId="{3B80ACC5-1D03-4240-A82C-6DF54C1D1846}" type="presParOf" srcId="{C3F4C533-7791-4831-9F7E-8C6B83FA05E2}" destId="{B5884C56-A56B-45AA-A0DC-6BE609C7384B}" srcOrd="0" destOrd="0" presId="urn:microsoft.com/office/officeart/2018/2/layout/IconVerticalSolidList"/>
+    <dgm:cxn modelId="{CA56CF43-9600-49D7-BE2C-04B0306660FA}" type="presParOf" srcId="{C3F4C533-7791-4831-9F7E-8C6B83FA05E2}" destId="{050ECDA3-B741-4323-813F-4362BF6670E6}" srcOrd="1" destOrd="0" presId="urn:microsoft.com/office/officeart/2018/2/layout/IconVerticalSolidList"/>
+    <dgm:cxn modelId="{96B468D9-BDDC-44CF-8B6B-0098A6770176}" type="presParOf" srcId="{C3F4C533-7791-4831-9F7E-8C6B83FA05E2}" destId="{658E50F6-F9A0-4D6D-88F8-8208B86D9295}" srcOrd="2" destOrd="0" presId="urn:microsoft.com/office/officeart/2018/2/layout/IconVerticalSolidList"/>
+    <dgm:cxn modelId="{7E1872E5-955C-438D-8827-BE3A9413C2CB}" type="presParOf" srcId="{C3F4C533-7791-4831-9F7E-8C6B83FA05E2}" destId="{BDC407CD-52B1-4E0E-A33E-FFE44D2CA671}" srcOrd="3" destOrd="0" presId="urn:microsoft.com/office/officeart/2018/2/layout/IconVerticalSolidList"/>
   </dgm:cxnLst>
   <dgm:bg/>
   <dgm:whole/>
@@ -14380,6 +15745,564 @@
       <dsp:txXfrm>
         <a:off x="0" y="509415"/>
         <a:ext cx="11029950" cy="433371"/>
+      </dsp:txXfrm>
+    </dsp:sp>
+  </dsp:spTree>
+</dsp:drawing>
+</file>
+
+<file path=ppt/diagrams/drawing11.xml><?xml version="1.0" encoding="utf-8"?>
+<dsp:drawing xmlns:dgm="http://schemas.openxmlformats.org/drawingml/2006/diagram" xmlns:dsp="http://schemas.microsoft.com/office/drawing/2008/diagram" xmlns:a="http://schemas.openxmlformats.org/drawingml/2006/main">
+  <dsp:spTree>
+    <dsp:nvGrpSpPr>
+      <dsp:cNvPr id="0" name=""/>
+      <dsp:cNvGrpSpPr/>
+    </dsp:nvGrpSpPr>
+    <dsp:grpSpPr/>
+    <dsp:sp modelId="{2F2371C7-AFE4-4F8C-A963-219AD2CBAA20}">
+      <dsp:nvSpPr>
+        <dsp:cNvPr id="0" name=""/>
+        <dsp:cNvSpPr/>
+      </dsp:nvSpPr>
+      <dsp:spPr>
+        <a:xfrm>
+          <a:off x="0" y="574"/>
+          <a:ext cx="7012370" cy="1345137"/>
+        </a:xfrm>
+        <a:prstGeom prst="roundRect">
+          <a:avLst>
+            <a:gd name="adj" fmla="val 10000"/>
+          </a:avLst>
+        </a:prstGeom>
+        <a:solidFill>
+          <a:schemeClr val="accent2">
+            <a:hueOff val="0"/>
+            <a:satOff val="0"/>
+            <a:lumOff val="0"/>
+            <a:alphaOff val="0"/>
+          </a:schemeClr>
+        </a:solidFill>
+        <a:ln>
+          <a:noFill/>
+        </a:ln>
+        <a:effectLst/>
+      </dsp:spPr>
+      <dsp:style>
+        <a:lnRef idx="0">
+          <a:scrgbClr r="0" g="0" b="0"/>
+        </a:lnRef>
+        <a:fillRef idx="1">
+          <a:scrgbClr r="0" g="0" b="0"/>
+        </a:fillRef>
+        <a:effectRef idx="0">
+          <a:scrgbClr r="0" g="0" b="0"/>
+        </a:effectRef>
+        <a:fontRef idx="minor"/>
+      </dsp:style>
+    </dsp:sp>
+    <dsp:sp modelId="{2A2A1CCF-869D-4B92-BF0A-41251B15DC9A}">
+      <dsp:nvSpPr>
+        <dsp:cNvPr id="0" name=""/>
+        <dsp:cNvSpPr/>
+      </dsp:nvSpPr>
+      <dsp:spPr>
+        <a:xfrm>
+          <a:off x="406904" y="303230"/>
+          <a:ext cx="739825" cy="739825"/>
+        </a:xfrm>
+        <a:prstGeom prst="rect">
+          <a:avLst/>
+        </a:prstGeom>
+        <a:blipFill>
+          <a:blip xmlns:r="http://schemas.openxmlformats.org/officeDocument/2006/relationships" r:embed="rId1">
+            <a:extLst>
+              <a:ext uri="{28A0092B-C50C-407E-A947-70E740481C1C}">
+                <a14:useLocalDpi xmlns:a14="http://schemas.microsoft.com/office/drawing/2010/main" val="0"/>
+              </a:ext>
+              <a:ext uri="{96DAC541-7B7A-43D3-8B79-37D633B846F1}">
+                <asvg:svgBlip xmlns:asvg="http://schemas.microsoft.com/office/drawing/2016/SVG/main" r:embed="rId2"/>
+              </a:ext>
+            </a:extLst>
+          </a:blip>
+          <a:stretch>
+            <a:fillRect/>
+          </a:stretch>
+        </a:blipFill>
+        <a:ln w="22225" cap="rnd" cmpd="sng" algn="ctr">
+          <a:noFill/>
+          <a:prstDash val="solid"/>
+        </a:ln>
+        <a:effectLst/>
+      </dsp:spPr>
+      <dsp:style>
+        <a:lnRef idx="2">
+          <a:scrgbClr r="0" g="0" b="0"/>
+        </a:lnRef>
+        <a:fillRef idx="1">
+          <a:scrgbClr r="0" g="0" b="0"/>
+        </a:fillRef>
+        <a:effectRef idx="0">
+          <a:scrgbClr r="0" g="0" b="0"/>
+        </a:effectRef>
+        <a:fontRef idx="minor">
+          <a:schemeClr val="lt1"/>
+        </a:fontRef>
+      </dsp:style>
+    </dsp:sp>
+    <dsp:sp modelId="{580038A6-62A9-4DB9-95D0-7EFEEA6583AF}">
+      <dsp:nvSpPr>
+        <dsp:cNvPr id="0" name=""/>
+        <dsp:cNvSpPr/>
+      </dsp:nvSpPr>
+      <dsp:spPr>
+        <a:xfrm>
+          <a:off x="1553633" y="574"/>
+          <a:ext cx="3155566" cy="1345137"/>
+        </a:xfrm>
+        <a:prstGeom prst="rect">
+          <a:avLst/>
+        </a:prstGeom>
+        <a:noFill/>
+        <a:ln>
+          <a:noFill/>
+        </a:ln>
+        <a:effectLst/>
+      </dsp:spPr>
+      <dsp:style>
+        <a:lnRef idx="0">
+          <a:scrgbClr r="0" g="0" b="0"/>
+        </a:lnRef>
+        <a:fillRef idx="0">
+          <a:scrgbClr r="0" g="0" b="0"/>
+        </a:fillRef>
+        <a:effectRef idx="0">
+          <a:scrgbClr r="0" g="0" b="0"/>
+        </a:effectRef>
+        <a:fontRef idx="minor"/>
+      </dsp:style>
+      <dsp:txBody>
+        <a:bodyPr spcFirstLastPara="0" vert="horz" wrap="square" lIns="142360" tIns="142360" rIns="142360" bIns="142360" numCol="1" spcCol="1270" anchor="ctr" anchorCtr="0">
+          <a:noAutofit/>
+        </a:bodyPr>
+        <a:lstStyle/>
+        <a:p>
+          <a:pPr marL="0" lvl="0" indent="0" algn="l" defTabSz="1111250">
+            <a:lnSpc>
+              <a:spcPct val="90000"/>
+            </a:lnSpc>
+            <a:spcBef>
+              <a:spcPct val="0"/>
+            </a:spcBef>
+            <a:spcAft>
+              <a:spcPct val="35000"/>
+            </a:spcAft>
+            <a:buNone/>
+          </a:pPr>
+          <a:r>
+            <a:rPr lang="en-US" sz="2500" kern="1200"/>
+            <a:t>Vulnerability exists at the intersection of</a:t>
+          </a:r>
+        </a:p>
+      </dsp:txBody>
+      <dsp:txXfrm>
+        <a:off x="1553633" y="574"/>
+        <a:ext cx="3155566" cy="1345137"/>
+      </dsp:txXfrm>
+    </dsp:sp>
+    <dsp:sp modelId="{AC907F42-FED9-4CF3-8421-CB548E24F89B}">
+      <dsp:nvSpPr>
+        <dsp:cNvPr id="0" name=""/>
+        <dsp:cNvSpPr/>
+      </dsp:nvSpPr>
+      <dsp:spPr>
+        <a:xfrm>
+          <a:off x="4709200" y="574"/>
+          <a:ext cx="2303169" cy="1345137"/>
+        </a:xfrm>
+        <a:prstGeom prst="rect">
+          <a:avLst/>
+        </a:prstGeom>
+        <a:noFill/>
+        <a:ln>
+          <a:noFill/>
+        </a:ln>
+        <a:effectLst/>
+      </dsp:spPr>
+      <dsp:style>
+        <a:lnRef idx="0">
+          <a:scrgbClr r="0" g="0" b="0"/>
+        </a:lnRef>
+        <a:fillRef idx="0">
+          <a:scrgbClr r="0" g="0" b="0"/>
+        </a:fillRef>
+        <a:effectRef idx="0">
+          <a:scrgbClr r="0" g="0" b="0"/>
+        </a:effectRef>
+        <a:fontRef idx="minor"/>
+      </dsp:style>
+      <dsp:txBody>
+        <a:bodyPr spcFirstLastPara="0" vert="horz" wrap="square" lIns="142360" tIns="142360" rIns="142360" bIns="142360" numCol="1" spcCol="1270" anchor="ctr" anchorCtr="0">
+          <a:noAutofit/>
+        </a:bodyPr>
+        <a:lstStyle/>
+        <a:p>
+          <a:pPr marL="0" lvl="0" indent="0" algn="l" defTabSz="755650">
+            <a:lnSpc>
+              <a:spcPct val="90000"/>
+            </a:lnSpc>
+            <a:spcBef>
+              <a:spcPct val="0"/>
+            </a:spcBef>
+            <a:spcAft>
+              <a:spcPct val="35000"/>
+            </a:spcAft>
+            <a:buNone/>
+          </a:pPr>
+          <a:r>
+            <a:rPr lang="en-US" sz="1700" kern="1200"/>
+            <a:t>System susceptibility</a:t>
+          </a:r>
+        </a:p>
+        <a:p>
+          <a:pPr marL="0" lvl="0" indent="0" algn="l" defTabSz="755650">
+            <a:lnSpc>
+              <a:spcPct val="90000"/>
+            </a:lnSpc>
+            <a:spcBef>
+              <a:spcPct val="0"/>
+            </a:spcBef>
+            <a:spcAft>
+              <a:spcPct val="35000"/>
+            </a:spcAft>
+            <a:buNone/>
+          </a:pPr>
+          <a:r>
+            <a:rPr lang="en-US" sz="1700" kern="1200"/>
+            <a:t>Threat accessibility</a:t>
+          </a:r>
+        </a:p>
+        <a:p>
+          <a:pPr marL="0" lvl="0" indent="0" algn="l" defTabSz="755650">
+            <a:lnSpc>
+              <a:spcPct val="90000"/>
+            </a:lnSpc>
+            <a:spcBef>
+              <a:spcPct val="0"/>
+            </a:spcBef>
+            <a:spcAft>
+              <a:spcPct val="35000"/>
+            </a:spcAft>
+            <a:buNone/>
+          </a:pPr>
+          <a:r>
+            <a:rPr lang="en-US" sz="1700" kern="1200"/>
+            <a:t>Threat capability</a:t>
+          </a:r>
+        </a:p>
+      </dsp:txBody>
+      <dsp:txXfrm>
+        <a:off x="4709200" y="574"/>
+        <a:ext cx="2303169" cy="1345137"/>
+      </dsp:txXfrm>
+    </dsp:sp>
+    <dsp:sp modelId="{34CC7900-ADE1-4E59-AC92-735B7DE74C39}">
+      <dsp:nvSpPr>
+        <dsp:cNvPr id="0" name=""/>
+        <dsp:cNvSpPr/>
+      </dsp:nvSpPr>
+      <dsp:spPr>
+        <a:xfrm>
+          <a:off x="0" y="1681996"/>
+          <a:ext cx="7012370" cy="1345137"/>
+        </a:xfrm>
+        <a:prstGeom prst="roundRect">
+          <a:avLst>
+            <a:gd name="adj" fmla="val 10000"/>
+          </a:avLst>
+        </a:prstGeom>
+        <a:solidFill>
+          <a:schemeClr val="accent3">
+            <a:hueOff val="0"/>
+            <a:satOff val="0"/>
+            <a:lumOff val="0"/>
+            <a:alphaOff val="0"/>
+          </a:schemeClr>
+        </a:solidFill>
+        <a:ln>
+          <a:noFill/>
+        </a:ln>
+        <a:effectLst/>
+      </dsp:spPr>
+      <dsp:style>
+        <a:lnRef idx="0">
+          <a:scrgbClr r="0" g="0" b="0"/>
+        </a:lnRef>
+        <a:fillRef idx="1">
+          <a:scrgbClr r="0" g="0" b="0"/>
+        </a:fillRef>
+        <a:effectRef idx="0">
+          <a:scrgbClr r="0" g="0" b="0"/>
+        </a:effectRef>
+        <a:fontRef idx="minor"/>
+      </dsp:style>
+    </dsp:sp>
+    <dsp:sp modelId="{494D5150-047D-408E-979D-E0F0D9A662C0}">
+      <dsp:nvSpPr>
+        <dsp:cNvPr id="0" name=""/>
+        <dsp:cNvSpPr/>
+      </dsp:nvSpPr>
+      <dsp:spPr>
+        <a:xfrm>
+          <a:off x="406904" y="1984652"/>
+          <a:ext cx="739825" cy="739825"/>
+        </a:xfrm>
+        <a:prstGeom prst="rect">
+          <a:avLst/>
+        </a:prstGeom>
+        <a:blipFill>
+          <a:blip xmlns:r="http://schemas.openxmlformats.org/officeDocument/2006/relationships" r:embed="rId3">
+            <a:extLst>
+              <a:ext uri="{28A0092B-C50C-407E-A947-70E740481C1C}">
+                <a14:useLocalDpi xmlns:a14="http://schemas.microsoft.com/office/drawing/2010/main" val="0"/>
+              </a:ext>
+              <a:ext uri="{96DAC541-7B7A-43D3-8B79-37D633B846F1}">
+                <asvg:svgBlip xmlns:asvg="http://schemas.microsoft.com/office/drawing/2016/SVG/main" r:embed="rId4"/>
+              </a:ext>
+            </a:extLst>
+          </a:blip>
+          <a:stretch>
+            <a:fillRect/>
+          </a:stretch>
+        </a:blipFill>
+        <a:ln w="22225" cap="rnd" cmpd="sng" algn="ctr">
+          <a:noFill/>
+          <a:prstDash val="solid"/>
+        </a:ln>
+        <a:effectLst/>
+      </dsp:spPr>
+      <dsp:style>
+        <a:lnRef idx="2">
+          <a:scrgbClr r="0" g="0" b="0"/>
+        </a:lnRef>
+        <a:fillRef idx="1">
+          <a:scrgbClr r="0" g="0" b="0"/>
+        </a:fillRef>
+        <a:effectRef idx="0">
+          <a:scrgbClr r="0" g="0" b="0"/>
+        </a:effectRef>
+        <a:fontRef idx="minor">
+          <a:schemeClr val="lt1"/>
+        </a:fontRef>
+      </dsp:style>
+    </dsp:sp>
+    <dsp:sp modelId="{57BAA406-879A-4913-94F9-9604555D879F}">
+      <dsp:nvSpPr>
+        <dsp:cNvPr id="0" name=""/>
+        <dsp:cNvSpPr/>
+      </dsp:nvSpPr>
+      <dsp:spPr>
+        <a:xfrm>
+          <a:off x="1553633" y="1681996"/>
+          <a:ext cx="5458736" cy="1345137"/>
+        </a:xfrm>
+        <a:prstGeom prst="rect">
+          <a:avLst/>
+        </a:prstGeom>
+        <a:noFill/>
+        <a:ln>
+          <a:noFill/>
+        </a:ln>
+        <a:effectLst/>
+      </dsp:spPr>
+      <dsp:style>
+        <a:lnRef idx="0">
+          <a:scrgbClr r="0" g="0" b="0"/>
+        </a:lnRef>
+        <a:fillRef idx="0">
+          <a:scrgbClr r="0" g="0" b="0"/>
+        </a:fillRef>
+        <a:effectRef idx="0">
+          <a:scrgbClr r="0" g="0" b="0"/>
+        </a:effectRef>
+        <a:fontRef idx="minor"/>
+      </dsp:style>
+      <dsp:txBody>
+        <a:bodyPr spcFirstLastPara="0" vert="horz" wrap="square" lIns="142360" tIns="142360" rIns="142360" bIns="142360" numCol="1" spcCol="1270" anchor="ctr" anchorCtr="0">
+          <a:noAutofit/>
+        </a:bodyPr>
+        <a:lstStyle/>
+        <a:p>
+          <a:pPr marL="0" lvl="0" indent="0" algn="l" defTabSz="1111250">
+            <a:lnSpc>
+              <a:spcPct val="90000"/>
+            </a:lnSpc>
+            <a:spcBef>
+              <a:spcPct val="0"/>
+            </a:spcBef>
+            <a:spcAft>
+              <a:spcPct val="35000"/>
+            </a:spcAft>
+            <a:buNone/>
+          </a:pPr>
+          <a:r>
+            <a:rPr lang="en-US" sz="2500" kern="1200"/>
+            <a:t>Understanding schedule and business impact</a:t>
+          </a:r>
+        </a:p>
+      </dsp:txBody>
+      <dsp:txXfrm>
+        <a:off x="1553633" y="1681996"/>
+        <a:ext cx="5458736" cy="1345137"/>
+      </dsp:txXfrm>
+    </dsp:sp>
+    <dsp:sp modelId="{B5884C56-A56B-45AA-A0DC-6BE609C7384B}">
+      <dsp:nvSpPr>
+        <dsp:cNvPr id="0" name=""/>
+        <dsp:cNvSpPr/>
+      </dsp:nvSpPr>
+      <dsp:spPr>
+        <a:xfrm>
+          <a:off x="0" y="3363418"/>
+          <a:ext cx="7012370" cy="1345137"/>
+        </a:xfrm>
+        <a:prstGeom prst="roundRect">
+          <a:avLst>
+            <a:gd name="adj" fmla="val 10000"/>
+          </a:avLst>
+        </a:prstGeom>
+        <a:solidFill>
+          <a:schemeClr val="accent4">
+            <a:hueOff val="0"/>
+            <a:satOff val="0"/>
+            <a:lumOff val="0"/>
+            <a:alphaOff val="0"/>
+          </a:schemeClr>
+        </a:solidFill>
+        <a:ln>
+          <a:noFill/>
+        </a:ln>
+        <a:effectLst/>
+      </dsp:spPr>
+      <dsp:style>
+        <a:lnRef idx="0">
+          <a:scrgbClr r="0" g="0" b="0"/>
+        </a:lnRef>
+        <a:fillRef idx="1">
+          <a:scrgbClr r="0" g="0" b="0"/>
+        </a:fillRef>
+        <a:effectRef idx="0">
+          <a:scrgbClr r="0" g="0" b="0"/>
+        </a:effectRef>
+        <a:fontRef idx="minor"/>
+      </dsp:style>
+    </dsp:sp>
+    <dsp:sp modelId="{050ECDA3-B741-4323-813F-4362BF6670E6}">
+      <dsp:nvSpPr>
+        <dsp:cNvPr id="0" name=""/>
+        <dsp:cNvSpPr/>
+      </dsp:nvSpPr>
+      <dsp:spPr>
+        <a:xfrm>
+          <a:off x="406904" y="3666074"/>
+          <a:ext cx="739825" cy="739825"/>
+        </a:xfrm>
+        <a:prstGeom prst="rect">
+          <a:avLst/>
+        </a:prstGeom>
+        <a:blipFill>
+          <a:blip xmlns:r="http://schemas.openxmlformats.org/officeDocument/2006/relationships" r:embed="rId5">
+            <a:extLst>
+              <a:ext uri="{28A0092B-C50C-407E-A947-70E740481C1C}">
+                <a14:useLocalDpi xmlns:a14="http://schemas.microsoft.com/office/drawing/2010/main" val="0"/>
+              </a:ext>
+              <a:ext uri="{96DAC541-7B7A-43D3-8B79-37D633B846F1}">
+                <asvg:svgBlip xmlns:asvg="http://schemas.microsoft.com/office/drawing/2016/SVG/main" r:embed="rId6"/>
+              </a:ext>
+            </a:extLst>
+          </a:blip>
+          <a:stretch>
+            <a:fillRect/>
+          </a:stretch>
+        </a:blipFill>
+        <a:ln w="22225" cap="rnd" cmpd="sng" algn="ctr">
+          <a:noFill/>
+          <a:prstDash val="solid"/>
+        </a:ln>
+        <a:effectLst/>
+      </dsp:spPr>
+      <dsp:style>
+        <a:lnRef idx="2">
+          <a:scrgbClr r="0" g="0" b="0"/>
+        </a:lnRef>
+        <a:fillRef idx="1">
+          <a:scrgbClr r="0" g="0" b="0"/>
+        </a:fillRef>
+        <a:effectRef idx="0">
+          <a:scrgbClr r="0" g="0" b="0"/>
+        </a:effectRef>
+        <a:fontRef idx="minor">
+          <a:schemeClr val="lt1"/>
+        </a:fontRef>
+      </dsp:style>
+    </dsp:sp>
+    <dsp:sp modelId="{BDC407CD-52B1-4E0E-A33E-FFE44D2CA671}">
+      <dsp:nvSpPr>
+        <dsp:cNvPr id="0" name=""/>
+        <dsp:cNvSpPr/>
+      </dsp:nvSpPr>
+      <dsp:spPr>
+        <a:xfrm>
+          <a:off x="1553633" y="3363418"/>
+          <a:ext cx="5458736" cy="1345137"/>
+        </a:xfrm>
+        <a:prstGeom prst="rect">
+          <a:avLst/>
+        </a:prstGeom>
+        <a:noFill/>
+        <a:ln>
+          <a:noFill/>
+        </a:ln>
+        <a:effectLst/>
+      </dsp:spPr>
+      <dsp:style>
+        <a:lnRef idx="0">
+          <a:scrgbClr r="0" g="0" b="0"/>
+        </a:lnRef>
+        <a:fillRef idx="0">
+          <a:scrgbClr r="0" g="0" b="0"/>
+        </a:fillRef>
+        <a:effectRef idx="0">
+          <a:scrgbClr r="0" g="0" b="0"/>
+        </a:effectRef>
+        <a:fontRef idx="minor"/>
+      </dsp:style>
+      <dsp:txBody>
+        <a:bodyPr spcFirstLastPara="0" vert="horz" wrap="square" lIns="142360" tIns="142360" rIns="142360" bIns="142360" numCol="1" spcCol="1270" anchor="ctr" anchorCtr="0">
+          <a:noAutofit/>
+        </a:bodyPr>
+        <a:lstStyle/>
+        <a:p>
+          <a:pPr marL="0" lvl="0" indent="0" algn="l" defTabSz="1111250">
+            <a:lnSpc>
+              <a:spcPct val="90000"/>
+            </a:lnSpc>
+            <a:spcBef>
+              <a:spcPct val="0"/>
+            </a:spcBef>
+            <a:spcAft>
+              <a:spcPct val="35000"/>
+            </a:spcAft>
+            <a:buNone/>
+          </a:pPr>
+          <a:r>
+            <a:rPr lang="en-US" sz="2500" kern="1200"/>
+            <a:t>Security needs to enhance the business, not the other way around</a:t>
+          </a:r>
+        </a:p>
+      </dsp:txBody>
+      <dsp:txXfrm>
+        <a:off x="1553633" y="3363418"/>
+        <a:ext cx="5458736" cy="1345137"/>
       </dsp:txXfrm>
     </dsp:sp>
   </dsp:spTree>
@@ -19056,6 +20979,300 @@
 </dgm:layoutDef>
 </file>
 
+<file path=ppt/diagrams/layout11.xml><?xml version="1.0" encoding="utf-8"?>
+<dgm:layoutDef xmlns:dgm="http://schemas.openxmlformats.org/drawingml/2006/diagram" xmlns:a="http://schemas.openxmlformats.org/drawingml/2006/main" uniqueId="urn:microsoft.com/office/officeart/2018/2/layout/IconVerticalSolidList">
+  <dgm:title val="Icon Vertical Solid List"/>
+  <dgm:desc val="Use to show a series of visuals from top to bottom with Level 1 or Level 1 and Level 2 text grouped in a shape. Works best with icons or small pictures with lengthier descriptions."/>
+  <dgm:catLst>
+    <dgm:cat type="icon" pri="500"/>
+  </dgm:catLst>
+  <dgm:sampData useDef="1">
+    <dgm:dataModel>
+      <dgm:ptLst/>
+      <dgm:bg/>
+      <dgm:whole/>
+    </dgm:dataModel>
+  </dgm:sampData>
+  <dgm:styleData useDef="1">
+    <dgm:dataModel>
+      <dgm:ptLst/>
+      <dgm:bg/>
+      <dgm:whole/>
+    </dgm:dataModel>
+  </dgm:styleData>
+  <dgm:clrData useDef="1">
+    <dgm:dataModel>
+      <dgm:ptLst/>
+      <dgm:bg/>
+      <dgm:whole/>
+    </dgm:dataModel>
+  </dgm:clrData>
+  <dgm:layoutNode name="root">
+    <dgm:varLst>
+      <dgm:dir/>
+      <dgm:resizeHandles val="exact"/>
+    </dgm:varLst>
+    <dgm:choose name="Name0">
+      <dgm:if name="Name1" axis="self" func="var" arg="dir" op="equ" val="norm">
+        <dgm:alg type="lin">
+          <dgm:param type="linDir" val="fromT"/>
+          <dgm:param type="nodeHorzAlign" val="l"/>
+        </dgm:alg>
+      </dgm:if>
+      <dgm:else name="Name2">
+        <dgm:alg type="lin">
+          <dgm:param type="linDir" val="fromT"/>
+          <dgm:param type="nodeHorzAlign" val="r"/>
+        </dgm:alg>
+      </dgm:else>
+    </dgm:choose>
+    <dgm:shape xmlns:r="http://schemas.openxmlformats.org/officeDocument/2006/relationships" r:blip="">
+      <dgm:adjLst/>
+    </dgm:shape>
+    <dgm:presOf/>
+    <dgm:choose name="Name3">
+      <dgm:if name="Name4" axis="ch" ptType="node" func="cnt" op="lte" val="3">
+        <dgm:constrLst>
+          <dgm:constr type="h" for="ch" forName="compNode" refType="h" fact="0.3"/>
+          <dgm:constr type="w" for="ch" forName="compNode" refType="w"/>
+          <dgm:constr type="h" for="ch" forName="sibTrans" refType="h" refFor="ch" refForName="compNode" fact="0.25"/>
+          <dgm:constr type="primFontSz" for="des" forName="parTx" val="25"/>
+          <dgm:constr type="primFontSz" for="des" forName="desTx" refType="primFontSz" refFor="des" refForName="parTx" op="lte" fact="0.75"/>
+          <dgm:constr type="h" for="des" forName="compNode" op="equ"/>
+          <dgm:constr type="h" for="des" forName="bgRect" op="equ"/>
+          <dgm:constr type="h" for="des" forName="iconRect" op="equ"/>
+          <dgm:constr type="w" for="des" forName="iconRect" op="equ"/>
+          <dgm:constr type="h" for="des" forName="spaceRect" op="equ"/>
+          <dgm:constr type="h" for="des" forName="parTx" op="equ"/>
+          <dgm:constr type="h" for="des" forName="desTx" op="equ"/>
+        </dgm:constrLst>
+      </dgm:if>
+      <dgm:if name="Name5" axis="ch" ptType="node" func="cnt" op="lte" val="4">
+        <dgm:constrLst>
+          <dgm:constr type="h" for="ch" forName="compNode" refType="h" fact="0.3"/>
+          <dgm:constr type="w" for="ch" forName="compNode" refType="w"/>
+          <dgm:constr type="h" for="ch" forName="sibTrans" refType="h" refFor="ch" refForName="compNode" fact="0.25"/>
+          <dgm:constr type="primFontSz" for="des" forName="parTx" val="22"/>
+          <dgm:constr type="primFontSz" for="des" forName="desTx" refType="primFontSz" refFor="des" refForName="parTx" op="lte" fact="0.75"/>
+          <dgm:constr type="h" for="des" forName="compNode" op="equ"/>
+          <dgm:constr type="h" for="des" forName="bgRect" op="equ"/>
+          <dgm:constr type="h" for="des" forName="iconRect" op="equ"/>
+          <dgm:constr type="w" for="des" forName="iconRect" op="equ"/>
+          <dgm:constr type="h" for="des" forName="spaceRect" op="equ"/>
+          <dgm:constr type="h" for="des" forName="parTx" op="equ"/>
+          <dgm:constr type="h" for="des" forName="desTx" op="equ"/>
+        </dgm:constrLst>
+      </dgm:if>
+      <dgm:if name="Name6" axis="ch" ptType="node" func="cnt" op="lte" val="6">
+        <dgm:constrLst>
+          <dgm:constr type="h" for="ch" forName="compNode" refType="h" fact="0.3"/>
+          <dgm:constr type="w" for="ch" forName="compNode" refType="w"/>
+          <dgm:constr type="h" for="ch" forName="sibTrans" refType="h" refFor="ch" refForName="compNode" fact="0.25"/>
+          <dgm:constr type="primFontSz" for="des" forName="parTx" val="19"/>
+          <dgm:constr type="primFontSz" for="des" forName="desTx" refType="primFontSz" refFor="des" refForName="parTx" op="lte" fact="0.75"/>
+          <dgm:constr type="h" for="des" forName="compNode" op="equ"/>
+          <dgm:constr type="h" for="des" forName="bgRect" op="equ"/>
+          <dgm:constr type="h" for="des" forName="iconRect" op="equ"/>
+          <dgm:constr type="w" for="des" forName="iconRect" op="equ"/>
+          <dgm:constr type="h" for="des" forName="spaceRect" op="equ"/>
+          <dgm:constr type="h" for="des" forName="parTx" op="equ"/>
+          <dgm:constr type="h" for="des" forName="desTx" op="equ"/>
+        </dgm:constrLst>
+      </dgm:if>
+      <dgm:else name="Name7">
+        <dgm:constrLst>
+          <dgm:constr type="h" for="ch" forName="compNode" refType="h" fact="0.3"/>
+          <dgm:constr type="w" for="ch" forName="compNode" refType="w"/>
+          <dgm:constr type="h" for="ch" forName="sibTrans" refType="h" refFor="ch" refForName="compNode" fact="0.25"/>
+          <dgm:constr type="primFontSz" for="des" forName="parTx" val="16"/>
+          <dgm:constr type="primFontSz" for="des" forName="desTx" refType="primFontSz" refFor="des" refForName="parTx" op="lte" fact="0.75"/>
+          <dgm:constr type="h" for="des" forName="compNode" op="equ"/>
+          <dgm:constr type="h" for="des" forName="bgRect" op="equ"/>
+          <dgm:constr type="h" for="des" forName="iconRect" op="equ"/>
+          <dgm:constr type="w" for="des" forName="iconRect" op="equ"/>
+          <dgm:constr type="h" for="des" forName="spaceRect" op="equ"/>
+          <dgm:constr type="h" for="des" forName="parTx" op="equ"/>
+          <dgm:constr type="h" for="des" forName="desTx" op="equ"/>
+        </dgm:constrLst>
+      </dgm:else>
+    </dgm:choose>
+    <dgm:ruleLst>
+      <dgm:rule type="h" for="ch" forName="compNode" val="0" fact="NaN" max="NaN"/>
+    </dgm:ruleLst>
+    <dgm:forEach name="Name8" axis="ch" ptType="node">
+      <dgm:layoutNode name="compNode">
+        <dgm:alg type="composite"/>
+        <dgm:shape xmlns:r="http://schemas.openxmlformats.org/officeDocument/2006/relationships" r:blip="">
+          <dgm:adjLst/>
+        </dgm:shape>
+        <dgm:presOf axis="self"/>
+        <dgm:choose name="Name9">
+          <dgm:if name="Name10" axis="ch" ptType="node" func="cnt" op="gte" val="1">
+            <dgm:constrLst>
+              <dgm:constr type="w" for="ch" forName="bgRect" refType="w"/>
+              <dgm:constr type="h" for="ch" forName="bgRect" refType="h"/>
+              <dgm:constr type="l" for="ch" forName="bgRect"/>
+              <dgm:constr type="t" for="ch" forName="bgRect"/>
+              <dgm:constr type="h" for="ch" forName="iconRect" refType="h" fact="0.55"/>
+              <dgm:constr type="w" for="ch" forName="iconRect" refType="h" refFor="ch" refForName="iconRect"/>
+              <dgm:constr type="l" for="ch" forName="iconRect" refType="h" refFor="ch" refForName="iconRect" fact="0.55"/>
+              <dgm:constr type="ctrY" for="ch" forName="iconRect" refType="ctrY" refFor="ch" refForName="bgRect"/>
+              <dgm:constr type="w" for="ch" forName="spaceRect" refType="l" refFor="ch" refForName="iconRect"/>
+              <dgm:constr type="h" for="ch" forName="spaceRect" refType="h"/>
+              <dgm:constr type="l" for="ch" forName="spaceRect" refType="r" refFor="ch" refForName="iconRect"/>
+              <dgm:constr type="t" for="ch" forName="spaceRect"/>
+              <dgm:constr type="w" for="ch" forName="parTx" refType="w" fact="0.45"/>
+              <dgm:constr type="h" for="ch" forName="parTx" refType="h"/>
+              <dgm:constr type="l" for="ch" forName="parTx" refType="r" refFor="ch" refForName="spaceRect"/>
+              <dgm:constr type="t" for="ch" forName="parTx"/>
+              <dgm:constr type="h" for="ch" forName="desTx" refType="h"/>
+              <dgm:constr type="l" for="ch" forName="desTx" refType="r" refFor="ch" refForName="parTx"/>
+              <dgm:constr type="t" for="ch" forName="desTx"/>
+            </dgm:constrLst>
+          </dgm:if>
+          <dgm:else name="Name11">
+            <dgm:constrLst>
+              <dgm:constr type="w" for="ch" forName="bgRect" refType="w"/>
+              <dgm:constr type="h" for="ch" forName="bgRect" refType="h"/>
+              <dgm:constr type="l" for="ch" forName="bgRect"/>
+              <dgm:constr type="t" for="ch" forName="bgRect"/>
+              <dgm:constr type="h" for="ch" forName="iconRect" refType="h" fact="0.55"/>
+              <dgm:constr type="w" for="ch" forName="iconRect" refType="h" refFor="ch" refForName="iconRect"/>
+              <dgm:constr type="l" for="ch" forName="iconRect" refType="h" refFor="ch" refForName="iconRect" fact="0.55"/>
+              <dgm:constr type="ctrY" for="ch" forName="iconRect" refType="ctrY" refFor="ch" refForName="bgRect"/>
+              <dgm:constr type="w" for="ch" forName="spaceRect" refType="l" refFor="ch" refForName="iconRect"/>
+              <dgm:constr type="h" for="ch" forName="spaceRect" refType="h"/>
+              <dgm:constr type="l" for="ch" forName="spaceRect" refType="r" refFor="ch" refForName="iconRect"/>
+              <dgm:constr type="t" for="ch" forName="spaceRect"/>
+              <dgm:constr type="h" for="ch" forName="parTx" refType="h"/>
+              <dgm:constr type="l" for="ch" forName="parTx" refType="r" refFor="ch" refForName="spaceRect"/>
+              <dgm:constr type="t" for="ch" forName="parTx"/>
+            </dgm:constrLst>
+          </dgm:else>
+        </dgm:choose>
+        <dgm:ruleLst>
+          <dgm:rule type="h" val="INF" fact="NaN" max="NaN"/>
+        </dgm:ruleLst>
+        <dgm:layoutNode name="bgRect" styleLbl="bgShp">
+          <dgm:alg type="sp"/>
+          <dgm:shape xmlns:r="http://schemas.openxmlformats.org/officeDocument/2006/relationships" type="roundRect" r:blip="">
+            <dgm:adjLst>
+              <dgm:adj idx="1" val="0.1"/>
+            </dgm:adjLst>
+          </dgm:shape>
+          <dgm:presOf/>
+          <dgm:constrLst/>
+          <dgm:ruleLst/>
+        </dgm:layoutNode>
+        <dgm:layoutNode name="iconRect" styleLbl="node1">
+          <dgm:alg type="sp"/>
+          <dgm:shape xmlns:r="http://schemas.openxmlformats.org/officeDocument/2006/relationships" type="rect" r:blip="" blipPhldr="1">
+            <dgm:adjLst/>
+          </dgm:shape>
+          <dgm:presOf/>
+          <dgm:constrLst/>
+          <dgm:ruleLst/>
+        </dgm:layoutNode>
+        <dgm:layoutNode name="spaceRect">
+          <dgm:alg type="sp"/>
+          <dgm:shape xmlns:r="http://schemas.openxmlformats.org/officeDocument/2006/relationships" r:blip="">
+            <dgm:adjLst/>
+          </dgm:shape>
+          <dgm:presOf/>
+          <dgm:constrLst/>
+          <dgm:ruleLst/>
+        </dgm:layoutNode>
+        <dgm:layoutNode name="parTx" styleLbl="revTx">
+          <dgm:varLst>
+            <dgm:chMax val="0"/>
+            <dgm:chPref val="0"/>
+          </dgm:varLst>
+          <dgm:alg type="tx">
+            <dgm:param type="txAnchorVert" val="mid"/>
+            <dgm:param type="parTxLTRAlign" val="l"/>
+            <dgm:param type="shpTxLTRAlignCh" val="l"/>
+            <dgm:param type="parTxRTLAlign" val="r"/>
+            <dgm:param type="shpTxRTLAlignCh" val="r"/>
+          </dgm:alg>
+          <dgm:shape xmlns:r="http://schemas.openxmlformats.org/officeDocument/2006/relationships" type="rect" r:blip="">
+            <dgm:adjLst/>
+          </dgm:shape>
+          <dgm:presOf axis="self" ptType="node"/>
+          <dgm:constrLst>
+            <dgm:constr type="lMarg" refType="h" fact="0.3"/>
+            <dgm:constr type="rMarg" refType="h" fact="0.3"/>
+            <dgm:constr type="tMarg" refType="h" fact="0.3"/>
+            <dgm:constr type="bMarg" refType="h" fact="0.3"/>
+          </dgm:constrLst>
+          <dgm:ruleLst>
+            <dgm:rule type="primFontSz" val="14" fact="NaN" max="NaN"/>
+            <dgm:rule type="h" val="INF" fact="NaN" max="NaN"/>
+          </dgm:ruleLst>
+        </dgm:layoutNode>
+        <dgm:choose name="Name12">
+          <dgm:if name="Name13" axis="ch" ptType="node" func="cnt" op="gte" val="1">
+            <dgm:layoutNode name="desTx" styleLbl="revTx">
+              <dgm:varLst/>
+              <dgm:alg type="tx">
+                <dgm:param type="txAnchorVertCh" val="mid"/>
+                <dgm:param type="parTxLTRAlign" val="l"/>
+                <dgm:param type="shpTxLTRAlignCh" val="l"/>
+                <dgm:param type="parTxRTLAlign" val="r"/>
+                <dgm:param type="shpTxRTLAlignCh" val="r"/>
+                <dgm:param type="stBulletLvl" val="0"/>
+              </dgm:alg>
+              <dgm:shape xmlns:r="http://schemas.openxmlformats.org/officeDocument/2006/relationships" type="rect" r:blip="">
+                <dgm:adjLst/>
+              </dgm:shape>
+              <dgm:presOf axis="des" ptType="node"/>
+              <dgm:constrLst>
+                <dgm:constr type="primFontSz" val="18"/>
+                <dgm:constr type="secFontSz" refType="primFontSz"/>
+                <dgm:constr type="lMarg" refType="h" fact="0.3"/>
+                <dgm:constr type="rMarg" refType="h" fact="0.3"/>
+                <dgm:constr type="tMarg" refType="h" fact="0.3"/>
+                <dgm:constr type="bMarg" refType="h" fact="0.3"/>
+              </dgm:constrLst>
+              <dgm:ruleLst>
+                <dgm:rule type="primFontSz" val="11" fact="NaN" max="NaN"/>
+              </dgm:ruleLst>
+            </dgm:layoutNode>
+          </dgm:if>
+          <dgm:else name="Name14"/>
+        </dgm:choose>
+      </dgm:layoutNode>
+      <dgm:forEach name="Name15" axis="followSib" ptType="sibTrans" cnt="1">
+        <dgm:layoutNode name="sibTrans">
+          <dgm:alg type="sp"/>
+          <dgm:shape xmlns:r="http://schemas.openxmlformats.org/officeDocument/2006/relationships" r:blip="">
+            <dgm:adjLst/>
+          </dgm:shape>
+          <dgm:presOf axis="self"/>
+          <dgm:constrLst/>
+          <dgm:ruleLst/>
+        </dgm:layoutNode>
+      </dgm:forEach>
+    </dgm:forEach>
+  </dgm:layoutNode>
+  <dgm:extLst>
+    <a:ext uri="{68A01E43-0DF5-4B5B-8FA6-DAF915123BFB}">
+      <dgm1612:lstStyle xmlns:dgm1612="http://schemas.microsoft.com/office/drawing/2016/12/diagram">
+        <a:lvl1pPr>
+          <a:lnSpc>
+            <a:spcPct val="100000"/>
+          </a:lnSpc>
+        </a:lvl1pPr>
+        <a:lvl2pPr>
+          <a:lnSpc>
+            <a:spcPct val="100000"/>
+          </a:lnSpc>
+        </a:lvl2pPr>
+      </dgm1612:lstStyle>
+    </a:ext>
+  </dgm:extLst>
+</dgm:layoutDef>
+</file>
+
 <file path=ppt/diagrams/layout2.xml><?xml version="1.0" encoding="utf-8"?>
 <dgm:layoutDef xmlns:dgm="http://schemas.openxmlformats.org/drawingml/2006/diagram" xmlns:a="http://schemas.openxmlformats.org/drawingml/2006/main" uniqueId="urn:microsoft.com/office/officeart/2018/2/layout/IconVerticalSolidList">
   <dgm:title val="Icon Vertical Solid List"/>
@@ -23140,6 +25357,1040 @@
 </dgm:styleDef>
 </file>
 
+<file path=ppt/diagrams/quickStyle11.xml><?xml version="1.0" encoding="utf-8"?>
+<dgm:styleDef xmlns:dgm="http://schemas.openxmlformats.org/drawingml/2006/diagram" xmlns:a="http://schemas.openxmlformats.org/drawingml/2006/main" uniqueId="urn:microsoft.com/office/officeart/2005/8/quickstyle/simple1">
+  <dgm:title val=""/>
+  <dgm:desc val=""/>
+  <dgm:catLst>
+    <dgm:cat type="simple" pri="10100"/>
+  </dgm:catLst>
+  <dgm:scene3d>
+    <a:camera prst="orthographicFront"/>
+    <a:lightRig rig="threePt" dir="t"/>
+  </dgm:scene3d>
+  <dgm:styleLbl name="node0">
+    <dgm:scene3d>
+      <a:camera prst="orthographicFront"/>
+      <a:lightRig rig="threePt" dir="t"/>
+    </dgm:scene3d>
+    <dgm:sp3d/>
+    <dgm:txPr/>
+    <dgm:style>
+      <a:lnRef idx="2">
+        <a:scrgbClr r="0" g="0" b="0"/>
+      </a:lnRef>
+      <a:fillRef idx="1">
+        <a:scrgbClr r="0" g="0" b="0"/>
+      </a:fillRef>
+      <a:effectRef idx="0">
+        <a:scrgbClr r="0" g="0" b="0"/>
+      </a:effectRef>
+      <a:fontRef idx="minor">
+        <a:schemeClr val="lt1"/>
+      </a:fontRef>
+    </dgm:style>
+  </dgm:styleLbl>
+  <dgm:styleLbl name="lnNode1">
+    <dgm:scene3d>
+      <a:camera prst="orthographicFront"/>
+      <a:lightRig rig="threePt" dir="t"/>
+    </dgm:scene3d>
+    <dgm:sp3d/>
+    <dgm:txPr/>
+    <dgm:style>
+      <a:lnRef idx="2">
+        <a:scrgbClr r="0" g="0" b="0"/>
+      </a:lnRef>
+      <a:fillRef idx="1">
+        <a:scrgbClr r="0" g="0" b="0"/>
+      </a:fillRef>
+      <a:effectRef idx="0">
+        <a:scrgbClr r="0" g="0" b="0"/>
+      </a:effectRef>
+      <a:fontRef idx="minor">
+        <a:schemeClr val="lt1"/>
+      </a:fontRef>
+    </dgm:style>
+  </dgm:styleLbl>
+  <dgm:styleLbl name="vennNode1">
+    <dgm:scene3d>
+      <a:camera prst="orthographicFront"/>
+      <a:lightRig rig="threePt" dir="t"/>
+    </dgm:scene3d>
+    <dgm:sp3d/>
+    <dgm:txPr/>
+    <dgm:style>
+      <a:lnRef idx="2">
+        <a:scrgbClr r="0" g="0" b="0"/>
+      </a:lnRef>
+      <a:fillRef idx="1">
+        <a:scrgbClr r="0" g="0" b="0"/>
+      </a:fillRef>
+      <a:effectRef idx="0">
+        <a:scrgbClr r="0" g="0" b="0"/>
+      </a:effectRef>
+      <a:fontRef idx="minor">
+        <a:schemeClr val="tx1"/>
+      </a:fontRef>
+    </dgm:style>
+  </dgm:styleLbl>
+  <dgm:styleLbl name="alignNode1">
+    <dgm:scene3d>
+      <a:camera prst="orthographicFront"/>
+      <a:lightRig rig="threePt" dir="t"/>
+    </dgm:scene3d>
+    <dgm:sp3d/>
+    <dgm:txPr/>
+    <dgm:style>
+      <a:lnRef idx="2">
+        <a:scrgbClr r="0" g="0" b="0"/>
+      </a:lnRef>
+      <a:fillRef idx="1">
+        <a:scrgbClr r="0" g="0" b="0"/>
+      </a:fillRef>
+      <a:effectRef idx="0">
+        <a:scrgbClr r="0" g="0" b="0"/>
+      </a:effectRef>
+      <a:fontRef idx="minor">
+        <a:schemeClr val="lt1"/>
+      </a:fontRef>
+    </dgm:style>
+  </dgm:styleLbl>
+  <dgm:styleLbl name="node1">
+    <dgm:scene3d>
+      <a:camera prst="orthographicFront"/>
+      <a:lightRig rig="threePt" dir="t"/>
+    </dgm:scene3d>
+    <dgm:sp3d/>
+    <dgm:txPr/>
+    <dgm:style>
+      <a:lnRef idx="2">
+        <a:scrgbClr r="0" g="0" b="0"/>
+      </a:lnRef>
+      <a:fillRef idx="1">
+        <a:scrgbClr r="0" g="0" b="0"/>
+      </a:fillRef>
+      <a:effectRef idx="0">
+        <a:scrgbClr r="0" g="0" b="0"/>
+      </a:effectRef>
+      <a:fontRef idx="minor">
+        <a:schemeClr val="lt1"/>
+      </a:fontRef>
+    </dgm:style>
+  </dgm:styleLbl>
+  <dgm:styleLbl name="node2">
+    <dgm:scene3d>
+      <a:camera prst="orthographicFront"/>
+      <a:lightRig rig="threePt" dir="t"/>
+    </dgm:scene3d>
+    <dgm:sp3d/>
+    <dgm:txPr/>
+    <dgm:style>
+      <a:lnRef idx="2">
+        <a:scrgbClr r="0" g="0" b="0"/>
+      </a:lnRef>
+      <a:fillRef idx="1">
+        <a:scrgbClr r="0" g="0" b="0"/>
+      </a:fillRef>
+      <a:effectRef idx="0">
+        <a:scrgbClr r="0" g="0" b="0"/>
+      </a:effectRef>
+      <a:fontRef idx="minor">
+        <a:schemeClr val="lt1"/>
+      </a:fontRef>
+    </dgm:style>
+  </dgm:styleLbl>
+  <dgm:styleLbl name="node3">
+    <dgm:scene3d>
+      <a:camera prst="orthographicFront"/>
+      <a:lightRig rig="threePt" dir="t"/>
+    </dgm:scene3d>
+    <dgm:sp3d/>
+    <dgm:txPr/>
+    <dgm:style>
+      <a:lnRef idx="2">
+        <a:scrgbClr r="0" g="0" b="0"/>
+      </a:lnRef>
+      <a:fillRef idx="1">
+        <a:scrgbClr r="0" g="0" b="0"/>
+      </a:fillRef>
+      <a:effectRef idx="0">
+        <a:scrgbClr r="0" g="0" b="0"/>
+      </a:effectRef>
+      <a:fontRef idx="minor">
+        <a:schemeClr val="lt1"/>
+      </a:fontRef>
+    </dgm:style>
+  </dgm:styleLbl>
+  <dgm:styleLbl name="node4">
+    <dgm:scene3d>
+      <a:camera prst="orthographicFront"/>
+      <a:lightRig rig="threePt" dir="t"/>
+    </dgm:scene3d>
+    <dgm:sp3d/>
+    <dgm:txPr/>
+    <dgm:style>
+      <a:lnRef idx="2">
+        <a:scrgbClr r="0" g="0" b="0"/>
+      </a:lnRef>
+      <a:fillRef idx="1">
+        <a:scrgbClr r="0" g="0" b="0"/>
+      </a:fillRef>
+      <a:effectRef idx="0">
+        <a:scrgbClr r="0" g="0" b="0"/>
+      </a:effectRef>
+      <a:fontRef idx="minor">
+        <a:schemeClr val="lt1"/>
+      </a:fontRef>
+    </dgm:style>
+  </dgm:styleLbl>
+  <dgm:styleLbl name="fgImgPlace1">
+    <dgm:scene3d>
+      <a:camera prst="orthographicFront"/>
+      <a:lightRig rig="threePt" dir="t"/>
+    </dgm:scene3d>
+    <dgm:sp3d/>
+    <dgm:txPr/>
+    <dgm:style>
+      <a:lnRef idx="2">
+        <a:scrgbClr r="0" g="0" b="0"/>
+      </a:lnRef>
+      <a:fillRef idx="1">
+        <a:scrgbClr r="0" g="0" b="0"/>
+      </a:fillRef>
+      <a:effectRef idx="0">
+        <a:scrgbClr r="0" g="0" b="0"/>
+      </a:effectRef>
+      <a:fontRef idx="minor"/>
+    </dgm:style>
+  </dgm:styleLbl>
+  <dgm:styleLbl name="alignImgPlace1">
+    <dgm:scene3d>
+      <a:camera prst="orthographicFront"/>
+      <a:lightRig rig="threePt" dir="t"/>
+    </dgm:scene3d>
+    <dgm:sp3d/>
+    <dgm:txPr/>
+    <dgm:style>
+      <a:lnRef idx="2">
+        <a:scrgbClr r="0" g="0" b="0"/>
+      </a:lnRef>
+      <a:fillRef idx="1">
+        <a:scrgbClr r="0" g="0" b="0"/>
+      </a:fillRef>
+      <a:effectRef idx="0">
+        <a:scrgbClr r="0" g="0" b="0"/>
+      </a:effectRef>
+      <a:fontRef idx="minor"/>
+    </dgm:style>
+  </dgm:styleLbl>
+  <dgm:styleLbl name="bgImgPlace1">
+    <dgm:scene3d>
+      <a:camera prst="orthographicFront"/>
+      <a:lightRig rig="threePt" dir="t"/>
+    </dgm:scene3d>
+    <dgm:sp3d/>
+    <dgm:txPr/>
+    <dgm:style>
+      <a:lnRef idx="2">
+        <a:scrgbClr r="0" g="0" b="0"/>
+      </a:lnRef>
+      <a:fillRef idx="1">
+        <a:scrgbClr r="0" g="0" b="0"/>
+      </a:fillRef>
+      <a:effectRef idx="0">
+        <a:scrgbClr r="0" g="0" b="0"/>
+      </a:effectRef>
+      <a:fontRef idx="minor"/>
+    </dgm:style>
+  </dgm:styleLbl>
+  <dgm:styleLbl name="sibTrans2D1">
+    <dgm:scene3d>
+      <a:camera prst="orthographicFront"/>
+      <a:lightRig rig="threePt" dir="t"/>
+    </dgm:scene3d>
+    <dgm:sp3d/>
+    <dgm:txPr/>
+    <dgm:style>
+      <a:lnRef idx="0">
+        <a:scrgbClr r="0" g="0" b="0"/>
+      </a:lnRef>
+      <a:fillRef idx="1">
+        <a:scrgbClr r="0" g="0" b="0"/>
+      </a:fillRef>
+      <a:effectRef idx="0">
+        <a:scrgbClr r="0" g="0" b="0"/>
+      </a:effectRef>
+      <a:fontRef idx="minor">
+        <a:schemeClr val="lt1"/>
+      </a:fontRef>
+    </dgm:style>
+  </dgm:styleLbl>
+  <dgm:styleLbl name="fgSibTrans2D1">
+    <dgm:scene3d>
+      <a:camera prst="orthographicFront"/>
+      <a:lightRig rig="threePt" dir="t"/>
+    </dgm:scene3d>
+    <dgm:sp3d/>
+    <dgm:txPr/>
+    <dgm:style>
+      <a:lnRef idx="0">
+        <a:scrgbClr r="0" g="0" b="0"/>
+      </a:lnRef>
+      <a:fillRef idx="1">
+        <a:scrgbClr r="0" g="0" b="0"/>
+      </a:fillRef>
+      <a:effectRef idx="0">
+        <a:scrgbClr r="0" g="0" b="0"/>
+      </a:effectRef>
+      <a:fontRef idx="minor">
+        <a:schemeClr val="lt1"/>
+      </a:fontRef>
+    </dgm:style>
+  </dgm:styleLbl>
+  <dgm:styleLbl name="bgSibTrans2D1">
+    <dgm:scene3d>
+      <a:camera prst="orthographicFront"/>
+      <a:lightRig rig="threePt" dir="t"/>
+    </dgm:scene3d>
+    <dgm:sp3d/>
+    <dgm:txPr/>
+    <dgm:style>
+      <a:lnRef idx="0">
+        <a:scrgbClr r="0" g="0" b="0"/>
+      </a:lnRef>
+      <a:fillRef idx="1">
+        <a:scrgbClr r="0" g="0" b="0"/>
+      </a:fillRef>
+      <a:effectRef idx="0">
+        <a:scrgbClr r="0" g="0" b="0"/>
+      </a:effectRef>
+      <a:fontRef idx="minor">
+        <a:schemeClr val="lt1"/>
+      </a:fontRef>
+    </dgm:style>
+  </dgm:styleLbl>
+  <dgm:styleLbl name="sibTrans1D1">
+    <dgm:scene3d>
+      <a:camera prst="orthographicFront"/>
+      <a:lightRig rig="threePt" dir="t"/>
+    </dgm:scene3d>
+    <dgm:sp3d/>
+    <dgm:txPr/>
+    <dgm:style>
+      <a:lnRef idx="1">
+        <a:scrgbClr r="0" g="0" b="0"/>
+      </a:lnRef>
+      <a:fillRef idx="0">
+        <a:scrgbClr r="0" g="0" b="0"/>
+      </a:fillRef>
+      <a:effectRef idx="0">
+        <a:scrgbClr r="0" g="0" b="0"/>
+      </a:effectRef>
+      <a:fontRef idx="minor"/>
+    </dgm:style>
+  </dgm:styleLbl>
+  <dgm:styleLbl name="callout">
+    <dgm:scene3d>
+      <a:camera prst="orthographicFront"/>
+      <a:lightRig rig="threePt" dir="t"/>
+    </dgm:scene3d>
+    <dgm:sp3d/>
+    <dgm:txPr/>
+    <dgm:style>
+      <a:lnRef idx="2">
+        <a:scrgbClr r="0" g="0" b="0"/>
+      </a:lnRef>
+      <a:fillRef idx="1">
+        <a:scrgbClr r="0" g="0" b="0"/>
+      </a:fillRef>
+      <a:effectRef idx="0">
+        <a:scrgbClr r="0" g="0" b="0"/>
+      </a:effectRef>
+      <a:fontRef idx="minor"/>
+    </dgm:style>
+  </dgm:styleLbl>
+  <dgm:styleLbl name="asst0">
+    <dgm:scene3d>
+      <a:camera prst="orthographicFront"/>
+      <a:lightRig rig="threePt" dir="t"/>
+    </dgm:scene3d>
+    <dgm:sp3d/>
+    <dgm:txPr/>
+    <dgm:style>
+      <a:lnRef idx="2">
+        <a:scrgbClr r="0" g="0" b="0"/>
+      </a:lnRef>
+      <a:fillRef idx="1">
+        <a:scrgbClr r="0" g="0" b="0"/>
+      </a:fillRef>
+      <a:effectRef idx="0">
+        <a:scrgbClr r="0" g="0" b="0"/>
+      </a:effectRef>
+      <a:fontRef idx="minor">
+        <a:schemeClr val="lt1"/>
+      </a:fontRef>
+    </dgm:style>
+  </dgm:styleLbl>
+  <dgm:styleLbl name="asst1">
+    <dgm:scene3d>
+      <a:camera prst="orthographicFront"/>
+      <a:lightRig rig="threePt" dir="t"/>
+    </dgm:scene3d>
+    <dgm:sp3d/>
+    <dgm:txPr/>
+    <dgm:style>
+      <a:lnRef idx="2">
+        <a:scrgbClr r="0" g="0" b="0"/>
+      </a:lnRef>
+      <a:fillRef idx="1">
+        <a:scrgbClr r="0" g="0" b="0"/>
+      </a:fillRef>
+      <a:effectRef idx="0">
+        <a:scrgbClr r="0" g="0" b="0"/>
+      </a:effectRef>
+      <a:fontRef idx="minor">
+        <a:schemeClr val="lt1"/>
+      </a:fontRef>
+    </dgm:style>
+  </dgm:styleLbl>
+  <dgm:styleLbl name="asst2">
+    <dgm:scene3d>
+      <a:camera prst="orthographicFront"/>
+      <a:lightRig rig="threePt" dir="t"/>
+    </dgm:scene3d>
+    <dgm:sp3d/>
+    <dgm:txPr/>
+    <dgm:style>
+      <a:lnRef idx="2">
+        <a:scrgbClr r="0" g="0" b="0"/>
+      </a:lnRef>
+      <a:fillRef idx="1">
+        <a:scrgbClr r="0" g="0" b="0"/>
+      </a:fillRef>
+      <a:effectRef idx="0">
+        <a:scrgbClr r="0" g="0" b="0"/>
+      </a:effectRef>
+      <a:fontRef idx="minor">
+        <a:schemeClr val="lt1"/>
+      </a:fontRef>
+    </dgm:style>
+  </dgm:styleLbl>
+  <dgm:styleLbl name="asst3">
+    <dgm:scene3d>
+      <a:camera prst="orthographicFront"/>
+      <a:lightRig rig="threePt" dir="t"/>
+    </dgm:scene3d>
+    <dgm:sp3d/>
+    <dgm:txPr/>
+    <dgm:style>
+      <a:lnRef idx="2">
+        <a:scrgbClr r="0" g="0" b="0"/>
+      </a:lnRef>
+      <a:fillRef idx="1">
+        <a:scrgbClr r="0" g="0" b="0"/>
+      </a:fillRef>
+      <a:effectRef idx="0">
+        <a:scrgbClr r="0" g="0" b="0"/>
+      </a:effectRef>
+      <a:fontRef idx="minor">
+        <a:schemeClr val="lt1"/>
+      </a:fontRef>
+    </dgm:style>
+  </dgm:styleLbl>
+  <dgm:styleLbl name="asst4">
+    <dgm:scene3d>
+      <a:camera prst="orthographicFront"/>
+      <a:lightRig rig="threePt" dir="t"/>
+    </dgm:scene3d>
+    <dgm:sp3d/>
+    <dgm:txPr/>
+    <dgm:style>
+      <a:lnRef idx="2">
+        <a:scrgbClr r="0" g="0" b="0"/>
+      </a:lnRef>
+      <a:fillRef idx="1">
+        <a:scrgbClr r="0" g="0" b="0"/>
+      </a:fillRef>
+      <a:effectRef idx="0">
+        <a:scrgbClr r="0" g="0" b="0"/>
+      </a:effectRef>
+      <a:fontRef idx="minor">
+        <a:schemeClr val="lt1"/>
+      </a:fontRef>
+    </dgm:style>
+  </dgm:styleLbl>
+  <dgm:styleLbl name="parChTrans2D1">
+    <dgm:scene3d>
+      <a:camera prst="orthographicFront"/>
+      <a:lightRig rig="threePt" dir="t"/>
+    </dgm:scene3d>
+    <dgm:sp3d/>
+    <dgm:txPr/>
+    <dgm:style>
+      <a:lnRef idx="2">
+        <a:scrgbClr r="0" g="0" b="0"/>
+      </a:lnRef>
+      <a:fillRef idx="1">
+        <a:scrgbClr r="0" g="0" b="0"/>
+      </a:fillRef>
+      <a:effectRef idx="0">
+        <a:scrgbClr r="0" g="0" b="0"/>
+      </a:effectRef>
+      <a:fontRef idx="minor">
+        <a:schemeClr val="lt1"/>
+      </a:fontRef>
+    </dgm:style>
+  </dgm:styleLbl>
+  <dgm:styleLbl name="parChTrans2D2">
+    <dgm:scene3d>
+      <a:camera prst="orthographicFront"/>
+      <a:lightRig rig="threePt" dir="t"/>
+    </dgm:scene3d>
+    <dgm:sp3d/>
+    <dgm:txPr/>
+    <dgm:style>
+      <a:lnRef idx="2">
+        <a:scrgbClr r="0" g="0" b="0"/>
+      </a:lnRef>
+      <a:fillRef idx="1">
+        <a:scrgbClr r="0" g="0" b="0"/>
+      </a:fillRef>
+      <a:effectRef idx="0">
+        <a:scrgbClr r="0" g="0" b="0"/>
+      </a:effectRef>
+      <a:fontRef idx="minor">
+        <a:schemeClr val="lt1"/>
+      </a:fontRef>
+    </dgm:style>
+  </dgm:styleLbl>
+  <dgm:styleLbl name="parChTrans2D3">
+    <dgm:scene3d>
+      <a:camera prst="orthographicFront"/>
+      <a:lightRig rig="threePt" dir="t"/>
+    </dgm:scene3d>
+    <dgm:sp3d/>
+    <dgm:txPr/>
+    <dgm:style>
+      <a:lnRef idx="2">
+        <a:scrgbClr r="0" g="0" b="0"/>
+      </a:lnRef>
+      <a:fillRef idx="1">
+        <a:scrgbClr r="0" g="0" b="0"/>
+      </a:fillRef>
+      <a:effectRef idx="0">
+        <a:scrgbClr r="0" g="0" b="0"/>
+      </a:effectRef>
+      <a:fontRef idx="minor">
+        <a:schemeClr val="lt1"/>
+      </a:fontRef>
+    </dgm:style>
+  </dgm:styleLbl>
+  <dgm:styleLbl name="parChTrans2D4">
+    <dgm:scene3d>
+      <a:camera prst="orthographicFront"/>
+      <a:lightRig rig="threePt" dir="t"/>
+    </dgm:scene3d>
+    <dgm:sp3d/>
+    <dgm:txPr/>
+    <dgm:style>
+      <a:lnRef idx="2">
+        <a:scrgbClr r="0" g="0" b="0"/>
+      </a:lnRef>
+      <a:fillRef idx="1">
+        <a:scrgbClr r="0" g="0" b="0"/>
+      </a:fillRef>
+      <a:effectRef idx="0">
+        <a:scrgbClr r="0" g="0" b="0"/>
+      </a:effectRef>
+      <a:fontRef idx="minor">
+        <a:schemeClr val="lt1"/>
+      </a:fontRef>
+    </dgm:style>
+  </dgm:styleLbl>
+  <dgm:styleLbl name="parChTrans1D1">
+    <dgm:scene3d>
+      <a:camera prst="orthographicFront"/>
+      <a:lightRig rig="threePt" dir="t"/>
+    </dgm:scene3d>
+    <dgm:sp3d/>
+    <dgm:txPr/>
+    <dgm:style>
+      <a:lnRef idx="2">
+        <a:scrgbClr r="0" g="0" b="0"/>
+      </a:lnRef>
+      <a:fillRef idx="0">
+        <a:scrgbClr r="0" g="0" b="0"/>
+      </a:fillRef>
+      <a:effectRef idx="0">
+        <a:scrgbClr r="0" g="0" b="0"/>
+      </a:effectRef>
+      <a:fontRef idx="minor"/>
+    </dgm:style>
+  </dgm:styleLbl>
+  <dgm:styleLbl name="parChTrans1D2">
+    <dgm:scene3d>
+      <a:camera prst="orthographicFront"/>
+      <a:lightRig rig="threePt" dir="t"/>
+    </dgm:scene3d>
+    <dgm:sp3d/>
+    <dgm:txPr/>
+    <dgm:style>
+      <a:lnRef idx="2">
+        <a:scrgbClr r="0" g="0" b="0"/>
+      </a:lnRef>
+      <a:fillRef idx="0">
+        <a:scrgbClr r="0" g="0" b="0"/>
+      </a:fillRef>
+      <a:effectRef idx="0">
+        <a:scrgbClr r="0" g="0" b="0"/>
+      </a:effectRef>
+      <a:fontRef idx="minor"/>
+    </dgm:style>
+  </dgm:styleLbl>
+  <dgm:styleLbl name="parChTrans1D3">
+    <dgm:scene3d>
+      <a:camera prst="orthographicFront"/>
+      <a:lightRig rig="threePt" dir="t"/>
+    </dgm:scene3d>
+    <dgm:sp3d/>
+    <dgm:txPr/>
+    <dgm:style>
+      <a:lnRef idx="2">
+        <a:scrgbClr r="0" g="0" b="0"/>
+      </a:lnRef>
+      <a:fillRef idx="0">
+        <a:scrgbClr r="0" g="0" b="0"/>
+      </a:fillRef>
+      <a:effectRef idx="0">
+        <a:scrgbClr r="0" g="0" b="0"/>
+      </a:effectRef>
+      <a:fontRef idx="minor"/>
+    </dgm:style>
+  </dgm:styleLbl>
+  <dgm:styleLbl name="parChTrans1D4">
+    <dgm:scene3d>
+      <a:camera prst="orthographicFront"/>
+      <a:lightRig rig="threePt" dir="t"/>
+    </dgm:scene3d>
+    <dgm:sp3d/>
+    <dgm:txPr/>
+    <dgm:style>
+      <a:lnRef idx="2">
+        <a:scrgbClr r="0" g="0" b="0"/>
+      </a:lnRef>
+      <a:fillRef idx="0">
+        <a:scrgbClr r="0" g="0" b="0"/>
+      </a:fillRef>
+      <a:effectRef idx="0">
+        <a:scrgbClr r="0" g="0" b="0"/>
+      </a:effectRef>
+      <a:fontRef idx="minor"/>
+    </dgm:style>
+  </dgm:styleLbl>
+  <dgm:styleLbl name="fgAcc1">
+    <dgm:scene3d>
+      <a:camera prst="orthographicFront"/>
+      <a:lightRig rig="threePt" dir="t"/>
+    </dgm:scene3d>
+    <dgm:sp3d/>
+    <dgm:txPr/>
+    <dgm:style>
+      <a:lnRef idx="2">
+        <a:scrgbClr r="0" g="0" b="0"/>
+      </a:lnRef>
+      <a:fillRef idx="1">
+        <a:scrgbClr r="0" g="0" b="0"/>
+      </a:fillRef>
+      <a:effectRef idx="0">
+        <a:scrgbClr r="0" g="0" b="0"/>
+      </a:effectRef>
+      <a:fontRef idx="minor"/>
+    </dgm:style>
+  </dgm:styleLbl>
+  <dgm:styleLbl name="conFgAcc1">
+    <dgm:scene3d>
+      <a:camera prst="orthographicFront"/>
+      <a:lightRig rig="threePt" dir="t"/>
+    </dgm:scene3d>
+    <dgm:sp3d/>
+    <dgm:txPr/>
+    <dgm:style>
+      <a:lnRef idx="2">
+        <a:scrgbClr r="0" g="0" b="0"/>
+      </a:lnRef>
+      <a:fillRef idx="1">
+        <a:scrgbClr r="0" g="0" b="0"/>
+      </a:fillRef>
+      <a:effectRef idx="0">
+        <a:scrgbClr r="0" g="0" b="0"/>
+      </a:effectRef>
+      <a:fontRef idx="minor"/>
+    </dgm:style>
+  </dgm:styleLbl>
+  <dgm:styleLbl name="alignAcc1">
+    <dgm:scene3d>
+      <a:camera prst="orthographicFront"/>
+      <a:lightRig rig="threePt" dir="t"/>
+    </dgm:scene3d>
+    <dgm:sp3d/>
+    <dgm:txPr/>
+    <dgm:style>
+      <a:lnRef idx="2">
+        <a:scrgbClr r="0" g="0" b="0"/>
+      </a:lnRef>
+      <a:fillRef idx="1">
+        <a:scrgbClr r="0" g="0" b="0"/>
+      </a:fillRef>
+      <a:effectRef idx="0">
+        <a:scrgbClr r="0" g="0" b="0"/>
+      </a:effectRef>
+      <a:fontRef idx="minor"/>
+    </dgm:style>
+  </dgm:styleLbl>
+  <dgm:styleLbl name="trAlignAcc1">
+    <dgm:scene3d>
+      <a:camera prst="orthographicFront"/>
+      <a:lightRig rig="threePt" dir="t"/>
+    </dgm:scene3d>
+    <dgm:sp3d/>
+    <dgm:txPr/>
+    <dgm:style>
+      <a:lnRef idx="1">
+        <a:scrgbClr r="0" g="0" b="0"/>
+      </a:lnRef>
+      <a:fillRef idx="1">
+        <a:scrgbClr r="0" g="0" b="0"/>
+      </a:fillRef>
+      <a:effectRef idx="0">
+        <a:scrgbClr r="0" g="0" b="0"/>
+      </a:effectRef>
+      <a:fontRef idx="minor"/>
+    </dgm:style>
+  </dgm:styleLbl>
+  <dgm:styleLbl name="bgAcc1">
+    <dgm:scene3d>
+      <a:camera prst="orthographicFront"/>
+      <a:lightRig rig="threePt" dir="t"/>
+    </dgm:scene3d>
+    <dgm:sp3d/>
+    <dgm:txPr/>
+    <dgm:style>
+      <a:lnRef idx="2">
+        <a:scrgbClr r="0" g="0" b="0"/>
+      </a:lnRef>
+      <a:fillRef idx="1">
+        <a:scrgbClr r="0" g="0" b="0"/>
+      </a:fillRef>
+      <a:effectRef idx="0">
+        <a:scrgbClr r="0" g="0" b="0"/>
+      </a:effectRef>
+      <a:fontRef idx="minor"/>
+    </dgm:style>
+  </dgm:styleLbl>
+  <dgm:styleLbl name="solidFgAcc1">
+    <dgm:scene3d>
+      <a:camera prst="orthographicFront"/>
+      <a:lightRig rig="threePt" dir="t"/>
+    </dgm:scene3d>
+    <dgm:sp3d/>
+    <dgm:txPr/>
+    <dgm:style>
+      <a:lnRef idx="2">
+        <a:scrgbClr r="0" g="0" b="0"/>
+      </a:lnRef>
+      <a:fillRef idx="1">
+        <a:scrgbClr r="0" g="0" b="0"/>
+      </a:fillRef>
+      <a:effectRef idx="0">
+        <a:scrgbClr r="0" g="0" b="0"/>
+      </a:effectRef>
+      <a:fontRef idx="minor"/>
+    </dgm:style>
+  </dgm:styleLbl>
+  <dgm:styleLbl name="solidAlignAcc1">
+    <dgm:scene3d>
+      <a:camera prst="orthographicFront"/>
+      <a:lightRig rig="threePt" dir="t"/>
+    </dgm:scene3d>
+    <dgm:sp3d/>
+    <dgm:txPr/>
+    <dgm:style>
+      <a:lnRef idx="2">
+        <a:scrgbClr r="0" g="0" b="0"/>
+      </a:lnRef>
+      <a:fillRef idx="1">
+        <a:scrgbClr r="0" g="0" b="0"/>
+      </a:fillRef>
+      <a:effectRef idx="0">
+        <a:scrgbClr r="0" g="0" b="0"/>
+      </a:effectRef>
+      <a:fontRef idx="minor"/>
+    </dgm:style>
+  </dgm:styleLbl>
+  <dgm:styleLbl name="solidBgAcc1">
+    <dgm:scene3d>
+      <a:camera prst="orthographicFront"/>
+      <a:lightRig rig="threePt" dir="t"/>
+    </dgm:scene3d>
+    <dgm:sp3d/>
+    <dgm:txPr/>
+    <dgm:style>
+      <a:lnRef idx="2">
+        <a:scrgbClr r="0" g="0" b="0"/>
+      </a:lnRef>
+      <a:fillRef idx="1">
+        <a:scrgbClr r="0" g="0" b="0"/>
+      </a:fillRef>
+      <a:effectRef idx="0">
+        <a:scrgbClr r="0" g="0" b="0"/>
+      </a:effectRef>
+      <a:fontRef idx="minor"/>
+    </dgm:style>
+  </dgm:styleLbl>
+  <dgm:styleLbl name="fgAccFollowNode1">
+    <dgm:scene3d>
+      <a:camera prst="orthographicFront"/>
+      <a:lightRig rig="threePt" dir="t"/>
+    </dgm:scene3d>
+    <dgm:sp3d/>
+    <dgm:txPr/>
+    <dgm:style>
+      <a:lnRef idx="2">
+        <a:scrgbClr r="0" g="0" b="0"/>
+      </a:lnRef>
+      <a:fillRef idx="1">
+        <a:scrgbClr r="0" g="0" b="0"/>
+      </a:fillRef>
+      <a:effectRef idx="0">
+        <a:scrgbClr r="0" g="0" b="0"/>
+      </a:effectRef>
+      <a:fontRef idx="minor"/>
+    </dgm:style>
+  </dgm:styleLbl>
+  <dgm:styleLbl name="alignAccFollowNode1">
+    <dgm:scene3d>
+      <a:camera prst="orthographicFront"/>
+      <a:lightRig rig="threePt" dir="t"/>
+    </dgm:scene3d>
+    <dgm:sp3d/>
+    <dgm:txPr/>
+    <dgm:style>
+      <a:lnRef idx="2">
+        <a:scrgbClr r="0" g="0" b="0"/>
+      </a:lnRef>
+      <a:fillRef idx="1">
+        <a:scrgbClr r="0" g="0" b="0"/>
+      </a:fillRef>
+      <a:effectRef idx="0">
+        <a:scrgbClr r="0" g="0" b="0"/>
+      </a:effectRef>
+      <a:fontRef idx="minor"/>
+    </dgm:style>
+  </dgm:styleLbl>
+  <dgm:styleLbl name="bgAccFollowNode1">
+    <dgm:scene3d>
+      <a:camera prst="orthographicFront"/>
+      <a:lightRig rig="threePt" dir="t"/>
+    </dgm:scene3d>
+    <dgm:sp3d/>
+    <dgm:txPr/>
+    <dgm:style>
+      <a:lnRef idx="2">
+        <a:scrgbClr r="0" g="0" b="0"/>
+      </a:lnRef>
+      <a:fillRef idx="1">
+        <a:scrgbClr r="0" g="0" b="0"/>
+      </a:fillRef>
+      <a:effectRef idx="0">
+        <a:scrgbClr r="0" g="0" b="0"/>
+      </a:effectRef>
+      <a:fontRef idx="minor"/>
+    </dgm:style>
+  </dgm:styleLbl>
+  <dgm:styleLbl name="fgAcc0">
+    <dgm:scene3d>
+      <a:camera prst="orthographicFront"/>
+      <a:lightRig rig="threePt" dir="t"/>
+    </dgm:scene3d>
+    <dgm:sp3d/>
+    <dgm:txPr/>
+    <dgm:style>
+      <a:lnRef idx="2">
+        <a:scrgbClr r="0" g="0" b="0"/>
+      </a:lnRef>
+      <a:fillRef idx="1">
+        <a:scrgbClr r="0" g="0" b="0"/>
+      </a:fillRef>
+      <a:effectRef idx="0">
+        <a:scrgbClr r="0" g="0" b="0"/>
+      </a:effectRef>
+      <a:fontRef idx="minor"/>
+    </dgm:style>
+  </dgm:styleLbl>
+  <dgm:styleLbl name="fgAcc2">
+    <dgm:scene3d>
+      <a:camera prst="orthographicFront"/>
+      <a:lightRig rig="threePt" dir="t"/>
+    </dgm:scene3d>
+    <dgm:sp3d/>
+    <dgm:txPr/>
+    <dgm:style>
+      <a:lnRef idx="2">
+        <a:scrgbClr r="0" g="0" b="0"/>
+      </a:lnRef>
+      <a:fillRef idx="1">
+        <a:scrgbClr r="0" g="0" b="0"/>
+      </a:fillRef>
+      <a:effectRef idx="0">
+        <a:scrgbClr r="0" g="0" b="0"/>
+      </a:effectRef>
+      <a:fontRef idx="minor"/>
+    </dgm:style>
+  </dgm:styleLbl>
+  <dgm:styleLbl name="fgAcc3">
+    <dgm:scene3d>
+      <a:camera prst="orthographicFront"/>
+      <a:lightRig rig="threePt" dir="t"/>
+    </dgm:scene3d>
+    <dgm:sp3d/>
+    <dgm:txPr/>
+    <dgm:style>
+      <a:lnRef idx="2">
+        <a:scrgbClr r="0" g="0" b="0"/>
+      </a:lnRef>
+      <a:fillRef idx="1">
+        <a:scrgbClr r="0" g="0" b="0"/>
+      </a:fillRef>
+      <a:effectRef idx="0">
+        <a:scrgbClr r="0" g="0" b="0"/>
+      </a:effectRef>
+      <a:fontRef idx="minor"/>
+    </dgm:style>
+  </dgm:styleLbl>
+  <dgm:styleLbl name="fgAcc4">
+    <dgm:scene3d>
+      <a:camera prst="orthographicFront"/>
+      <a:lightRig rig="threePt" dir="t"/>
+    </dgm:scene3d>
+    <dgm:sp3d/>
+    <dgm:txPr/>
+    <dgm:style>
+      <a:lnRef idx="2">
+        <a:scrgbClr r="0" g="0" b="0"/>
+      </a:lnRef>
+      <a:fillRef idx="1">
+        <a:scrgbClr r="0" g="0" b="0"/>
+      </a:fillRef>
+      <a:effectRef idx="0">
+        <a:scrgbClr r="0" g="0" b="0"/>
+      </a:effectRef>
+      <a:fontRef idx="minor"/>
+    </dgm:style>
+  </dgm:styleLbl>
+  <dgm:styleLbl name="bgShp">
+    <dgm:scene3d>
+      <a:camera prst="orthographicFront"/>
+      <a:lightRig rig="threePt" dir="t"/>
+    </dgm:scene3d>
+    <dgm:sp3d/>
+    <dgm:txPr/>
+    <dgm:style>
+      <a:lnRef idx="0">
+        <a:scrgbClr r="0" g="0" b="0"/>
+      </a:lnRef>
+      <a:fillRef idx="1">
+        <a:scrgbClr r="0" g="0" b="0"/>
+      </a:fillRef>
+      <a:effectRef idx="0">
+        <a:scrgbClr r="0" g="0" b="0"/>
+      </a:effectRef>
+      <a:fontRef idx="minor"/>
+    </dgm:style>
+  </dgm:styleLbl>
+  <dgm:styleLbl name="dkBgShp">
+    <dgm:scene3d>
+      <a:camera prst="orthographicFront"/>
+      <a:lightRig rig="threePt" dir="t"/>
+    </dgm:scene3d>
+    <dgm:sp3d/>
+    <dgm:txPr/>
+    <dgm:style>
+      <a:lnRef idx="0">
+        <a:scrgbClr r="0" g="0" b="0"/>
+      </a:lnRef>
+      <a:fillRef idx="1">
+        <a:scrgbClr r="0" g="0" b="0"/>
+      </a:fillRef>
+      <a:effectRef idx="0">
+        <a:scrgbClr r="0" g="0" b="0"/>
+      </a:effectRef>
+      <a:fontRef idx="minor"/>
+    </dgm:style>
+  </dgm:styleLbl>
+  <dgm:styleLbl name="trBgShp">
+    <dgm:scene3d>
+      <a:camera prst="orthographicFront"/>
+      <a:lightRig rig="threePt" dir="t"/>
+    </dgm:scene3d>
+    <dgm:sp3d/>
+    <dgm:txPr/>
+    <dgm:style>
+      <a:lnRef idx="0">
+        <a:scrgbClr r="0" g="0" b="0"/>
+      </a:lnRef>
+      <a:fillRef idx="1">
+        <a:scrgbClr r="0" g="0" b="0"/>
+      </a:fillRef>
+      <a:effectRef idx="0">
+        <a:scrgbClr r="0" g="0" b="0"/>
+      </a:effectRef>
+      <a:fontRef idx="minor"/>
+    </dgm:style>
+  </dgm:styleLbl>
+  <dgm:styleLbl name="fgShp">
+    <dgm:scene3d>
+      <a:camera prst="orthographicFront"/>
+      <a:lightRig rig="threePt" dir="t"/>
+    </dgm:scene3d>
+    <dgm:sp3d/>
+    <dgm:txPr/>
+    <dgm:style>
+      <a:lnRef idx="2">
+        <a:scrgbClr r="0" g="0" b="0"/>
+      </a:lnRef>
+      <a:fillRef idx="1">
+        <a:scrgbClr r="0" g="0" b="0"/>
+      </a:fillRef>
+      <a:effectRef idx="0">
+        <a:scrgbClr r="0" g="0" b="0"/>
+      </a:effectRef>
+      <a:fontRef idx="minor"/>
+    </dgm:style>
+  </dgm:styleLbl>
+  <dgm:styleLbl name="revTx">
+    <dgm:scene3d>
+      <a:camera prst="orthographicFront"/>
+      <a:lightRig rig="threePt" dir="t"/>
+    </dgm:scene3d>
+    <dgm:sp3d/>
+    <dgm:txPr/>
+    <dgm:style>
+      <a:lnRef idx="0">
+        <a:scrgbClr r="0" g="0" b="0"/>
+      </a:lnRef>
+      <a:fillRef idx="0">
+        <a:scrgbClr r="0" g="0" b="0"/>
+      </a:fillRef>
+      <a:effectRef idx="0">
+        <a:scrgbClr r="0" g="0" b="0"/>
+      </a:effectRef>
+      <a:fontRef idx="minor"/>
+    </dgm:style>
+  </dgm:styleLbl>
+</dgm:styleDef>
+</file>
+
 <file path=ppt/diagrams/quickStyle2.xml><?xml version="1.0" encoding="utf-8"?>
 <dgm:styleDef xmlns:dgm="http://schemas.openxmlformats.org/drawingml/2006/diagram" xmlns:a="http://schemas.openxmlformats.org/drawingml/2006/main" uniqueId="urn:microsoft.com/office/officeart/2005/8/quickstyle/simple1">
   <dgm:title val=""/>
@@ -32792,7 +36043,7 @@
                 <a:ea typeface="+mn-ea"/>
                 <a:cs typeface="+mn-cs"/>
               </a:rPr>
-              <a:t>Finite resources Translating the protection requirements into security implementations have a wide range of maturity levels that could follow a good, better, best approach.  Ideally, Hi-Tech would only follow the most strict guidelines.  However, that is not as practical due to unacceptable costs both financially and in terms of user experience.  For example, the business uses many IoT devices that lack remote firmware upgrade capabilities.  It might be acceptable to have the operations team manually upgrade each device annually—though the labor costs are too high for monthly cadences.  In many scenarios, choosing a security investment is not binary (do everything versus do nothing).  Instead, the purchase can be in the middle and follow a phased release (Gordon, Loeb, </a:t>
+              <a:t>Finite resources Translating the protection requirements into security implementations have a wide range of maturity levels that could follow a good, better, best approach.  Ideally, Hi-Tech would only follow the strictest guidelines.  However, that is not as practical due to unacceptable costs both financially and in terms of user experience.  For example, the business uses many IoT devices that lack remote firmware upgrade capabilities.  It might be acceptable to have the operations team manually upgrade each device annually—though the labor costs are too high for monthly cadences.  In many scenarios, choosing a security investment is not binary (do everything versus do nothing).  Instead, the purchase can be in the middle and follow a phased release (Gordon, Loeb, </a:t>
             </a:r>
             <a:r>
               <a:rPr lang="en-US" sz="1200" kern="1200" dirty="0" err="1">
@@ -40033,13 +43284,8 @@
           <a:p>
             <a:r>
               <a:rPr lang="en-US" dirty="0"/>
-              <a:t>Scammers, Spammers, AND </a:t>
+              <a:t>Scammers, Spammers, AND Robots</a:t>
             </a:r>
-            <a:r>
-              <a:rPr lang="en-US" dirty="0" err="1"/>
-              <a:t>RObOTS</a:t>
-            </a:r>
-            <a:endParaRPr lang="en-US" dirty="0"/>
           </a:p>
         </p:txBody>
       </p:sp>
@@ -43330,6 +46576,14 @@
 <file path=ppt/slides/slide25.xml><?xml version="1.0" encoding="utf-8"?>
 <p:sld xmlns:a="http://schemas.openxmlformats.org/drawingml/2006/main" xmlns:r="http://schemas.openxmlformats.org/officeDocument/2006/relationships" xmlns:p="http://schemas.openxmlformats.org/presentationml/2006/main">
   <p:cSld>
+    <p:bg>
+      <p:bgPr>
+        <a:solidFill>
+          <a:schemeClr val="bg1"/>
+        </a:solidFill>
+        <a:effectLst/>
+      </p:bgPr>
+    </p:bg>
     <p:spTree>
       <p:nvGrpSpPr>
         <p:cNvPr id="1" name=""/>
@@ -43344,6 +46598,66 @@
           <a:chExt cx="0" cy="0"/>
         </a:xfrm>
       </p:grpSpPr>
+      <p:sp useBgFill="1">
+        <p:nvSpPr>
+          <p:cNvPr id="9" name="Rectangle 8">
+            <a:extLst>
+              <a:ext uri="{FF2B5EF4-FFF2-40B4-BE49-F238E27FC236}">
+                <a16:creationId xmlns:a16="http://schemas.microsoft.com/office/drawing/2014/main" id="{F92989FB-1024-49B7-BDF1-B3CE27D48623}"/>
+              </a:ext>
+              <a:ext uri="{C183D7F6-B498-43B3-948B-1728B52AA6E4}">
+                <adec:decorative xmlns:adec="http://schemas.microsoft.com/office/drawing/2017/decorative" val="1"/>
+              </a:ext>
+            </a:extLst>
+          </p:cNvPr>
+          <p:cNvSpPr>
+            <a:spLocks noGrp="1" noRot="1" noChangeAspect="1" noMove="1" noResize="1" noEditPoints="1" noAdjustHandles="1" noChangeArrowheads="1" noChangeShapeType="1" noTextEdit="1"/>
+          </p:cNvSpPr>
+          <p:nvPr>
+            <p:extLst>
+              <p:ext uri="{386F3935-93C4-4BCD-93E2-E3B085C9AB24}">
+                <p16:designElem xmlns:p16="http://schemas.microsoft.com/office/powerpoint/2015/main" val="1"/>
+              </p:ext>
+            </p:extLst>
+          </p:nvPr>
+        </p:nvSpPr>
+        <p:spPr>
+          <a:xfrm>
+            <a:off x="0" y="0"/>
+            <a:ext cx="12191999" cy="6858001"/>
+          </a:xfrm>
+          <a:prstGeom prst="rect">
+            <a:avLst/>
+          </a:prstGeom>
+          <a:ln>
+            <a:noFill/>
+          </a:ln>
+        </p:spPr>
+        <p:style>
+          <a:lnRef idx="2">
+            <a:schemeClr val="accent1">
+              <a:shade val="50000"/>
+            </a:schemeClr>
+          </a:lnRef>
+          <a:fillRef idx="1">
+            <a:schemeClr val="accent1"/>
+          </a:fillRef>
+          <a:effectRef idx="0">
+            <a:schemeClr val="accent1"/>
+          </a:effectRef>
+          <a:fontRef idx="minor">
+            <a:schemeClr val="lt1"/>
+          </a:fontRef>
+        </p:style>
+        <p:txBody>
+          <a:bodyPr rtlCol="0" anchor="ctr"/>
+          <a:lstStyle/>
+          <a:p>
+            <a:pPr algn="ctr"/>
+            <a:endParaRPr lang="en-US"/>
+          </a:p>
+        </p:txBody>
+      </p:sp>
       <p:sp>
         <p:nvSpPr>
           <p:cNvPr id="2" name="Title 1">
@@ -43360,9 +46674,16 @@
             <p:ph type="title"/>
           </p:nvPr>
         </p:nvSpPr>
-        <p:spPr/>
+        <p:spPr>
+          <a:xfrm>
+            <a:off x="746228" y="1037967"/>
+            <a:ext cx="3054091" cy="4709131"/>
+          </a:xfrm>
+        </p:spPr>
         <p:txBody>
-          <a:bodyPr/>
+          <a:bodyPr anchor="ctr">
+            <a:normAutofit/>
+          </a:bodyPr>
           <a:lstStyle/>
           <a:p>
             <a:r>
@@ -43374,29 +46695,143 @@
       </p:sp>
       <p:sp>
         <p:nvSpPr>
-          <p:cNvPr id="3" name="Content Placeholder 2">
+          <p:cNvPr id="11" name="Rectangle 10">
             <a:extLst>
               <a:ext uri="{FF2B5EF4-FFF2-40B4-BE49-F238E27FC236}">
-                <a16:creationId xmlns:a16="http://schemas.microsoft.com/office/drawing/2014/main" id="{AC45AC7D-34AD-4541-9BAB-9486BA91326E}"/>
+                <a16:creationId xmlns:a16="http://schemas.microsoft.com/office/drawing/2014/main" id="{2987D6F4-EC95-4EF1-A8AD-4B70386CEEC7}"/>
+              </a:ext>
+              <a:ext uri="{C183D7F6-B498-43B3-948B-1728B52AA6E4}">
+                <adec:decorative xmlns:adec="http://schemas.microsoft.com/office/drawing/2017/decorative" val="1"/>
               </a:ext>
             </a:extLst>
           </p:cNvPr>
           <p:cNvSpPr>
-            <a:spLocks noGrp="1"/>
+            <a:spLocks noGrp="1" noRot="1" noChangeAspect="1" noMove="1" noResize="1" noEditPoints="1" noAdjustHandles="1" noChangeArrowheads="1" noChangeShapeType="1" noTextEdit="1"/>
           </p:cNvSpPr>
           <p:nvPr>
-            <p:ph idx="1"/>
+            <p:extLst>
+              <p:ext uri="{386F3935-93C4-4BCD-93E2-E3B085C9AB24}">
+                <p16:designElem xmlns:p16="http://schemas.microsoft.com/office/powerpoint/2015/main" val="1"/>
+              </p:ext>
+            </p:extLst>
           </p:nvPr>
         </p:nvSpPr>
-        <p:spPr/>
-        <p:txBody>
-          <a:bodyPr/>
-          <a:lstStyle/>
-          <a:p>
-            <a:endParaRPr lang="en-US"/>
-          </a:p>
-        </p:txBody>
+        <p:spPr>
+          <a:xfrm>
+            <a:off x="446534" y="457200"/>
+            <a:ext cx="3703320" cy="94997"/>
+          </a:xfrm>
+          <a:prstGeom prst="rect">
+            <a:avLst/>
+          </a:prstGeom>
+          <a:solidFill>
+            <a:srgbClr val="465359"/>
+          </a:solidFill>
+          <a:ln>
+            <a:noFill/>
+          </a:ln>
+          <a:effectLst/>
+        </p:spPr>
+        <p:style>
+          <a:lnRef idx="1">
+            <a:schemeClr val="accent1"/>
+          </a:lnRef>
+          <a:fillRef idx="3">
+            <a:schemeClr val="accent1"/>
+          </a:fillRef>
+          <a:effectRef idx="2">
+            <a:schemeClr val="accent1"/>
+          </a:effectRef>
+          <a:fontRef idx="minor">
+            <a:schemeClr val="lt1"/>
+          </a:fontRef>
+        </p:style>
       </p:sp>
+      <p:sp>
+        <p:nvSpPr>
+          <p:cNvPr id="13" name="Rectangle 12">
+            <a:extLst>
+              <a:ext uri="{FF2B5EF4-FFF2-40B4-BE49-F238E27FC236}">
+                <a16:creationId xmlns:a16="http://schemas.microsoft.com/office/drawing/2014/main" id="{F5F792DF-9D0A-4DB6-9A9E-7312F5A7E87D}"/>
+              </a:ext>
+              <a:ext uri="{C183D7F6-B498-43B3-948B-1728B52AA6E4}">
+                <adec:decorative xmlns:adec="http://schemas.microsoft.com/office/drawing/2017/decorative" val="1"/>
+              </a:ext>
+            </a:extLst>
+          </p:cNvPr>
+          <p:cNvSpPr>
+            <a:spLocks noGrp="1" noRot="1" noChangeAspect="1" noMove="1" noResize="1" noEditPoints="1" noAdjustHandles="1" noChangeArrowheads="1" noChangeShapeType="1" noTextEdit="1"/>
+          </p:cNvSpPr>
+          <p:nvPr>
+            <p:extLst>
+              <p:ext uri="{386F3935-93C4-4BCD-93E2-E3B085C9AB24}">
+                <p16:designElem xmlns:p16="http://schemas.microsoft.com/office/powerpoint/2015/main" val="1"/>
+              </p:ext>
+            </p:extLst>
+          </p:nvPr>
+        </p:nvSpPr>
+        <p:spPr>
+          <a:xfrm>
+            <a:off x="4241830" y="457200"/>
+            <a:ext cx="7498080" cy="91440"/>
+          </a:xfrm>
+          <a:prstGeom prst="rect">
+            <a:avLst/>
+          </a:prstGeom>
+          <a:solidFill>
+            <a:schemeClr val="accent1"/>
+          </a:solidFill>
+          <a:ln>
+            <a:noFill/>
+          </a:ln>
+          <a:effectLst/>
+        </p:spPr>
+        <p:style>
+          <a:lnRef idx="1">
+            <a:schemeClr val="accent1"/>
+          </a:lnRef>
+          <a:fillRef idx="3">
+            <a:schemeClr val="accent1"/>
+          </a:fillRef>
+          <a:effectRef idx="2">
+            <a:schemeClr val="accent1"/>
+          </a:effectRef>
+          <a:fontRef idx="minor">
+            <a:schemeClr val="lt1"/>
+          </a:fontRef>
+        </p:style>
+      </p:sp>
+      <p:graphicFrame>
+        <p:nvGraphicFramePr>
+          <p:cNvPr id="5" name="Content Placeholder 2">
+            <a:extLst>
+              <a:ext uri="{FF2B5EF4-FFF2-40B4-BE49-F238E27FC236}">
+                <a16:creationId xmlns:a16="http://schemas.microsoft.com/office/drawing/2014/main" id="{7E5A93F3-7EAD-4637-A81C-BA0D2F5627CD}"/>
+              </a:ext>
+            </a:extLst>
+          </p:cNvPr>
+          <p:cNvGraphicFramePr>
+            <a:graphicFrameLocks noGrp="1"/>
+          </p:cNvGraphicFramePr>
+          <p:nvPr>
+            <p:ph idx="1"/>
+            <p:extLst>
+              <p:ext uri="{D42A27DB-BD31-4B8C-83A1-F6EECF244321}">
+                <p14:modId xmlns:p14="http://schemas.microsoft.com/office/powerpoint/2010/main" val="2677723760"/>
+              </p:ext>
+            </p:extLst>
+          </p:nvPr>
+        </p:nvGraphicFramePr>
+        <p:xfrm>
+          <a:off x="4598438" y="1207783"/>
+          <a:ext cx="7012370" cy="4709131"/>
+        </p:xfrm>
+        <a:graphic>
+          <a:graphicData uri="http://schemas.openxmlformats.org/drawingml/2006/diagram">
+            <dgm:relIds xmlns:dgm="http://schemas.openxmlformats.org/drawingml/2006/diagram" xmlns:r="http://schemas.openxmlformats.org/officeDocument/2006/relationships" r:dm="rId3" r:lo="rId4" r:qs="rId5" r:cs="rId6"/>
+          </a:graphicData>
+        </a:graphic>
+      </p:graphicFrame>
     </p:spTree>
     <p:extLst>
       <p:ext uri="{BB962C8B-B14F-4D97-AF65-F5344CB8AC3E}">
@@ -46715,21 +50150,21 @@
 </file>
 
 <file path=customXml/item1.xml><?xml version="1.0" encoding="utf-8"?>
+<?mso-contentType ?>
+<FormTemplates xmlns="http://schemas.microsoft.com/sharepoint/v3/contenttype/forms">
+  <Display>DocumentLibraryForm</Display>
+  <Edit>DocumentLibraryForm</Edit>
+  <New>DocumentLibraryForm</New>
+</FormTemplates>
+</file>
+
+<file path=customXml/item2.xml><?xml version="1.0" encoding="utf-8"?>
 <p:properties xmlns:p="http://schemas.microsoft.com/office/2006/metadata/properties" xmlns:xsi="http://www.w3.org/2001/XMLSchema-instance" xmlns:pc="http://schemas.microsoft.com/office/infopath/2007/PartnerControls">
   <documentManagement>
     <Status xmlns="71af3243-3dd4-4a8d-8c0d-dd76da1f02a5">Not started</Status>
     <MediaServiceKeyPoints xmlns="71af3243-3dd4-4a8d-8c0d-dd76da1f02a5" xsi:nil="true"/>
   </documentManagement>
 </p:properties>
-</file>
-
-<file path=customXml/item2.xml><?xml version="1.0" encoding="utf-8"?>
-<?mso-contentType ?>
-<FormTemplates xmlns="http://schemas.microsoft.com/sharepoint/v3/contenttype/forms">
-  <Display>DocumentLibraryForm</Display>
-  <Edit>DocumentLibraryForm</Edit>
-  <New>DocumentLibraryForm</New>
-</FormTemplates>
 </file>
 
 <file path=customXml/item3.xml><?xml version="1.0" encoding="utf-8"?>
@@ -46954,19 +50389,19 @@
 </file>
 
 <file path=customXml/itemProps1.xml><?xml version="1.0" encoding="utf-8"?>
+<ds:datastoreItem xmlns:ds="http://schemas.openxmlformats.org/officeDocument/2006/customXml" ds:itemID="{927BD4C1-B6B1-4715-ABF9-E660A51A4EA0}">
+  <ds:schemaRefs>
+    <ds:schemaRef ds:uri="http://schemas.microsoft.com/sharepoint/v3/contenttype/forms"/>
+  </ds:schemaRefs>
+</ds:datastoreItem>
+</file>
+
+<file path=customXml/itemProps2.xml><?xml version="1.0" encoding="utf-8"?>
 <ds:datastoreItem xmlns:ds="http://schemas.openxmlformats.org/officeDocument/2006/customXml" ds:itemID="{8D289AE2-D2AE-49D1-AFAC-3A79F6794255}">
   <ds:schemaRefs>
     <ds:schemaRef ds:uri="http://schemas.microsoft.com/office/2006/metadata/properties"/>
     <ds:schemaRef ds:uri="http://schemas.microsoft.com/office/infopath/2007/PartnerControls"/>
     <ds:schemaRef ds:uri="71af3243-3dd4-4a8d-8c0d-dd76da1f02a5"/>
-  </ds:schemaRefs>
-</ds:datastoreItem>
-</file>
-
-<file path=customXml/itemProps2.xml><?xml version="1.0" encoding="utf-8"?>
-<ds:datastoreItem xmlns:ds="http://schemas.openxmlformats.org/officeDocument/2006/customXml" ds:itemID="{927BD4C1-B6B1-4715-ABF9-E660A51A4EA0}">
-  <ds:schemaRefs>
-    <ds:schemaRef ds:uri="http://schemas.microsoft.com/sharepoint/v3/contenttype/forms"/>
   </ds:schemaRefs>
 </ds:datastoreItem>
 </file>

</xml_diff>